<commit_message>
Add the Moderate Risks counter on the Powerpoint templates
</commit_message>
<xml_diff>
--- a/Templates/SecurityReport.pptx
+++ b/Templates/SecurityReport.pptx
@@ -8,7 +8,7 @@
     <p:notesMasterId r:id="rId4"/>
   </p:notesMasterIdLst>
   <p:sldIdLst>
-    <p:sldId id="282" r:id="rId2"/>
+    <p:sldId id="283" r:id="rId2"/>
     <p:sldId id="281" r:id="rId3"/>
   </p:sldIdLst>
   <p:sldSz cx="9144000" cy="6858000" type="screen4x3"/>
@@ -116,7 +116,7 @@
         </p14:section>
         <p14:section name="contenu du diaporama" id="{7C415485-64F3-4240-AEC1-14455B505EAE}">
           <p14:sldIdLst>
-            <p14:sldId id="282"/>
+            <p14:sldId id="283"/>
             <p14:sldId id="281"/>
           </p14:sldIdLst>
         </p14:section>
@@ -225,7 +225,7 @@
           <a:p>
             <a:fld id="{1A3A36EA-A6A6-3241-96CC-76CD1AE24D79}" type="datetimeFigureOut">
               <a:rPr lang="fr-FR" smtClean="0"/>
-              <a:t>17/08/2017</a:t>
+              <a:t>22/08/2017</a:t>
             </a:fld>
             <a:endParaRPr lang="fr-FR"/>
           </a:p>
@@ -5932,8 +5932,8 @@
         </p:nvSpPr>
         <p:spPr>
           <a:xfrm>
-            <a:off x="262683" y="2169000"/>
-            <a:ext cx="1080000" cy="1260000"/>
+            <a:off x="249238" y="3348896"/>
+            <a:ext cx="1296000" cy="1080000"/>
           </a:xfrm>
           <a:prstGeom prst="rect">
             <a:avLst/>
@@ -5980,7 +5980,7 @@
         </p:nvSpPr>
         <p:spPr>
           <a:xfrm>
-            <a:off x="282657" y="4550322"/>
+            <a:off x="262683" y="5121328"/>
             <a:ext cx="1080000" cy="1260000"/>
           </a:xfrm>
           <a:prstGeom prst="rect">
@@ -6028,8 +6028,8 @@
         </p:nvSpPr>
         <p:spPr>
           <a:xfrm>
-            <a:off x="1587848" y="653602"/>
-            <a:ext cx="1080000" cy="1260000"/>
+            <a:off x="1763808" y="653602"/>
+            <a:ext cx="1080000" cy="1080000"/>
           </a:xfrm>
           <a:prstGeom prst="rect">
             <a:avLst/>
@@ -6076,8 +6076,8 @@
         </p:nvSpPr>
         <p:spPr>
           <a:xfrm>
-            <a:off x="1587848" y="2169000"/>
-            <a:ext cx="1080000" cy="1260000"/>
+            <a:off x="1763808" y="3348896"/>
+            <a:ext cx="1080000" cy="1080000"/>
           </a:xfrm>
           <a:prstGeom prst="rect">
             <a:avLst/>
@@ -6124,7 +6124,7 @@
         </p:nvSpPr>
         <p:spPr>
           <a:xfrm>
-            <a:off x="1587848" y="4550321"/>
+            <a:off x="1567874" y="5121327"/>
             <a:ext cx="1080000" cy="1260000"/>
           </a:xfrm>
           <a:prstGeom prst="rect">
@@ -6173,7 +6173,7 @@
         <p:spPr>
           <a:xfrm>
             <a:off x="262683" y="653602"/>
-            <a:ext cx="1080000" cy="1260000"/>
+            <a:ext cx="1296000" cy="1080000"/>
           </a:xfrm>
           <a:prstGeom prst="rect">
             <a:avLst/>
@@ -6225,7 +6225,7 @@
         <p:spPr>
           <a:xfrm>
             <a:off x="395969" y="1168692"/>
-            <a:ext cx="647700" cy="503238"/>
+            <a:ext cx="647700" cy="463648"/>
           </a:xfrm>
         </p:spPr>
         <p:txBody>
@@ -6261,7 +6261,7 @@
         <p:spPr>
           <a:xfrm>
             <a:off x="249238" y="688190"/>
-            <a:ext cx="1093446" cy="292388"/>
+            <a:ext cx="1296000" cy="307777"/>
           </a:xfrm>
           <a:prstGeom prst="rect">
             <a:avLst/>
@@ -6275,7 +6275,7 @@
           <a:lstStyle/>
           <a:p>
             <a:r>
-              <a:rPr lang="fr-FR" sz="1300" b="1" dirty="0" smtClean="0">
+              <a:rPr lang="fr-FR" sz="1400" b="1" dirty="0" smtClean="0">
                 <a:solidFill>
                   <a:schemeClr val="bg1"/>
                 </a:solidFill>
@@ -6300,14 +6300,54 @@
       </p:sp>
       <p:sp>
         <p:nvSpPr>
-          <p:cNvPr id="9" name="ZoneTexte 8"/>
+          <p:cNvPr id="10" name="Espace réservé du texte 5"/>
+          <p:cNvSpPr>
+            <a:spLocks noGrp="1"/>
+          </p:cNvSpPr>
+          <p:nvPr>
+            <p:ph type="body" sz="quarter" idx="11" hasCustomPrompt="1"/>
+          </p:nvPr>
+        </p:nvSpPr>
+        <p:spPr>
+          <a:xfrm>
+            <a:off x="1980084" y="1165152"/>
+            <a:ext cx="647700" cy="463648"/>
+          </a:xfrm>
+        </p:spPr>
+        <p:txBody>
+          <a:bodyPr anchor="ctr">
+            <a:normAutofit/>
+          </a:bodyPr>
+          <a:lstStyle>
+            <a:lvl1pPr marL="0" indent="0" algn="ctr">
+              <a:buNone/>
+              <a:defRPr sz="3200" b="1">
+                <a:solidFill>
+                  <a:schemeClr val="bg1"/>
+                </a:solidFill>
+              </a:defRPr>
+            </a:lvl1pPr>
+          </a:lstStyle>
+          <a:p>
+            <a:pPr lvl="0"/>
+            <a:r>
+              <a:rPr lang="fr-FR" dirty="0" smtClean="0"/>
+              <a:t>#</a:t>
+            </a:r>
+            <a:endParaRPr lang="fr-FR" dirty="0"/>
+          </a:p>
+        </p:txBody>
+      </p:sp>
+      <p:sp>
+        <p:nvSpPr>
+          <p:cNvPr id="11" name="ZoneTexte 10"/>
           <p:cNvSpPr txBox="1"/>
           <p:nvPr userDrawn="1"/>
         </p:nvSpPr>
         <p:spPr>
           <a:xfrm>
-            <a:off x="1587849" y="685888"/>
-            <a:ext cx="1079999" cy="430887"/>
+            <a:off x="262683" y="3384058"/>
+            <a:ext cx="1282555" cy="307777"/>
           </a:xfrm>
           <a:prstGeom prst="rect">
             <a:avLst/>
@@ -6321,121 +6361,20 @@
           <a:lstStyle/>
           <a:p>
             <a:r>
-              <a:rPr lang="fr-FR" sz="1100" b="1" dirty="0" smtClean="0">
+              <a:rPr lang="fr-FR" sz="1400" b="1" dirty="0" smtClean="0">
                 <a:solidFill>
                   <a:schemeClr val="bg1"/>
                 </a:solidFill>
               </a:rPr>
-              <a:t>High </a:t>
-            </a:r>
-            <a:r>
-              <a:rPr lang="fr-FR" sz="1100" b="1" dirty="0" err="1" smtClean="0">
+              <a:t>Light</a:t>
+            </a:r>
+            <a:r>
+              <a:rPr lang="fr-FR" sz="1300" b="1" dirty="0" smtClean="0">
                 <a:solidFill>
                   <a:schemeClr val="bg1"/>
                 </a:solidFill>
               </a:rPr>
-              <a:t>Risks</a:t>
-            </a:r>
-            <a:r>
-              <a:rPr lang="fr-FR" sz="1100" b="1" dirty="0" smtClean="0">
-                <a:solidFill>
-                  <a:schemeClr val="bg1"/>
-                </a:solidFill>
-              </a:rPr>
-              <a:t/>
-            </a:r>
-            <a:br>
-              <a:rPr lang="fr-FR" sz="1100" b="1" dirty="0" smtClean="0">
-                <a:solidFill>
-                  <a:schemeClr val="bg1"/>
-                </a:solidFill>
-              </a:rPr>
-            </a:br>
-            <a:r>
-              <a:rPr lang="fr-FR" sz="1100" b="1" dirty="0" err="1" smtClean="0">
-                <a:solidFill>
-                  <a:schemeClr val="bg1"/>
-                </a:solidFill>
-              </a:rPr>
-              <a:t>Solved</a:t>
-            </a:r>
-            <a:endParaRPr lang="fr-FR" sz="1100" b="1" dirty="0">
-              <a:solidFill>
-                <a:schemeClr val="bg1"/>
-              </a:solidFill>
-            </a:endParaRPr>
-          </a:p>
-        </p:txBody>
-      </p:sp>
-      <p:sp>
-        <p:nvSpPr>
-          <p:cNvPr id="10" name="Espace réservé du texte 5"/>
-          <p:cNvSpPr>
-            <a:spLocks noGrp="1"/>
-          </p:cNvSpPr>
-          <p:nvPr>
-            <p:ph type="body" sz="quarter" idx="11" hasCustomPrompt="1"/>
-          </p:nvPr>
-        </p:nvSpPr>
-        <p:spPr>
-          <a:xfrm>
-            <a:off x="1825886" y="1302602"/>
-            <a:ext cx="647700" cy="503238"/>
-          </a:xfrm>
-        </p:spPr>
-        <p:txBody>
-          <a:bodyPr anchor="ctr">
-            <a:normAutofit/>
-          </a:bodyPr>
-          <a:lstStyle>
-            <a:lvl1pPr marL="0" indent="0" algn="ctr">
-              <a:buNone/>
-              <a:defRPr sz="3200" b="1">
-                <a:solidFill>
-                  <a:schemeClr val="bg1"/>
-                </a:solidFill>
-              </a:defRPr>
-            </a:lvl1pPr>
-          </a:lstStyle>
-          <a:p>
-            <a:pPr lvl="0"/>
-            <a:r>
-              <a:rPr lang="fr-FR" dirty="0" smtClean="0"/>
-              <a:t>#</a:t>
-            </a:r>
-            <a:endParaRPr lang="fr-FR" dirty="0"/>
-          </a:p>
-        </p:txBody>
-      </p:sp>
-      <p:sp>
-        <p:nvSpPr>
-          <p:cNvPr id="11" name="ZoneTexte 10"/>
-          <p:cNvSpPr txBox="1"/>
-          <p:nvPr userDrawn="1"/>
-        </p:nvSpPr>
-        <p:spPr>
-          <a:xfrm>
-            <a:off x="249238" y="2169000"/>
-            <a:ext cx="1093445" cy="292388"/>
-          </a:xfrm>
-          <a:prstGeom prst="rect">
-            <a:avLst/>
-          </a:prstGeom>
-          <a:noFill/>
-        </p:spPr>
-        <p:txBody>
-          <a:bodyPr wrap="square" rtlCol="0">
-            <a:spAutoFit/>
-          </a:bodyPr>
-          <a:lstStyle/>
-          <a:p>
-            <a:r>
-              <a:rPr lang="fr-FR" sz="1300" b="1" dirty="0" smtClean="0">
-                <a:solidFill>
-                  <a:schemeClr val="bg1"/>
-                </a:solidFill>
-              </a:rPr>
-              <a:t>Light </a:t>
+              <a:t> </a:t>
             </a:r>
             <a:r>
               <a:rPr lang="fr-FR" sz="1300" b="1" dirty="0" err="1" smtClean="0">
@@ -6455,75 +6394,6 @@
       </p:sp>
       <p:sp>
         <p:nvSpPr>
-          <p:cNvPr id="12" name="ZoneTexte 11"/>
-          <p:cNvSpPr txBox="1"/>
-          <p:nvPr userDrawn="1"/>
-        </p:nvSpPr>
-        <p:spPr>
-          <a:xfrm>
-            <a:off x="1587849" y="2186572"/>
-            <a:ext cx="1080000" cy="430887"/>
-          </a:xfrm>
-          <a:prstGeom prst="rect">
-            <a:avLst/>
-          </a:prstGeom>
-          <a:noFill/>
-        </p:spPr>
-        <p:txBody>
-          <a:bodyPr wrap="square" rtlCol="0">
-            <a:spAutoFit/>
-          </a:bodyPr>
-          <a:lstStyle/>
-          <a:p>
-            <a:r>
-              <a:rPr lang="fr-FR" sz="1100" b="1" dirty="0" smtClean="0">
-                <a:solidFill>
-                  <a:schemeClr val="bg1"/>
-                </a:solidFill>
-              </a:rPr>
-              <a:t>Light </a:t>
-            </a:r>
-            <a:r>
-              <a:rPr lang="fr-FR" sz="1100" b="1" dirty="0" err="1" smtClean="0">
-                <a:solidFill>
-                  <a:schemeClr val="bg1"/>
-                </a:solidFill>
-              </a:rPr>
-              <a:t>Risks</a:t>
-            </a:r>
-            <a:r>
-              <a:rPr lang="fr-FR" sz="1100" b="1" dirty="0" smtClean="0">
-                <a:solidFill>
-                  <a:schemeClr val="bg1"/>
-                </a:solidFill>
-              </a:rPr>
-              <a:t/>
-            </a:r>
-            <a:br>
-              <a:rPr lang="fr-FR" sz="1100" b="1" dirty="0" smtClean="0">
-                <a:solidFill>
-                  <a:schemeClr val="bg1"/>
-                </a:solidFill>
-              </a:rPr>
-            </a:br>
-            <a:r>
-              <a:rPr lang="fr-FR" sz="1100" b="1" dirty="0" err="1" smtClean="0">
-                <a:solidFill>
-                  <a:schemeClr val="bg1"/>
-                </a:solidFill>
-              </a:rPr>
-              <a:t>Solved</a:t>
-            </a:r>
-            <a:endParaRPr lang="fr-FR" sz="1100" b="1" dirty="0">
-              <a:solidFill>
-                <a:schemeClr val="bg1"/>
-              </a:solidFill>
-            </a:endParaRPr>
-          </a:p>
-        </p:txBody>
-      </p:sp>
-      <p:sp>
-        <p:nvSpPr>
           <p:cNvPr id="13" name="Espace réservé du texte 5"/>
           <p:cNvSpPr>
             <a:spLocks noGrp="1"/>
@@ -6534,8 +6404,8 @@
         </p:nvSpPr>
         <p:spPr>
           <a:xfrm>
-            <a:off x="395969" y="2617145"/>
-            <a:ext cx="647700" cy="503238"/>
+            <a:off x="409414" y="3832203"/>
+            <a:ext cx="647700" cy="455430"/>
           </a:xfrm>
         </p:spPr>
         <p:txBody>
@@ -6574,8 +6444,8 @@
         </p:nvSpPr>
         <p:spPr>
           <a:xfrm>
-            <a:off x="1825886" y="2742762"/>
-            <a:ext cx="647700" cy="503238"/>
+            <a:off x="2065825" y="3846709"/>
+            <a:ext cx="647700" cy="455430"/>
           </a:xfrm>
         </p:spPr>
         <p:txBody>
@@ -6610,7 +6480,7 @@
         </p:nvSpPr>
         <p:spPr>
           <a:xfrm>
-            <a:off x="282657" y="4077072"/>
+            <a:off x="262683" y="4690011"/>
             <a:ext cx="2385191" cy="323165"/>
           </a:xfrm>
           <a:prstGeom prst="rect">
@@ -6686,7 +6556,7 @@
         </p:nvSpPr>
         <p:spPr>
           <a:xfrm>
-            <a:off x="492516" y="5120317"/>
+            <a:off x="472542" y="5691323"/>
             <a:ext cx="647700" cy="503238"/>
           </a:xfrm>
         </p:spPr>
@@ -6722,7 +6592,7 @@
         </p:nvSpPr>
         <p:spPr>
           <a:xfrm>
-            <a:off x="253960" y="4651251"/>
+            <a:off x="233986" y="5222257"/>
             <a:ext cx="1080000" cy="369332"/>
           </a:xfrm>
           <a:prstGeom prst="rect">
@@ -6738,12 +6608,12 @@
           <a:p>
             <a:pPr algn="ctr"/>
             <a:r>
-              <a:rPr lang="fr-FR" b="1" dirty="0" smtClean="0">
+              <a:rPr lang="fr-FR" b="1" dirty="0" err="1" smtClean="0">
                 <a:solidFill>
                   <a:schemeClr val="bg1"/>
                 </a:solidFill>
               </a:rPr>
-              <a:t>B2B</a:t>
+              <a:t>eIoT</a:t>
             </a:r>
             <a:endParaRPr lang="fr-FR" b="1" dirty="0">
               <a:solidFill>
@@ -6761,7 +6631,7 @@
         </p:nvSpPr>
         <p:spPr>
           <a:xfrm>
-            <a:off x="1587847" y="4648949"/>
+            <a:off x="1567873" y="5219955"/>
             <a:ext cx="1051303" cy="369332"/>
           </a:xfrm>
           <a:prstGeom prst="rect">
@@ -6804,7 +6674,7 @@
         </p:nvSpPr>
         <p:spPr>
           <a:xfrm>
-            <a:off x="1825886" y="5118015"/>
+            <a:off x="1805912" y="5689021"/>
             <a:ext cx="647700" cy="503238"/>
           </a:xfrm>
         </p:spPr>
@@ -6965,7 +6835,7 @@
         <p:spPr>
           <a:xfrm>
             <a:off x="3635895" y="3825915"/>
-            <a:ext cx="2828367" cy="323165"/>
+            <a:ext cx="3240361" cy="323165"/>
           </a:xfrm>
           <a:prstGeom prst="rect">
             <a:avLst/>
@@ -6979,34 +6849,64 @@
           <a:lstStyle/>
           <a:p>
             <a:r>
-              <a:rPr lang="fr-FR" sz="1500" b="1" dirty="0" err="1" smtClean="0">
+              <a:rPr lang="fr-FR" sz="1500" b="1" dirty="0" smtClean="0">
                 <a:solidFill>
                   <a:schemeClr val="accent4">
                     <a:lumMod val="50000"/>
                   </a:schemeClr>
                 </a:solidFill>
               </a:rPr>
-              <a:t>Objects</a:t>
-            </a:r>
-            <a:r>
-              <a:rPr lang="fr-FR" sz="1500" b="1" dirty="0" smtClean="0">
+              <a:t>Top 5 </a:t>
+            </a:r>
+            <a:r>
+              <a:rPr lang="fr-FR" sz="1500" b="1" dirty="0" err="1" smtClean="0">
                 <a:solidFill>
                   <a:schemeClr val="accent4">
                     <a:lumMod val="50000"/>
                   </a:schemeClr>
                 </a:solidFill>
               </a:rPr>
-              <a:t> Phase </a:t>
-            </a:r>
-            <a:r>
-              <a:rPr lang="fr-FR" sz="1500" b="1" dirty="0" err="1" smtClean="0">
+              <a:t>most</a:t>
+            </a:r>
+            <a:r>
+              <a:rPr lang="fr-FR" sz="1500" b="1" dirty="0" smtClean="0">
                 <a:solidFill>
                   <a:schemeClr val="accent4">
                     <a:lumMod val="50000"/>
                   </a:schemeClr>
                 </a:solidFill>
               </a:rPr>
-              <a:t>Overview</a:t>
+              <a:t> </a:t>
+            </a:r>
+            <a:r>
+              <a:rPr lang="fr-FR" sz="1500" b="1" dirty="0" err="1" smtClean="0">
+                <a:solidFill>
+                  <a:schemeClr val="accent4">
+                    <a:lumMod val="50000"/>
+                  </a:schemeClr>
+                </a:solidFill>
+              </a:rPr>
+              <a:t>vulnerable</a:t>
+            </a:r>
+            <a:r>
+              <a:rPr lang="fr-FR" sz="1500" b="1" dirty="0" smtClean="0">
+                <a:solidFill>
+                  <a:schemeClr val="accent4">
+                    <a:lumMod val="50000"/>
+                  </a:schemeClr>
+                </a:solidFill>
+              </a:rPr>
+              <a:t> </a:t>
+            </a:r>
+            <a:r>
+              <a:rPr lang="fr-FR" sz="1500" b="1" dirty="0" err="1" smtClean="0">
+                <a:solidFill>
+                  <a:schemeClr val="accent4">
+                    <a:lumMod val="50000"/>
+                  </a:schemeClr>
+                </a:solidFill>
+              </a:rPr>
+              <a:t>Devices</a:t>
             </a:r>
             <a:endParaRPr lang="fr-FR" sz="1500" b="1" dirty="0">
               <a:solidFill>
@@ -7026,7 +6926,7 @@
         </p:nvSpPr>
         <p:spPr>
           <a:xfrm>
-            <a:off x="3635895" y="657563"/>
+            <a:off x="3635895" y="657412"/>
             <a:ext cx="2828367" cy="323165"/>
           </a:xfrm>
           <a:prstGeom prst="rect">
@@ -7067,6 +6967,374 @@
                 </a:schemeClr>
               </a:solidFill>
             </a:endParaRPr>
+          </a:p>
+        </p:txBody>
+      </p:sp>
+      <p:sp>
+        <p:nvSpPr>
+          <p:cNvPr id="26" name="Rectangle 25"/>
+          <p:cNvSpPr/>
+          <p:nvPr userDrawn="1"/>
+        </p:nvSpPr>
+        <p:spPr>
+          <a:xfrm>
+            <a:off x="249238" y="2000304"/>
+            <a:ext cx="1299600" cy="1080000"/>
+          </a:xfrm>
+          <a:prstGeom prst="rect">
+            <a:avLst/>
+          </a:prstGeom>
+          <a:solidFill>
+            <a:srgbClr val="0070C0"/>
+          </a:solidFill>
+          <a:ln>
+            <a:solidFill>
+              <a:srgbClr val="00B0F0"/>
+            </a:solidFill>
+          </a:ln>
+        </p:spPr>
+        <p:style>
+          <a:lnRef idx="2">
+            <a:schemeClr val="accent1">
+              <a:shade val="50000"/>
+            </a:schemeClr>
+          </a:lnRef>
+          <a:fillRef idx="1">
+            <a:schemeClr val="accent1"/>
+          </a:fillRef>
+          <a:effectRef idx="0">
+            <a:schemeClr val="accent1"/>
+          </a:effectRef>
+          <a:fontRef idx="minor">
+            <a:schemeClr val="lt1"/>
+          </a:fontRef>
+        </p:style>
+        <p:txBody>
+          <a:bodyPr rtlCol="0" anchor="ctr"/>
+          <a:lstStyle/>
+          <a:p>
+            <a:pPr algn="ctr"/>
+            <a:endParaRPr lang="fr-FR"/>
+          </a:p>
+        </p:txBody>
+      </p:sp>
+      <p:sp>
+        <p:nvSpPr>
+          <p:cNvPr id="27" name="Rectangle 26"/>
+          <p:cNvSpPr/>
+          <p:nvPr userDrawn="1"/>
+        </p:nvSpPr>
+        <p:spPr>
+          <a:xfrm>
+            <a:off x="1768629" y="2000304"/>
+            <a:ext cx="1080000" cy="1080000"/>
+          </a:xfrm>
+          <a:prstGeom prst="rect">
+            <a:avLst/>
+          </a:prstGeom>
+          <a:solidFill>
+            <a:srgbClr val="0070C0"/>
+          </a:solidFill>
+          <a:ln>
+            <a:solidFill>
+              <a:srgbClr val="00B0F0"/>
+            </a:solidFill>
+          </a:ln>
+        </p:spPr>
+        <p:style>
+          <a:lnRef idx="2">
+            <a:schemeClr val="accent1">
+              <a:shade val="50000"/>
+            </a:schemeClr>
+          </a:lnRef>
+          <a:fillRef idx="1">
+            <a:schemeClr val="accent1"/>
+          </a:fillRef>
+          <a:effectRef idx="0">
+            <a:schemeClr val="accent1"/>
+          </a:effectRef>
+          <a:fontRef idx="minor">
+            <a:schemeClr val="lt1"/>
+          </a:fontRef>
+        </p:style>
+        <p:txBody>
+          <a:bodyPr rtlCol="0" anchor="ctr"/>
+          <a:lstStyle/>
+          <a:p>
+            <a:pPr algn="ctr"/>
+            <a:endParaRPr lang="fr-FR"/>
+          </a:p>
+        </p:txBody>
+      </p:sp>
+      <p:sp>
+        <p:nvSpPr>
+          <p:cNvPr id="28" name="ZoneTexte 27"/>
+          <p:cNvSpPr txBox="1"/>
+          <p:nvPr userDrawn="1"/>
+        </p:nvSpPr>
+        <p:spPr>
+          <a:xfrm>
+            <a:off x="235793" y="2000304"/>
+            <a:ext cx="1349274" cy="307777"/>
+          </a:xfrm>
+          <a:prstGeom prst="rect">
+            <a:avLst/>
+          </a:prstGeom>
+          <a:noFill/>
+        </p:spPr>
+        <p:txBody>
+          <a:bodyPr wrap="square" rtlCol="0">
+            <a:spAutoFit/>
+          </a:bodyPr>
+          <a:lstStyle/>
+          <a:p>
+            <a:r>
+              <a:rPr lang="fr-FR" sz="1400" b="1" dirty="0" smtClean="0">
+                <a:solidFill>
+                  <a:schemeClr val="bg1"/>
+                </a:solidFill>
+              </a:rPr>
+              <a:t>Medium</a:t>
+            </a:r>
+            <a:r>
+              <a:rPr lang="fr-FR" sz="1300" b="1" baseline="0" dirty="0" smtClean="0">
+                <a:solidFill>
+                  <a:schemeClr val="bg1"/>
+                </a:solidFill>
+              </a:rPr>
+              <a:t> </a:t>
+            </a:r>
+            <a:r>
+              <a:rPr lang="fr-FR" sz="1300" b="1" dirty="0" err="1" smtClean="0">
+                <a:solidFill>
+                  <a:schemeClr val="bg1"/>
+                </a:solidFill>
+              </a:rPr>
+              <a:t>Risks</a:t>
+            </a:r>
+            <a:endParaRPr lang="fr-FR" sz="1300" b="1" dirty="0">
+              <a:solidFill>
+                <a:schemeClr val="bg1"/>
+              </a:solidFill>
+            </a:endParaRPr>
+          </a:p>
+        </p:txBody>
+      </p:sp>
+      <p:sp>
+        <p:nvSpPr>
+          <p:cNvPr id="29" name="ZoneTexte 28"/>
+          <p:cNvSpPr txBox="1"/>
+          <p:nvPr userDrawn="1"/>
+        </p:nvSpPr>
+        <p:spPr>
+          <a:xfrm>
+            <a:off x="1805912" y="2016261"/>
+            <a:ext cx="979502" cy="261610"/>
+          </a:xfrm>
+          <a:prstGeom prst="rect">
+            <a:avLst/>
+          </a:prstGeom>
+          <a:noFill/>
+        </p:spPr>
+        <p:txBody>
+          <a:bodyPr wrap="square" rtlCol="0">
+            <a:spAutoFit/>
+          </a:bodyPr>
+          <a:lstStyle/>
+          <a:p>
+            <a:r>
+              <a:rPr lang="fr-FR" sz="1100" b="1" dirty="0" smtClean="0">
+                <a:solidFill>
+                  <a:schemeClr val="bg1"/>
+                </a:solidFill>
+              </a:rPr>
+              <a:t>Last </a:t>
+            </a:r>
+            <a:r>
+              <a:rPr lang="fr-FR" sz="1100" b="1" dirty="0" err="1" smtClean="0">
+                <a:solidFill>
+                  <a:schemeClr val="bg1"/>
+                </a:solidFill>
+              </a:rPr>
+              <a:t>month</a:t>
+            </a:r>
+            <a:endParaRPr lang="fr-FR" sz="1100" b="1" dirty="0">
+              <a:solidFill>
+                <a:schemeClr val="bg1"/>
+              </a:solidFill>
+            </a:endParaRPr>
+          </a:p>
+        </p:txBody>
+      </p:sp>
+      <p:sp>
+        <p:nvSpPr>
+          <p:cNvPr id="32" name="ZoneTexte 31"/>
+          <p:cNvSpPr txBox="1"/>
+          <p:nvPr userDrawn="1"/>
+        </p:nvSpPr>
+        <p:spPr>
+          <a:xfrm>
+            <a:off x="1805912" y="688190"/>
+            <a:ext cx="979502" cy="261610"/>
+          </a:xfrm>
+          <a:prstGeom prst="rect">
+            <a:avLst/>
+          </a:prstGeom>
+          <a:noFill/>
+        </p:spPr>
+        <p:txBody>
+          <a:bodyPr wrap="square" rtlCol="0">
+            <a:spAutoFit/>
+          </a:bodyPr>
+          <a:lstStyle/>
+          <a:p>
+            <a:r>
+              <a:rPr lang="fr-FR" sz="1100" b="1" dirty="0" smtClean="0">
+                <a:solidFill>
+                  <a:schemeClr val="bg1"/>
+                </a:solidFill>
+              </a:rPr>
+              <a:t>Last </a:t>
+            </a:r>
+            <a:r>
+              <a:rPr lang="fr-FR" sz="1100" b="1" dirty="0" err="1" smtClean="0">
+                <a:solidFill>
+                  <a:schemeClr val="bg1"/>
+                </a:solidFill>
+              </a:rPr>
+              <a:t>month</a:t>
+            </a:r>
+            <a:endParaRPr lang="fr-FR" sz="1100" b="1" dirty="0">
+              <a:solidFill>
+                <a:schemeClr val="bg1"/>
+              </a:solidFill>
+            </a:endParaRPr>
+          </a:p>
+        </p:txBody>
+      </p:sp>
+      <p:sp>
+        <p:nvSpPr>
+          <p:cNvPr id="33" name="ZoneTexte 32"/>
+          <p:cNvSpPr txBox="1"/>
+          <p:nvPr userDrawn="1"/>
+        </p:nvSpPr>
+        <p:spPr>
+          <a:xfrm>
+            <a:off x="1805912" y="3398888"/>
+            <a:ext cx="979502" cy="261610"/>
+          </a:xfrm>
+          <a:prstGeom prst="rect">
+            <a:avLst/>
+          </a:prstGeom>
+          <a:noFill/>
+        </p:spPr>
+        <p:txBody>
+          <a:bodyPr wrap="square" rtlCol="0">
+            <a:spAutoFit/>
+          </a:bodyPr>
+          <a:lstStyle/>
+          <a:p>
+            <a:r>
+              <a:rPr lang="fr-FR" sz="1100" b="1" dirty="0" smtClean="0">
+                <a:solidFill>
+                  <a:schemeClr val="bg1"/>
+                </a:solidFill>
+              </a:rPr>
+              <a:t>Last </a:t>
+            </a:r>
+            <a:r>
+              <a:rPr lang="fr-FR" sz="1100" b="1" dirty="0" err="1" smtClean="0">
+                <a:solidFill>
+                  <a:schemeClr val="bg1"/>
+                </a:solidFill>
+              </a:rPr>
+              <a:t>month</a:t>
+            </a:r>
+            <a:endParaRPr lang="fr-FR" sz="1100" b="1" dirty="0">
+              <a:solidFill>
+                <a:schemeClr val="bg1"/>
+              </a:solidFill>
+            </a:endParaRPr>
+          </a:p>
+        </p:txBody>
+      </p:sp>
+      <p:sp>
+        <p:nvSpPr>
+          <p:cNvPr id="3" name="Espace réservé du contenu 2"/>
+          <p:cNvSpPr>
+            <a:spLocks noGrp="1"/>
+          </p:cNvSpPr>
+          <p:nvPr>
+            <p:ph sz="quarter" idx="18" hasCustomPrompt="1"/>
+          </p:nvPr>
+        </p:nvSpPr>
+        <p:spPr>
+          <a:xfrm>
+            <a:off x="395969" y="2477088"/>
+            <a:ext cx="648000" cy="464400"/>
+          </a:xfrm>
+        </p:spPr>
+        <p:txBody>
+          <a:bodyPr anchor="ctr">
+            <a:noAutofit/>
+          </a:bodyPr>
+          <a:lstStyle>
+            <a:lvl1pPr marL="0" indent="0" algn="ctr">
+              <a:buNone/>
+              <a:defRPr sz="3600" b="1">
+                <a:solidFill>
+                  <a:schemeClr val="bg1"/>
+                </a:solidFill>
+              </a:defRPr>
+            </a:lvl1pPr>
+          </a:lstStyle>
+          <a:p>
+            <a:pPr lvl="0"/>
+            <a:r>
+              <a:rPr lang="fr-FR" dirty="0" smtClean="0"/>
+              <a:t>#</a:t>
+            </a:r>
+            <a:endParaRPr lang="fr-FR" dirty="0"/>
+          </a:p>
+        </p:txBody>
+      </p:sp>
+      <p:sp>
+        <p:nvSpPr>
+          <p:cNvPr id="40" name="Espace réservé du texte 5"/>
+          <p:cNvSpPr>
+            <a:spLocks noGrp="1"/>
+          </p:cNvSpPr>
+          <p:nvPr>
+            <p:ph type="body" sz="quarter" idx="19" hasCustomPrompt="1"/>
+          </p:nvPr>
+        </p:nvSpPr>
+        <p:spPr>
+          <a:xfrm>
+            <a:off x="1980084" y="2491299"/>
+            <a:ext cx="647700" cy="463648"/>
+          </a:xfrm>
+        </p:spPr>
+        <p:txBody>
+          <a:bodyPr anchor="ctr">
+            <a:normAutofit/>
+          </a:bodyPr>
+          <a:lstStyle>
+            <a:lvl1pPr marL="0" indent="0" algn="ctr">
+              <a:buNone/>
+              <a:defRPr sz="3200" b="1">
+                <a:solidFill>
+                  <a:schemeClr val="bg1"/>
+                </a:solidFill>
+              </a:defRPr>
+            </a:lvl1pPr>
+          </a:lstStyle>
+          <a:p>
+            <a:pPr lvl="0"/>
+            <a:r>
+              <a:rPr lang="fr-FR" dirty="0" smtClean="0"/>
+              <a:t>#</a:t>
+            </a:r>
+            <a:endParaRPr lang="fr-FR" dirty="0"/>
           </a:p>
         </p:txBody>
       </p:sp>
@@ -10281,7 +10549,12 @@
             <p:ph type="body" sz="quarter" idx="10"/>
           </p:nvPr>
         </p:nvSpPr>
-        <p:spPr/>
+        <p:spPr>
+          <a:xfrm>
+            <a:off x="395968" y="1168692"/>
+            <a:ext cx="1007679" cy="463648"/>
+          </a:xfrm>
+        </p:spPr>
         <p:txBody>
           <a:bodyPr/>
           <a:lstStyle/>
@@ -10300,7 +10573,38 @@
             <p:ph type="body" sz="quarter" idx="11"/>
           </p:nvPr>
         </p:nvSpPr>
-        <p:spPr/>
+        <p:spPr>
+          <a:xfrm>
+            <a:off x="1907704" y="1165152"/>
+            <a:ext cx="720080" cy="463648"/>
+          </a:xfrm>
+        </p:spPr>
+        <p:txBody>
+          <a:bodyPr>
+            <a:normAutofit lnSpcReduction="10000"/>
+          </a:bodyPr>
+          <a:lstStyle/>
+          <a:p>
+            <a:endParaRPr lang="fr-FR"/>
+          </a:p>
+        </p:txBody>
+      </p:sp>
+      <p:sp>
+        <p:nvSpPr>
+          <p:cNvPr id="4" name="Espace réservé du texte 3"/>
+          <p:cNvSpPr>
+            <a:spLocks noGrp="1"/>
+          </p:cNvSpPr>
+          <p:nvPr>
+            <p:ph type="body" sz="quarter" idx="12"/>
+          </p:nvPr>
+        </p:nvSpPr>
+        <p:spPr>
+          <a:xfrm>
+            <a:off x="409413" y="3832203"/>
+            <a:ext cx="994233" cy="455430"/>
+          </a:xfrm>
+        </p:spPr>
         <p:txBody>
           <a:bodyPr/>
           <a:lstStyle/>
@@ -10311,15 +10615,46 @@
       </p:sp>
       <p:sp>
         <p:nvSpPr>
-          <p:cNvPr id="4" name="Espace réservé du texte 3"/>
-          <p:cNvSpPr>
-            <a:spLocks noGrp="1"/>
-          </p:cNvSpPr>
-          <p:nvPr>
-            <p:ph type="body" sz="quarter" idx="12"/>
-          </p:nvPr>
-        </p:nvSpPr>
-        <p:spPr/>
+          <p:cNvPr id="5" name="Espace réservé du texte 4"/>
+          <p:cNvSpPr>
+            <a:spLocks noGrp="1"/>
+          </p:cNvSpPr>
+          <p:nvPr>
+            <p:ph type="body" sz="quarter" idx="13"/>
+          </p:nvPr>
+        </p:nvSpPr>
+        <p:spPr>
+          <a:xfrm>
+            <a:off x="1907704" y="3846709"/>
+            <a:ext cx="805821" cy="455430"/>
+          </a:xfrm>
+        </p:spPr>
+        <p:txBody>
+          <a:bodyPr>
+            <a:normAutofit lnSpcReduction="10000"/>
+          </a:bodyPr>
+          <a:lstStyle/>
+          <a:p>
+            <a:endParaRPr lang="fr-FR"/>
+          </a:p>
+        </p:txBody>
+      </p:sp>
+      <p:sp>
+        <p:nvSpPr>
+          <p:cNvPr id="6" name="Espace réservé du texte 5"/>
+          <p:cNvSpPr>
+            <a:spLocks noGrp="1"/>
+          </p:cNvSpPr>
+          <p:nvPr>
+            <p:ph type="body" sz="quarter" idx="14"/>
+          </p:nvPr>
+        </p:nvSpPr>
+        <p:spPr>
+          <a:xfrm>
+            <a:off x="409413" y="5691323"/>
+            <a:ext cx="778211" cy="503238"/>
+          </a:xfrm>
+        </p:spPr>
         <p:txBody>
           <a:bodyPr/>
           <a:lstStyle/>
@@ -10330,15 +10665,20 @@
       </p:sp>
       <p:sp>
         <p:nvSpPr>
-          <p:cNvPr id="5" name="Espace réservé du texte 4"/>
-          <p:cNvSpPr>
-            <a:spLocks noGrp="1"/>
-          </p:cNvSpPr>
-          <p:nvPr>
-            <p:ph type="body" sz="quarter" idx="13"/>
-          </p:nvPr>
-        </p:nvSpPr>
-        <p:spPr/>
+          <p:cNvPr id="7" name="Espace réservé du texte 6"/>
+          <p:cNvSpPr>
+            <a:spLocks noGrp="1"/>
+          </p:cNvSpPr>
+          <p:nvPr>
+            <p:ph type="body" sz="quarter" idx="15"/>
+          </p:nvPr>
+        </p:nvSpPr>
+        <p:spPr>
+          <a:xfrm>
+            <a:off x="1691680" y="5689021"/>
+            <a:ext cx="792088" cy="503238"/>
+          </a:xfrm>
+        </p:spPr>
         <p:txBody>
           <a:bodyPr/>
           <a:lstStyle/>
@@ -10349,15 +10689,20 @@
       </p:sp>
       <p:sp>
         <p:nvSpPr>
-          <p:cNvPr id="6" name="Espace réservé du texte 5"/>
-          <p:cNvSpPr>
-            <a:spLocks noGrp="1"/>
-          </p:cNvSpPr>
-          <p:nvPr>
-            <p:ph type="body" sz="quarter" idx="14"/>
-          </p:nvPr>
-        </p:nvSpPr>
-        <p:spPr/>
+          <p:cNvPr id="8" name="Espace réservé du contenu 7"/>
+          <p:cNvSpPr>
+            <a:spLocks noGrp="1"/>
+          </p:cNvSpPr>
+          <p:nvPr>
+            <p:ph sz="quarter" idx="18"/>
+          </p:nvPr>
+        </p:nvSpPr>
+        <p:spPr>
+          <a:xfrm>
+            <a:off x="395969" y="2477088"/>
+            <a:ext cx="1007678" cy="464400"/>
+          </a:xfrm>
+        </p:spPr>
         <p:txBody>
           <a:bodyPr/>
           <a:lstStyle/>
@@ -10368,17 +10713,24 @@
       </p:sp>
       <p:sp>
         <p:nvSpPr>
-          <p:cNvPr id="7" name="Espace réservé du texte 6"/>
-          <p:cNvSpPr>
-            <a:spLocks noGrp="1"/>
-          </p:cNvSpPr>
-          <p:nvPr>
-            <p:ph type="body" sz="quarter" idx="15"/>
-          </p:nvPr>
-        </p:nvSpPr>
-        <p:spPr/>
-        <p:txBody>
-          <a:bodyPr/>
+          <p:cNvPr id="9" name="Espace réservé du texte 8"/>
+          <p:cNvSpPr>
+            <a:spLocks noGrp="1"/>
+          </p:cNvSpPr>
+          <p:nvPr>
+            <p:ph type="body" sz="quarter" idx="19"/>
+          </p:nvPr>
+        </p:nvSpPr>
+        <p:spPr>
+          <a:xfrm>
+            <a:off x="1907704" y="2491299"/>
+            <a:ext cx="720080" cy="463648"/>
+          </a:xfrm>
+        </p:spPr>
+        <p:txBody>
+          <a:bodyPr>
+            <a:normAutofit lnSpcReduction="10000"/>
+          </a:bodyPr>
           <a:lstStyle/>
           <a:p>
             <a:endParaRPr lang="fr-FR"/>
@@ -10388,20 +10740,13 @@
     </p:spTree>
     <p:extLst>
       <p:ext uri="{BB962C8B-B14F-4D97-AF65-F5344CB8AC3E}">
-        <p14:creationId xmlns:p14="http://schemas.microsoft.com/office/powerpoint/2010/main" val="1867223610"/>
+        <p14:creationId xmlns:p14="http://schemas.microsoft.com/office/powerpoint/2010/main" val="1116577025"/>
       </p:ext>
     </p:extLst>
   </p:cSld>
   <p:clrMapOvr>
     <a:masterClrMapping/>
   </p:clrMapOvr>
-  <p:timing>
-    <p:tnLst>
-      <p:par>
-        <p:cTn id="1" dur="indefinite" restart="never" nodeType="tmRoot"/>
-      </p:par>
-    </p:tnLst>
-  </p:timing>
 </p:sld>
 </file>
 
@@ -10489,20 +10834,13 @@
   <p:clrMapOvr>
     <a:masterClrMapping/>
   </p:clrMapOvr>
-  <p:timing>
-    <p:tnLst>
-      <p:par>
-        <p:cTn id="1" dur="indefinite" restart="never" nodeType="tmRoot"/>
-      </p:par>
-    </p:tnLst>
-  </p:timing>
 </p:sld>
 </file>
 
 <file path=ppt/theme/theme1.xml><?xml version="1.0" encoding="utf-8"?>
 <a:theme xmlns:a="http://schemas.openxmlformats.org/drawingml/2006/main" name="blank">
   <a:themeElements>
-    <a:clrScheme name="Blue Warm">
+    <a:clrScheme name="Orange 00">
       <a:dk1>
         <a:sysClr val="windowText" lastClr="000000"/>
       </a:dk1>
@@ -10510,34 +10848,34 @@
         <a:sysClr val="window" lastClr="FFFFFF"/>
       </a:lt1>
       <a:dk2>
-        <a:srgbClr val="242852"/>
+        <a:srgbClr val="000000"/>
       </a:dk2>
       <a:lt2>
-        <a:srgbClr val="ACCBF9"/>
+        <a:srgbClr val="F8F8F8"/>
       </a:lt2>
       <a:accent1>
-        <a:srgbClr val="4A66AC"/>
+        <a:srgbClr val="FF6600"/>
       </a:accent1>
       <a:accent2>
-        <a:srgbClr val="629DD1"/>
+        <a:srgbClr val="B2B2B2"/>
       </a:accent2>
       <a:accent3>
-        <a:srgbClr val="297FD5"/>
+        <a:srgbClr val="969696"/>
       </a:accent3>
       <a:accent4>
-        <a:srgbClr val="7F8FA9"/>
+        <a:srgbClr val="808080"/>
       </a:accent4>
       <a:accent5>
-        <a:srgbClr val="5AA2AE"/>
+        <a:srgbClr val="5F5F5F"/>
       </a:accent5>
       <a:accent6>
-        <a:srgbClr val="9D90A0"/>
+        <a:srgbClr val="4D4D4D"/>
       </a:accent6>
       <a:hlink>
-        <a:srgbClr val="9454C3"/>
+        <a:srgbClr val="5F5F5F"/>
       </a:hlink>
       <a:folHlink>
-        <a:srgbClr val="3EBBF0"/>
+        <a:srgbClr val="919191"/>
       </a:folHlink>
     </a:clrScheme>
     <a:fontScheme name="Orange standard">
@@ -10723,7 +11061,7 @@
   <a:extraClrSchemeLst/>
   <a:extLst>
     <a:ext uri="{05A4C25C-085E-4340-85A3-A5531E510DB2}">
-      <thm15:themeFamily xmlns:thm15="http://schemas.microsoft.com/office/thememl/2012/main" name="Présentation8" id="{8E42F6AB-5C9E-D14B-A99B-AB26959BE645}" vid="{29BB490C-A99F-8049-BC08-32BCB963A19E}"/>
+      <thm15:themeFamily xmlns:thm15="http://schemas.microsoft.com/office/thememl/2012/main" name="Présentation4" id="{777F971E-405A-2D4B-B522-4D1E6BDAB4B6}" vid="{A469C8F1-1DA4-974E-9396-4B8754DC5AF5}"/>
     </a:ext>
   </a:extLst>
 </a:theme>

</xml_diff>

<commit_message>
:bugs: Solve new year problem on file name
Solve the "month-1" problem when moving from one year to the next one.
That was a known bug that was pushed back until new year.
</commit_message>
<xml_diff>
--- a/Templates/SecurityReport.pptx
+++ b/Templates/SecurityReport.pptx
@@ -8,7 +8,7 @@
     <p:notesMasterId r:id="rId4"/>
   </p:notesMasterIdLst>
   <p:sldIdLst>
-    <p:sldId id="283" r:id="rId2"/>
+    <p:sldId id="282" r:id="rId2"/>
     <p:sldId id="281" r:id="rId3"/>
   </p:sldIdLst>
   <p:sldSz cx="9144000" cy="6858000" type="screen4x3"/>
@@ -116,7 +116,7 @@
         </p14:section>
         <p14:section name="contenu du diaporama" id="{7C415485-64F3-4240-AEC1-14455B505EAE}">
           <p14:sldIdLst>
-            <p14:sldId id="283"/>
+            <p14:sldId id="282"/>
             <p14:sldId id="281"/>
           </p14:sldIdLst>
         </p14:section>
@@ -126,7 +126,7 @@
       </p14:sectionLst>
     </p:ext>
     <p:ext uri="{EFAFB233-063F-42B5-8137-9DF3F51BA10A}">
-      <p15:sldGuideLst xmlns:p15="http://schemas.microsoft.com/office/powerpoint/2012/main">
+      <p15:sldGuideLst xmlns="" xmlns:p15="http://schemas.microsoft.com/office/powerpoint/2012/main">
         <p15:guide id="1" orient="horz" pos="2160">
           <p15:clr>
             <a:srgbClr val="A4A3A4"/>
@@ -167,37 +167,6 @@
       </p:grpSpPr>
       <p:sp>
         <p:nvSpPr>
-          <p:cNvPr id="2" name="Espace réservé de l’en-tête 1"/>
-          <p:cNvSpPr>
-            <a:spLocks noGrp="1"/>
-          </p:cNvSpPr>
-          <p:nvPr>
-            <p:ph type="hdr" sz="quarter"/>
-          </p:nvPr>
-        </p:nvSpPr>
-        <p:spPr>
-          <a:xfrm>
-            <a:off x="0" y="0"/>
-            <a:ext cx="2971800" cy="458788"/>
-          </a:xfrm>
-          <a:prstGeom prst="rect">
-            <a:avLst/>
-          </a:prstGeom>
-        </p:spPr>
-        <p:txBody>
-          <a:bodyPr vert="horz" lIns="91440" tIns="45720" rIns="91440" bIns="45720" rtlCol="0"/>
-          <a:lstStyle>
-            <a:lvl1pPr algn="l">
-              <a:defRPr sz="1200"/>
-            </a:lvl1pPr>
-          </a:lstStyle>
-          <a:p>
-            <a:endParaRPr lang="fr-FR"/>
-          </a:p>
-        </p:txBody>
-      </p:sp>
-      <p:sp>
-        <p:nvSpPr>
           <p:cNvPr id="3" name="Espace réservé de la date 2"/>
           <p:cNvSpPr>
             <a:spLocks noGrp="1"/>
@@ -225,7 +194,7 @@
           <a:p>
             <a:fld id="{1A3A36EA-A6A6-3241-96CC-76CD1AE24D79}" type="datetimeFigureOut">
               <a:rPr lang="fr-FR" smtClean="0"/>
-              <a:t>22/08/2017</a:t>
+              <a:t>30/10/2017</a:t>
             </a:fld>
             <a:endParaRPr lang="fr-FR"/>
           </a:p>
@@ -233,7 +202,67 @@
       </p:sp>
       <p:sp>
         <p:nvSpPr>
-          <p:cNvPr id="4" name="Espace réservé de l’image des diapositives 3"/>
+          <p:cNvPr id="5" name="Espace réservé des commentaires 4"/>
+          <p:cNvSpPr>
+            <a:spLocks noGrp="1"/>
+          </p:cNvSpPr>
+          <p:nvPr>
+            <p:ph type="body" sz="quarter" idx="3"/>
+          </p:nvPr>
+        </p:nvSpPr>
+        <p:spPr>
+          <a:xfrm>
+            <a:off x="685800" y="4400550"/>
+            <a:ext cx="5486400" cy="3600450"/>
+          </a:xfrm>
+          <a:prstGeom prst="rect">
+            <a:avLst/>
+          </a:prstGeom>
+        </p:spPr>
+        <p:txBody>
+          <a:bodyPr vert="horz" lIns="91440" tIns="45720" rIns="91440" bIns="45720" rtlCol="0"/>
+          <a:lstStyle/>
+          <a:p>
+            <a:pPr lvl="0"/>
+            <a:r>
+              <a:rPr lang="fr-FR" smtClean="0"/>
+              <a:t>Cliquez pour modifier les styles du texte du masque</a:t>
+            </a:r>
+          </a:p>
+          <a:p>
+            <a:pPr lvl="1"/>
+            <a:r>
+              <a:rPr lang="fr-FR" smtClean="0"/>
+              <a:t>Deuxième niveau</a:t>
+            </a:r>
+          </a:p>
+          <a:p>
+            <a:pPr lvl="2"/>
+            <a:r>
+              <a:rPr lang="fr-FR" smtClean="0"/>
+              <a:t>Troisième niveau</a:t>
+            </a:r>
+          </a:p>
+          <a:p>
+            <a:pPr lvl="3"/>
+            <a:r>
+              <a:rPr lang="fr-FR" smtClean="0"/>
+              <a:t>Quatrième niveau</a:t>
+            </a:r>
+          </a:p>
+          <a:p>
+            <a:pPr lvl="4"/>
+            <a:r>
+              <a:rPr lang="fr-FR" smtClean="0"/>
+              <a:t>Cinquième niveau</a:t>
+            </a:r>
+            <a:endParaRPr lang="fr-FR"/>
+          </a:p>
+        </p:txBody>
+      </p:sp>
+      <p:sp>
+        <p:nvSpPr>
+          <p:cNvPr id="8" name="Espace réservé de l'image des diapositives 7"/>
           <p:cNvSpPr>
             <a:spLocks noGrp="1" noRot="1" noChangeAspect="1"/>
           </p:cNvSpPr>
@@ -243,8 +272,8 @@
         </p:nvSpPr>
         <p:spPr>
           <a:xfrm>
-            <a:off x="1371600" y="1143000"/>
-            <a:ext cx="4114800" cy="3086100"/>
+            <a:off x="1143000" y="685800"/>
+            <a:ext cx="4572000" cy="3429000"/>
           </a:xfrm>
           <a:prstGeom prst="rect">
             <a:avLst/>
@@ -260,132 +289,6 @@
           <a:bodyPr vert="horz" lIns="91440" tIns="45720" rIns="91440" bIns="45720" rtlCol="0" anchor="ctr"/>
           <a:lstStyle/>
           <a:p>
-            <a:endParaRPr lang="fr-FR"/>
-          </a:p>
-        </p:txBody>
-      </p:sp>
-      <p:sp>
-        <p:nvSpPr>
-          <p:cNvPr id="5" name="Espace réservé des commentaires 4"/>
-          <p:cNvSpPr>
-            <a:spLocks noGrp="1"/>
-          </p:cNvSpPr>
-          <p:nvPr>
-            <p:ph type="body" sz="quarter" idx="3"/>
-          </p:nvPr>
-        </p:nvSpPr>
-        <p:spPr>
-          <a:xfrm>
-            <a:off x="685800" y="4400550"/>
-            <a:ext cx="5486400" cy="3600450"/>
-          </a:xfrm>
-          <a:prstGeom prst="rect">
-            <a:avLst/>
-          </a:prstGeom>
-        </p:spPr>
-        <p:txBody>
-          <a:bodyPr vert="horz" lIns="91440" tIns="45720" rIns="91440" bIns="45720" rtlCol="0"/>
-          <a:lstStyle/>
-          <a:p>
-            <a:pPr lvl="0"/>
-            <a:r>
-              <a:rPr lang="fr-FR" smtClean="0"/>
-              <a:t>Cliquez pour modifier les styles du texte du masque</a:t>
-            </a:r>
-          </a:p>
-          <a:p>
-            <a:pPr lvl="1"/>
-            <a:r>
-              <a:rPr lang="fr-FR" smtClean="0"/>
-              <a:t>Deuxième niveau</a:t>
-            </a:r>
-          </a:p>
-          <a:p>
-            <a:pPr lvl="2"/>
-            <a:r>
-              <a:rPr lang="fr-FR" smtClean="0"/>
-              <a:t>Troisième niveau</a:t>
-            </a:r>
-          </a:p>
-          <a:p>
-            <a:pPr lvl="3"/>
-            <a:r>
-              <a:rPr lang="fr-FR" smtClean="0"/>
-              <a:t>Quatrième niveau</a:t>
-            </a:r>
-          </a:p>
-          <a:p>
-            <a:pPr lvl="4"/>
-            <a:r>
-              <a:rPr lang="fr-FR" smtClean="0"/>
-              <a:t>Cinquième niveau</a:t>
-            </a:r>
-            <a:endParaRPr lang="fr-FR"/>
-          </a:p>
-        </p:txBody>
-      </p:sp>
-      <p:sp>
-        <p:nvSpPr>
-          <p:cNvPr id="6" name="Espace réservé du pied de page 5"/>
-          <p:cNvSpPr>
-            <a:spLocks noGrp="1"/>
-          </p:cNvSpPr>
-          <p:nvPr>
-            <p:ph type="ftr" sz="quarter" idx="4"/>
-          </p:nvPr>
-        </p:nvSpPr>
-        <p:spPr>
-          <a:xfrm>
-            <a:off x="0" y="8685213"/>
-            <a:ext cx="2971800" cy="458787"/>
-          </a:xfrm>
-          <a:prstGeom prst="rect">
-            <a:avLst/>
-          </a:prstGeom>
-        </p:spPr>
-        <p:txBody>
-          <a:bodyPr vert="horz" lIns="91440" tIns="45720" rIns="91440" bIns="45720" rtlCol="0" anchor="b"/>
-          <a:lstStyle>
-            <a:lvl1pPr algn="l">
-              <a:defRPr sz="1200"/>
-            </a:lvl1pPr>
-          </a:lstStyle>
-          <a:p>
-            <a:endParaRPr lang="fr-FR"/>
-          </a:p>
-        </p:txBody>
-      </p:sp>
-      <p:sp>
-        <p:nvSpPr>
-          <p:cNvPr id="7" name="Espace réservé du numéro de diapositive 6"/>
-          <p:cNvSpPr>
-            <a:spLocks noGrp="1"/>
-          </p:cNvSpPr>
-          <p:nvPr>
-            <p:ph type="sldNum" sz="quarter" idx="5"/>
-          </p:nvPr>
-        </p:nvSpPr>
-        <p:spPr>
-          <a:xfrm>
-            <a:off x="3884613" y="8685213"/>
-            <a:ext cx="2971800" cy="458787"/>
-          </a:xfrm>
-          <a:prstGeom prst="rect">
-            <a:avLst/>
-          </a:prstGeom>
-        </p:spPr>
-        <p:txBody>
-          <a:bodyPr vert="horz" lIns="91440" tIns="45720" rIns="91440" bIns="45720" rtlCol="0" anchor="b"/>
-          <a:lstStyle>
-            <a:lvl1pPr algn="r">
-              <a:defRPr sz="1200"/>
-            </a:lvl1pPr>
-          </a:lstStyle>
-          <a:p>
-            <a:fld id="{A3EDC824-9D5D-764F-910D-D7AB1C093F9D}" type="slidenum">
-              <a:rPr lang="fr-FR" smtClean="0"/>
-              <a:t>‹#›</a:t>
-            </a:fld>
             <a:endParaRPr lang="fr-FR"/>
           </a:p>
         </p:txBody>
@@ -2229,10 +2132,86 @@
   <p:clrMapOvr>
     <a:masterClrMapping/>
   </p:clrMapOvr>
+  <p:timing>
+    <p:tnLst>
+      <p:par>
+        <p:cTn id="1" dur="indefinite" restart="never" nodeType="tmRoot"/>
+      </p:par>
+    </p:tnLst>
+  </p:timing>
 </p:sldLayout>
 </file>
 
 <file path=ppt/slideLayouts/slideLayout10.xml><?xml version="1.0" encoding="utf-8"?>
+<p:sldLayout xmlns:a="http://schemas.openxmlformats.org/drawingml/2006/main" xmlns:r="http://schemas.openxmlformats.org/officeDocument/2006/relationships" xmlns:p="http://schemas.openxmlformats.org/presentationml/2006/main" preserve="1" userDrawn="1">
+  <p:cSld name="titre seul">
+    <p:spTree>
+      <p:nvGrpSpPr>
+        <p:cNvPr id="1" name=""/>
+        <p:cNvGrpSpPr/>
+        <p:nvPr/>
+      </p:nvGrpSpPr>
+      <p:grpSpPr>
+        <a:xfrm>
+          <a:off x="0" y="0"/>
+          <a:ext cx="0" cy="0"/>
+          <a:chOff x="0" y="0"/>
+          <a:chExt cx="0" cy="0"/>
+        </a:xfrm>
+      </p:grpSpPr>
+      <p:sp>
+        <p:nvSpPr>
+          <p:cNvPr id="2" name="Titre 1"/>
+          <p:cNvSpPr>
+            <a:spLocks noGrp="1"/>
+          </p:cNvSpPr>
+          <p:nvPr>
+            <p:ph type="title" hasCustomPrompt="1"/>
+          </p:nvPr>
+        </p:nvSpPr>
+        <p:spPr>
+          <a:xfrm>
+            <a:off x="1015200" y="404664"/>
+            <a:ext cx="7057405" cy="982800"/>
+          </a:xfrm>
+        </p:spPr>
+        <p:txBody>
+          <a:bodyPr/>
+          <a:lstStyle>
+            <a:lvl1pPr algn="l">
+              <a:defRPr/>
+            </a:lvl1pPr>
+          </a:lstStyle>
+          <a:p>
+            <a:r>
+              <a:rPr lang="fr-FR" dirty="0" smtClean="0"/>
+              <a:t>titre seul</a:t>
+            </a:r>
+            <a:endParaRPr lang="fr-FR" dirty="0"/>
+          </a:p>
+        </p:txBody>
+      </p:sp>
+    </p:spTree>
+    <p:extLst>
+      <p:ext uri="{BB962C8B-B14F-4D97-AF65-F5344CB8AC3E}">
+        <p14:creationId xmlns:p14="http://schemas.microsoft.com/office/powerpoint/2010/main" val="3082467275"/>
+      </p:ext>
+    </p:extLst>
+  </p:cSld>
+  <p:clrMapOvr>
+    <a:masterClrMapping/>
+  </p:clrMapOvr>
+  <p:timing>
+    <p:tnLst>
+      <p:par>
+        <p:cTn id="1" dur="indefinite" restart="never" nodeType="tmRoot"/>
+      </p:par>
+    </p:tnLst>
+  </p:timing>
+</p:sldLayout>
+</file>
+
+<file path=ppt/slideLayouts/slideLayout11.xml><?xml version="1.0" encoding="utf-8"?>
 <p:sldLayout xmlns:a="http://schemas.openxmlformats.org/drawingml/2006/main" xmlns:r="http://schemas.openxmlformats.org/officeDocument/2006/relationships" xmlns:p="http://schemas.openxmlformats.org/presentationml/2006/main" preserve="1" userDrawn="1">
   <p:cSld name="deux colonnes">
     <p:spTree>
@@ -2371,7 +2350,7 @@
 </p:sldLayout>
 </file>
 
-<file path=ppt/slideLayouts/slideLayout11.xml><?xml version="1.0" encoding="utf-8"?>
+<file path=ppt/slideLayouts/slideLayout12.xml><?xml version="1.0" encoding="utf-8"?>
 <p:sldLayout xmlns:a="http://schemas.openxmlformats.org/drawingml/2006/main" xmlns:r="http://schemas.openxmlformats.org/officeDocument/2006/relationships" xmlns:p="http://schemas.openxmlformats.org/presentationml/2006/main" preserve="1" userDrawn="1">
   <p:cSld name="disposition personnalisée">
     <p:spTree>
@@ -2926,7 +2905,7 @@
 </p:sldLayout>
 </file>
 
-<file path=ppt/slideLayouts/slideLayout12.xml><?xml version="1.0" encoding="utf-8"?>
+<file path=ppt/slideLayouts/slideLayout13.xml><?xml version="1.0" encoding="utf-8"?>
 <p:sldLayout xmlns:a="http://schemas.openxmlformats.org/drawingml/2006/main" xmlns:r="http://schemas.openxmlformats.org/officeDocument/2006/relationships" xmlns:p="http://schemas.openxmlformats.org/presentationml/2006/main" preserve="1" userDrawn="1">
   <p:cSld name="chiffres ou point clefs à mettre en valeur">
     <p:spTree>
@@ -3760,7 +3739,7 @@
 </p:sldLayout>
 </file>
 
-<file path=ppt/slideLayouts/slideLayout13.xml><?xml version="1.0" encoding="utf-8"?>
+<file path=ppt/slideLayouts/slideLayout14.xml><?xml version="1.0" encoding="utf-8"?>
 <p:sldLayout xmlns:a="http://schemas.openxmlformats.org/drawingml/2006/main" xmlns:r="http://schemas.openxmlformats.org/officeDocument/2006/relationships" xmlns:p="http://schemas.openxmlformats.org/presentationml/2006/main" preserve="1" userDrawn="1">
   <p:cSld name="chiffres clefs">
     <p:spTree>
@@ -4308,7 +4287,7 @@
 </p:sldLayout>
 </file>
 
-<file path=ppt/slideLayouts/slideLayout14.xml><?xml version="1.0" encoding="utf-8"?>
+<file path=ppt/slideLayouts/slideLayout15.xml><?xml version="1.0" encoding="utf-8"?>
 <p:sldLayout xmlns:a="http://schemas.openxmlformats.org/drawingml/2006/main" xmlns:r="http://schemas.openxmlformats.org/officeDocument/2006/relationships" xmlns:p="http://schemas.openxmlformats.org/presentationml/2006/main" preserve="1" userDrawn="1">
   <p:cSld name="chiffres clefs 2">
     <p:spTree>
@@ -4748,7 +4727,7 @@
 </p:sldLayout>
 </file>
 
-<file path=ppt/slideLayouts/slideLayout15.xml><?xml version="1.0" encoding="utf-8"?>
+<file path=ppt/slideLayouts/slideLayout16.xml><?xml version="1.0" encoding="utf-8"?>
 <p:sldLayout xmlns:a="http://schemas.openxmlformats.org/drawingml/2006/main" xmlns:r="http://schemas.openxmlformats.org/officeDocument/2006/relationships" xmlns:p="http://schemas.openxmlformats.org/presentationml/2006/main" preserve="1" userDrawn="1">
   <p:cSld name="texte visuel et annotation">
     <p:spTree>
@@ -4937,7 +4916,7 @@
 </p:sldLayout>
 </file>
 
-<file path=ppt/slideLayouts/slideLayout16.xml><?xml version="1.0" encoding="utf-8"?>
+<file path=ppt/slideLayouts/slideLayout17.xml><?xml version="1.0" encoding="utf-8"?>
 <p:sldLayout xmlns:a="http://schemas.openxmlformats.org/drawingml/2006/main" xmlns:r="http://schemas.openxmlformats.org/officeDocument/2006/relationships" xmlns:p="http://schemas.openxmlformats.org/presentationml/2006/main" preserve="1" userDrawn="1">
   <p:cSld name="visuel demi page">
     <p:spTree>
@@ -5095,7 +5074,7 @@
 </p:sldLayout>
 </file>
 
-<file path=ppt/slideLayouts/slideLayout17.xml><?xml version="1.0" encoding="utf-8"?>
+<file path=ppt/slideLayouts/slideLayout18.xml><?xml version="1.0" encoding="utf-8"?>
 <p:sldLayout xmlns:a="http://schemas.openxmlformats.org/drawingml/2006/main" xmlns:r="http://schemas.openxmlformats.org/officeDocument/2006/relationships" xmlns:p="http://schemas.openxmlformats.org/presentationml/2006/main" preserve="1" userDrawn="1">
   <p:cSld name="visuels multiples">
     <p:spTree>
@@ -5362,7 +5341,7 @@
 </p:sldLayout>
 </file>
 
-<file path=ppt/slideLayouts/slideLayout18.xml><?xml version="1.0" encoding="utf-8"?>
+<file path=ppt/slideLayouts/slideLayout19.xml><?xml version="1.0" encoding="utf-8"?>
 <p:sldLayout xmlns:a="http://schemas.openxmlformats.org/drawingml/2006/main" xmlns:r="http://schemas.openxmlformats.org/officeDocument/2006/relationships" xmlns:p="http://schemas.openxmlformats.org/presentationml/2006/main" preserve="1" userDrawn="1">
   <p:cSld name="visuels multiples 4">
     <p:spTree>
@@ -5827,7 +5806,1651 @@
 </p:sldLayout>
 </file>
 
-<file path=ppt/slideLayouts/slideLayout19.xml><?xml version="1.0" encoding="utf-8"?>
+<file path=ppt/slideLayouts/slideLayout2.xml><?xml version="1.0" encoding="utf-8"?>
+<p:sldLayout xmlns:a="http://schemas.openxmlformats.org/drawingml/2006/main" xmlns:r="http://schemas.openxmlformats.org/officeDocument/2006/relationships" xmlns:p="http://schemas.openxmlformats.org/presentationml/2006/main" showMasterSp="0" preserve="1" userDrawn="1">
+  <p:cSld name="3_Disposition personnalisée">
+    <p:spTree>
+      <p:nvGrpSpPr>
+        <p:cNvPr id="1" name=""/>
+        <p:cNvGrpSpPr/>
+        <p:nvPr/>
+      </p:nvGrpSpPr>
+      <p:grpSpPr>
+        <a:xfrm>
+          <a:off x="0" y="0"/>
+          <a:ext cx="0" cy="0"/>
+          <a:chOff x="0" y="0"/>
+          <a:chExt cx="0" cy="0"/>
+        </a:xfrm>
+      </p:grpSpPr>
+      <p:sp>
+        <p:nvSpPr>
+          <p:cNvPr id="35" name="Rectangle 34"/>
+          <p:cNvSpPr/>
+          <p:nvPr userDrawn="1"/>
+        </p:nvSpPr>
+        <p:spPr>
+          <a:xfrm>
+            <a:off x="262430" y="3348896"/>
+            <a:ext cx="1296000" cy="1080000"/>
+          </a:xfrm>
+          <a:prstGeom prst="rect">
+            <a:avLst/>
+          </a:prstGeom>
+          <a:solidFill>
+            <a:srgbClr val="0070C0"/>
+          </a:solidFill>
+          <a:ln>
+            <a:solidFill>
+              <a:srgbClr val="00B0F0"/>
+            </a:solidFill>
+          </a:ln>
+        </p:spPr>
+        <p:style>
+          <a:lnRef idx="2">
+            <a:schemeClr val="accent1">
+              <a:shade val="50000"/>
+            </a:schemeClr>
+          </a:lnRef>
+          <a:fillRef idx="1">
+            <a:schemeClr val="accent1"/>
+          </a:fillRef>
+          <a:effectRef idx="0">
+            <a:schemeClr val="accent1"/>
+          </a:effectRef>
+          <a:fontRef idx="minor">
+            <a:schemeClr val="lt1"/>
+          </a:fontRef>
+        </p:style>
+        <p:txBody>
+          <a:bodyPr rtlCol="0" anchor="ctr"/>
+          <a:lstStyle/>
+          <a:p>
+            <a:pPr algn="ctr"/>
+            <a:endParaRPr lang="fr-FR"/>
+          </a:p>
+        </p:txBody>
+      </p:sp>
+      <p:sp>
+        <p:nvSpPr>
+          <p:cNvPr id="36" name="Rectangle 35"/>
+          <p:cNvSpPr/>
+          <p:nvPr userDrawn="1"/>
+        </p:nvSpPr>
+        <p:spPr>
+          <a:xfrm>
+            <a:off x="156236" y="5121328"/>
+            <a:ext cx="1080000" cy="1260000"/>
+          </a:xfrm>
+          <a:prstGeom prst="rect">
+            <a:avLst/>
+          </a:prstGeom>
+          <a:solidFill>
+            <a:srgbClr val="0070C0"/>
+          </a:solidFill>
+          <a:ln>
+            <a:solidFill>
+              <a:srgbClr val="00B0F0"/>
+            </a:solidFill>
+          </a:ln>
+        </p:spPr>
+        <p:style>
+          <a:lnRef idx="2">
+            <a:schemeClr val="accent1">
+              <a:shade val="50000"/>
+            </a:schemeClr>
+          </a:lnRef>
+          <a:fillRef idx="1">
+            <a:schemeClr val="accent1"/>
+          </a:fillRef>
+          <a:effectRef idx="0">
+            <a:schemeClr val="accent1"/>
+          </a:effectRef>
+          <a:fontRef idx="minor">
+            <a:schemeClr val="lt1"/>
+          </a:fontRef>
+        </p:style>
+        <p:txBody>
+          <a:bodyPr rtlCol="0" anchor="ctr"/>
+          <a:lstStyle/>
+          <a:p>
+            <a:pPr algn="ctr"/>
+            <a:endParaRPr lang="fr-FR"/>
+          </a:p>
+        </p:txBody>
+      </p:sp>
+      <p:sp>
+        <p:nvSpPr>
+          <p:cNvPr id="37" name="Rectangle 36"/>
+          <p:cNvSpPr/>
+          <p:nvPr userDrawn="1"/>
+        </p:nvSpPr>
+        <p:spPr>
+          <a:xfrm>
+            <a:off x="1766218" y="653602"/>
+            <a:ext cx="1080000" cy="1080000"/>
+          </a:xfrm>
+          <a:prstGeom prst="rect">
+            <a:avLst/>
+          </a:prstGeom>
+          <a:solidFill>
+            <a:srgbClr val="0070C0"/>
+          </a:solidFill>
+          <a:ln>
+            <a:solidFill>
+              <a:srgbClr val="00B0F0"/>
+            </a:solidFill>
+          </a:ln>
+        </p:spPr>
+        <p:style>
+          <a:lnRef idx="2">
+            <a:schemeClr val="accent1">
+              <a:shade val="50000"/>
+            </a:schemeClr>
+          </a:lnRef>
+          <a:fillRef idx="1">
+            <a:schemeClr val="accent1"/>
+          </a:fillRef>
+          <a:effectRef idx="0">
+            <a:schemeClr val="accent1"/>
+          </a:effectRef>
+          <a:fontRef idx="minor">
+            <a:schemeClr val="lt1"/>
+          </a:fontRef>
+        </p:style>
+        <p:txBody>
+          <a:bodyPr rtlCol="0" anchor="ctr"/>
+          <a:lstStyle/>
+          <a:p>
+            <a:pPr algn="ctr"/>
+            <a:endParaRPr lang="fr-FR"/>
+          </a:p>
+        </p:txBody>
+      </p:sp>
+      <p:sp>
+        <p:nvSpPr>
+          <p:cNvPr id="38" name="Rectangle 37"/>
+          <p:cNvSpPr/>
+          <p:nvPr userDrawn="1"/>
+        </p:nvSpPr>
+        <p:spPr>
+          <a:xfrm>
+            <a:off x="1766218" y="3348896"/>
+            <a:ext cx="1080000" cy="1080000"/>
+          </a:xfrm>
+          <a:prstGeom prst="rect">
+            <a:avLst/>
+          </a:prstGeom>
+          <a:solidFill>
+            <a:srgbClr val="0070C0"/>
+          </a:solidFill>
+          <a:ln>
+            <a:solidFill>
+              <a:srgbClr val="00B0F0"/>
+            </a:solidFill>
+          </a:ln>
+        </p:spPr>
+        <p:style>
+          <a:lnRef idx="2">
+            <a:schemeClr val="accent1">
+              <a:shade val="50000"/>
+            </a:schemeClr>
+          </a:lnRef>
+          <a:fillRef idx="1">
+            <a:schemeClr val="accent1"/>
+          </a:fillRef>
+          <a:effectRef idx="0">
+            <a:schemeClr val="accent1"/>
+          </a:effectRef>
+          <a:fontRef idx="minor">
+            <a:schemeClr val="lt1"/>
+          </a:fontRef>
+        </p:style>
+        <p:txBody>
+          <a:bodyPr rtlCol="0" anchor="ctr"/>
+          <a:lstStyle/>
+          <a:p>
+            <a:pPr algn="ctr"/>
+            <a:endParaRPr lang="fr-FR"/>
+          </a:p>
+        </p:txBody>
+      </p:sp>
+      <p:sp>
+        <p:nvSpPr>
+          <p:cNvPr id="39" name="Rectangle 38"/>
+          <p:cNvSpPr/>
+          <p:nvPr userDrawn="1"/>
+        </p:nvSpPr>
+        <p:spPr>
+          <a:xfrm>
+            <a:off x="1475775" y="5121327"/>
+            <a:ext cx="1080000" cy="1260000"/>
+          </a:xfrm>
+          <a:prstGeom prst="rect">
+            <a:avLst/>
+          </a:prstGeom>
+          <a:solidFill>
+            <a:srgbClr val="0070C0"/>
+          </a:solidFill>
+          <a:ln>
+            <a:solidFill>
+              <a:srgbClr val="00B0F0"/>
+            </a:solidFill>
+          </a:ln>
+        </p:spPr>
+        <p:style>
+          <a:lnRef idx="2">
+            <a:schemeClr val="accent1">
+              <a:shade val="50000"/>
+            </a:schemeClr>
+          </a:lnRef>
+          <a:fillRef idx="1">
+            <a:schemeClr val="accent1"/>
+          </a:fillRef>
+          <a:effectRef idx="0">
+            <a:schemeClr val="accent1"/>
+          </a:effectRef>
+          <a:fontRef idx="minor">
+            <a:schemeClr val="lt1"/>
+          </a:fontRef>
+        </p:style>
+        <p:txBody>
+          <a:bodyPr rtlCol="0" anchor="ctr"/>
+          <a:lstStyle/>
+          <a:p>
+            <a:pPr algn="ctr"/>
+            <a:endParaRPr lang="fr-FR"/>
+          </a:p>
+        </p:txBody>
+      </p:sp>
+      <p:sp>
+        <p:nvSpPr>
+          <p:cNvPr id="34" name="Rectangle 33"/>
+          <p:cNvSpPr/>
+          <p:nvPr userDrawn="1"/>
+        </p:nvSpPr>
+        <p:spPr>
+          <a:xfrm>
+            <a:off x="262430" y="653602"/>
+            <a:ext cx="1296000" cy="1080000"/>
+          </a:xfrm>
+          <a:prstGeom prst="rect">
+            <a:avLst/>
+          </a:prstGeom>
+          <a:solidFill>
+            <a:srgbClr val="0070C0"/>
+          </a:solidFill>
+          <a:ln>
+            <a:solidFill>
+              <a:srgbClr val="00B0F0"/>
+            </a:solidFill>
+          </a:ln>
+        </p:spPr>
+        <p:style>
+          <a:lnRef idx="2">
+            <a:schemeClr val="accent1">
+              <a:shade val="50000"/>
+            </a:schemeClr>
+          </a:lnRef>
+          <a:fillRef idx="1">
+            <a:schemeClr val="accent1"/>
+          </a:fillRef>
+          <a:effectRef idx="0">
+            <a:schemeClr val="accent1"/>
+          </a:effectRef>
+          <a:fontRef idx="minor">
+            <a:schemeClr val="lt1"/>
+          </a:fontRef>
+        </p:style>
+        <p:txBody>
+          <a:bodyPr rtlCol="0" anchor="ctr"/>
+          <a:lstStyle/>
+          <a:p>
+            <a:pPr algn="ctr"/>
+            <a:endParaRPr lang="fr-FR"/>
+          </a:p>
+        </p:txBody>
+      </p:sp>
+      <p:sp>
+        <p:nvSpPr>
+          <p:cNvPr id="6" name="Espace réservé du texte 5"/>
+          <p:cNvSpPr>
+            <a:spLocks noGrp="1"/>
+          </p:cNvSpPr>
+          <p:nvPr>
+            <p:ph type="body" sz="quarter" idx="10" hasCustomPrompt="1"/>
+          </p:nvPr>
+        </p:nvSpPr>
+        <p:spPr>
+          <a:xfrm>
+            <a:off x="372386" y="1179377"/>
+            <a:ext cx="647700" cy="463648"/>
+          </a:xfrm>
+        </p:spPr>
+        <p:txBody>
+          <a:bodyPr anchor="ctr">
+            <a:noAutofit/>
+          </a:bodyPr>
+          <a:lstStyle>
+            <a:lvl1pPr marL="0" indent="0" algn="ctr">
+              <a:buNone/>
+              <a:defRPr sz="3600" b="1">
+                <a:solidFill>
+                  <a:schemeClr val="bg1"/>
+                </a:solidFill>
+              </a:defRPr>
+            </a:lvl1pPr>
+          </a:lstStyle>
+          <a:p>
+            <a:pPr lvl="0"/>
+            <a:r>
+              <a:rPr lang="fr-FR" dirty="0" smtClean="0"/>
+              <a:t>#</a:t>
+            </a:r>
+            <a:endParaRPr lang="fr-FR" dirty="0"/>
+          </a:p>
+        </p:txBody>
+      </p:sp>
+      <p:sp>
+        <p:nvSpPr>
+          <p:cNvPr id="8" name="ZoneTexte 7"/>
+          <p:cNvSpPr txBox="1"/>
+          <p:nvPr userDrawn="1"/>
+        </p:nvSpPr>
+        <p:spPr>
+          <a:xfrm>
+            <a:off x="262430" y="688190"/>
+            <a:ext cx="1296000" cy="307777"/>
+          </a:xfrm>
+          <a:prstGeom prst="rect">
+            <a:avLst/>
+          </a:prstGeom>
+          <a:noFill/>
+        </p:spPr>
+        <p:txBody>
+          <a:bodyPr wrap="square" rtlCol="0">
+            <a:spAutoFit/>
+          </a:bodyPr>
+          <a:lstStyle/>
+          <a:p>
+            <a:r>
+              <a:rPr lang="fr-FR" sz="1400" b="1" dirty="0" smtClean="0">
+                <a:solidFill>
+                  <a:schemeClr val="bg1"/>
+                </a:solidFill>
+              </a:rPr>
+              <a:t>High </a:t>
+            </a:r>
+            <a:r>
+              <a:rPr lang="fr-FR" sz="1300" b="1" dirty="0" err="1" smtClean="0">
+                <a:solidFill>
+                  <a:schemeClr val="bg1"/>
+                </a:solidFill>
+              </a:rPr>
+              <a:t>Risks</a:t>
+            </a:r>
+            <a:endParaRPr lang="fr-FR" sz="1300" b="1" dirty="0">
+              <a:solidFill>
+                <a:schemeClr val="bg1"/>
+              </a:solidFill>
+            </a:endParaRPr>
+          </a:p>
+        </p:txBody>
+      </p:sp>
+      <p:sp>
+        <p:nvSpPr>
+          <p:cNvPr id="10" name="Espace réservé du texte 5"/>
+          <p:cNvSpPr>
+            <a:spLocks noGrp="1"/>
+          </p:cNvSpPr>
+          <p:nvPr>
+            <p:ph type="body" sz="quarter" idx="11" hasCustomPrompt="1"/>
+          </p:nvPr>
+        </p:nvSpPr>
+        <p:spPr>
+          <a:xfrm>
+            <a:off x="1982368" y="1179377"/>
+            <a:ext cx="647700" cy="463648"/>
+          </a:xfrm>
+        </p:spPr>
+        <p:txBody>
+          <a:bodyPr anchor="ctr">
+            <a:normAutofit/>
+          </a:bodyPr>
+          <a:lstStyle>
+            <a:lvl1pPr marL="0" indent="0" algn="ctr">
+              <a:buNone/>
+              <a:defRPr sz="3200" b="1">
+                <a:solidFill>
+                  <a:schemeClr val="bg1"/>
+                </a:solidFill>
+              </a:defRPr>
+            </a:lvl1pPr>
+          </a:lstStyle>
+          <a:p>
+            <a:pPr lvl="0"/>
+            <a:r>
+              <a:rPr lang="fr-FR" dirty="0" smtClean="0"/>
+              <a:t>#</a:t>
+            </a:r>
+            <a:endParaRPr lang="fr-FR" dirty="0"/>
+          </a:p>
+        </p:txBody>
+      </p:sp>
+      <p:sp>
+        <p:nvSpPr>
+          <p:cNvPr id="11" name="ZoneTexte 10"/>
+          <p:cNvSpPr txBox="1"/>
+          <p:nvPr userDrawn="1"/>
+        </p:nvSpPr>
+        <p:spPr>
+          <a:xfrm>
+            <a:off x="269153" y="3384058"/>
+            <a:ext cx="1282555" cy="307777"/>
+          </a:xfrm>
+          <a:prstGeom prst="rect">
+            <a:avLst/>
+          </a:prstGeom>
+          <a:noFill/>
+        </p:spPr>
+        <p:txBody>
+          <a:bodyPr wrap="square" rtlCol="0">
+            <a:spAutoFit/>
+          </a:bodyPr>
+          <a:lstStyle/>
+          <a:p>
+            <a:r>
+              <a:rPr lang="fr-FR" sz="1400" b="1" dirty="0" smtClean="0">
+                <a:solidFill>
+                  <a:schemeClr val="bg1"/>
+                </a:solidFill>
+              </a:rPr>
+              <a:t>Light</a:t>
+            </a:r>
+            <a:r>
+              <a:rPr lang="fr-FR" sz="1300" b="1" dirty="0" smtClean="0">
+                <a:solidFill>
+                  <a:schemeClr val="bg1"/>
+                </a:solidFill>
+              </a:rPr>
+              <a:t> </a:t>
+            </a:r>
+            <a:r>
+              <a:rPr lang="fr-FR" sz="1300" b="1" dirty="0" err="1" smtClean="0">
+                <a:solidFill>
+                  <a:schemeClr val="bg1"/>
+                </a:solidFill>
+              </a:rPr>
+              <a:t>Risks</a:t>
+            </a:r>
+            <a:endParaRPr lang="fr-FR" sz="1300" b="1" dirty="0">
+              <a:solidFill>
+                <a:schemeClr val="bg1"/>
+              </a:solidFill>
+            </a:endParaRPr>
+          </a:p>
+        </p:txBody>
+      </p:sp>
+      <p:sp>
+        <p:nvSpPr>
+          <p:cNvPr id="13" name="Espace réservé du texte 5"/>
+          <p:cNvSpPr>
+            <a:spLocks noGrp="1"/>
+          </p:cNvSpPr>
+          <p:nvPr>
+            <p:ph type="body" sz="quarter" idx="12" hasCustomPrompt="1"/>
+          </p:nvPr>
+        </p:nvSpPr>
+        <p:spPr>
+          <a:xfrm>
+            <a:off x="372386" y="3836311"/>
+            <a:ext cx="647700" cy="455430"/>
+          </a:xfrm>
+        </p:spPr>
+        <p:txBody>
+          <a:bodyPr anchor="ctr">
+            <a:noAutofit/>
+          </a:bodyPr>
+          <a:lstStyle>
+            <a:lvl1pPr marL="0" indent="0" algn="ctr">
+              <a:buNone/>
+              <a:defRPr sz="3600" b="1">
+                <a:solidFill>
+                  <a:schemeClr val="bg1"/>
+                </a:solidFill>
+              </a:defRPr>
+            </a:lvl1pPr>
+          </a:lstStyle>
+          <a:p>
+            <a:pPr lvl="0"/>
+            <a:r>
+              <a:rPr lang="fr-FR" dirty="0" smtClean="0"/>
+              <a:t>#</a:t>
+            </a:r>
+            <a:endParaRPr lang="fr-FR" dirty="0"/>
+          </a:p>
+        </p:txBody>
+      </p:sp>
+      <p:sp>
+        <p:nvSpPr>
+          <p:cNvPr id="14" name="Espace réservé du texte 5"/>
+          <p:cNvSpPr>
+            <a:spLocks noGrp="1"/>
+          </p:cNvSpPr>
+          <p:nvPr>
+            <p:ph type="body" sz="quarter" idx="13" hasCustomPrompt="1"/>
+          </p:nvPr>
+        </p:nvSpPr>
+        <p:spPr>
+          <a:xfrm>
+            <a:off x="1982368" y="3836311"/>
+            <a:ext cx="647700" cy="455430"/>
+          </a:xfrm>
+        </p:spPr>
+        <p:txBody>
+          <a:bodyPr anchor="ctr">
+            <a:normAutofit/>
+          </a:bodyPr>
+          <a:lstStyle>
+            <a:lvl1pPr marL="0" indent="0" algn="ctr">
+              <a:buNone/>
+              <a:defRPr sz="3200" b="1">
+                <a:solidFill>
+                  <a:schemeClr val="bg1"/>
+                </a:solidFill>
+              </a:defRPr>
+            </a:lvl1pPr>
+          </a:lstStyle>
+          <a:p>
+            <a:pPr lvl="0"/>
+            <a:r>
+              <a:rPr lang="fr-FR" dirty="0" smtClean="0"/>
+              <a:t>#</a:t>
+            </a:r>
+            <a:endParaRPr lang="fr-FR" dirty="0"/>
+          </a:p>
+        </p:txBody>
+      </p:sp>
+      <p:sp>
+        <p:nvSpPr>
+          <p:cNvPr id="15" name="ZoneTexte 14"/>
+          <p:cNvSpPr txBox="1"/>
+          <p:nvPr userDrawn="1"/>
+        </p:nvSpPr>
+        <p:spPr>
+          <a:xfrm>
+            <a:off x="170585" y="4690010"/>
+            <a:ext cx="3681335" cy="369332"/>
+          </a:xfrm>
+          <a:prstGeom prst="rect">
+            <a:avLst/>
+          </a:prstGeom>
+          <a:noFill/>
+        </p:spPr>
+        <p:txBody>
+          <a:bodyPr wrap="square" rtlCol="0">
+            <a:spAutoFit/>
+          </a:bodyPr>
+          <a:lstStyle/>
+          <a:p>
+            <a:pPr algn="ctr"/>
+            <a:r>
+              <a:rPr lang="fr-FR" sz="1800" b="1" dirty="0" smtClean="0">
+                <a:solidFill>
+                  <a:schemeClr val="accent4">
+                    <a:lumMod val="50000"/>
+                  </a:schemeClr>
+                </a:solidFill>
+                <a:latin typeface="Calibri" panose="020F0502020204030204" pitchFamily="34" charset="0"/>
+              </a:rPr>
+              <a:t>Total </a:t>
+            </a:r>
+            <a:r>
+              <a:rPr lang="fr-FR" sz="1800" b="1" dirty="0" err="1" smtClean="0">
+                <a:solidFill>
+                  <a:schemeClr val="accent4">
+                    <a:lumMod val="50000"/>
+                  </a:schemeClr>
+                </a:solidFill>
+                <a:latin typeface="Calibri" panose="020F0502020204030204" pitchFamily="34" charset="0"/>
+              </a:rPr>
+              <a:t>Number</a:t>
+            </a:r>
+            <a:r>
+              <a:rPr lang="fr-FR" sz="1800" b="1" dirty="0" smtClean="0">
+                <a:solidFill>
+                  <a:schemeClr val="accent4">
+                    <a:lumMod val="50000"/>
+                  </a:schemeClr>
+                </a:solidFill>
+                <a:latin typeface="Calibri" panose="020F0502020204030204" pitchFamily="34" charset="0"/>
+              </a:rPr>
+              <a:t> of </a:t>
+            </a:r>
+            <a:r>
+              <a:rPr lang="fr-FR" sz="1800" b="1" dirty="0" err="1" smtClean="0">
+                <a:solidFill>
+                  <a:schemeClr val="accent4">
+                    <a:lumMod val="50000"/>
+                  </a:schemeClr>
+                </a:solidFill>
+                <a:latin typeface="Calibri" panose="020F0502020204030204" pitchFamily="34" charset="0"/>
+              </a:rPr>
+              <a:t>Objects</a:t>
+            </a:r>
+            <a:endParaRPr lang="fr-FR" sz="1800" b="1" dirty="0">
+              <a:solidFill>
+                <a:schemeClr val="accent4">
+                  <a:lumMod val="50000"/>
+                </a:schemeClr>
+              </a:solidFill>
+              <a:latin typeface="Calibri" panose="020F0502020204030204" pitchFamily="34" charset="0"/>
+            </a:endParaRPr>
+          </a:p>
+        </p:txBody>
+      </p:sp>
+      <p:sp>
+        <p:nvSpPr>
+          <p:cNvPr id="17" name="Espace réservé du texte 5"/>
+          <p:cNvSpPr>
+            <a:spLocks noGrp="1"/>
+          </p:cNvSpPr>
+          <p:nvPr>
+            <p:ph type="body" sz="quarter" idx="14" hasCustomPrompt="1"/>
+          </p:nvPr>
+        </p:nvSpPr>
+        <p:spPr>
+          <a:xfrm>
+            <a:off x="372386" y="5711547"/>
+            <a:ext cx="647700" cy="503238"/>
+          </a:xfrm>
+        </p:spPr>
+        <p:txBody>
+          <a:bodyPr anchor="ctr">
+            <a:noAutofit/>
+          </a:bodyPr>
+          <a:lstStyle>
+            <a:lvl1pPr marL="0" indent="0" algn="ctr">
+              <a:buNone/>
+              <a:defRPr sz="3600" b="1">
+                <a:solidFill>
+                  <a:schemeClr val="bg1"/>
+                </a:solidFill>
+              </a:defRPr>
+            </a:lvl1pPr>
+          </a:lstStyle>
+          <a:p>
+            <a:pPr lvl="0"/>
+            <a:r>
+              <a:rPr lang="fr-FR" dirty="0" smtClean="0"/>
+              <a:t>#</a:t>
+            </a:r>
+            <a:endParaRPr lang="fr-FR" dirty="0"/>
+          </a:p>
+        </p:txBody>
+      </p:sp>
+      <p:sp>
+        <p:nvSpPr>
+          <p:cNvPr id="18" name="ZoneTexte 17"/>
+          <p:cNvSpPr txBox="1"/>
+          <p:nvPr userDrawn="1"/>
+        </p:nvSpPr>
+        <p:spPr>
+          <a:xfrm>
+            <a:off x="156236" y="5222257"/>
+            <a:ext cx="1080000" cy="369332"/>
+          </a:xfrm>
+          <a:prstGeom prst="rect">
+            <a:avLst/>
+          </a:prstGeom>
+          <a:noFill/>
+        </p:spPr>
+        <p:txBody>
+          <a:bodyPr wrap="square" rtlCol="0">
+            <a:spAutoFit/>
+          </a:bodyPr>
+          <a:lstStyle/>
+          <a:p>
+            <a:pPr algn="ctr"/>
+            <a:r>
+              <a:rPr lang="fr-FR" b="1" dirty="0" err="1" smtClean="0">
+                <a:solidFill>
+                  <a:schemeClr val="bg1"/>
+                </a:solidFill>
+              </a:rPr>
+              <a:t>eIoT</a:t>
+            </a:r>
+            <a:endParaRPr lang="fr-FR" b="1" dirty="0">
+              <a:solidFill>
+                <a:schemeClr val="bg1"/>
+              </a:solidFill>
+            </a:endParaRPr>
+          </a:p>
+        </p:txBody>
+      </p:sp>
+      <p:sp>
+        <p:nvSpPr>
+          <p:cNvPr id="19" name="ZoneTexte 18"/>
+          <p:cNvSpPr txBox="1"/>
+          <p:nvPr userDrawn="1"/>
+        </p:nvSpPr>
+        <p:spPr>
+          <a:xfrm>
+            <a:off x="1490124" y="5219955"/>
+            <a:ext cx="1051303" cy="369332"/>
+          </a:xfrm>
+          <a:prstGeom prst="rect">
+            <a:avLst/>
+          </a:prstGeom>
+          <a:noFill/>
+        </p:spPr>
+        <p:txBody>
+          <a:bodyPr wrap="square" rtlCol="0">
+            <a:spAutoFit/>
+          </a:bodyPr>
+          <a:lstStyle/>
+          <a:p>
+            <a:pPr algn="ctr"/>
+            <a:r>
+              <a:rPr lang="fr-FR" b="1" dirty="0" smtClean="0">
+                <a:solidFill>
+                  <a:schemeClr val="bg1"/>
+                </a:solidFill>
+              </a:rPr>
+              <a:t>B2C</a:t>
+            </a:r>
+            <a:endParaRPr lang="fr-FR" b="1" dirty="0">
+              <a:solidFill>
+                <a:schemeClr val="bg1"/>
+              </a:solidFill>
+            </a:endParaRPr>
+          </a:p>
+        </p:txBody>
+      </p:sp>
+      <p:sp>
+        <p:nvSpPr>
+          <p:cNvPr id="20" name="Espace réservé du texte 5"/>
+          <p:cNvSpPr>
+            <a:spLocks noGrp="1"/>
+          </p:cNvSpPr>
+          <p:nvPr>
+            <p:ph type="body" sz="quarter" idx="15" hasCustomPrompt="1"/>
+          </p:nvPr>
+        </p:nvSpPr>
+        <p:spPr>
+          <a:xfrm>
+            <a:off x="1691925" y="5711547"/>
+            <a:ext cx="647700" cy="503238"/>
+          </a:xfrm>
+        </p:spPr>
+        <p:txBody>
+          <a:bodyPr anchor="ctr">
+            <a:normAutofit/>
+          </a:bodyPr>
+          <a:lstStyle>
+            <a:lvl1pPr marL="0" indent="0" algn="ctr">
+              <a:buNone/>
+              <a:defRPr sz="3200" b="1">
+                <a:solidFill>
+                  <a:schemeClr val="bg1"/>
+                </a:solidFill>
+              </a:defRPr>
+            </a:lvl1pPr>
+          </a:lstStyle>
+          <a:p>
+            <a:pPr lvl="0"/>
+            <a:r>
+              <a:rPr lang="fr-FR" dirty="0" smtClean="0"/>
+              <a:t>#</a:t>
+            </a:r>
+            <a:endParaRPr lang="fr-FR" dirty="0"/>
+          </a:p>
+        </p:txBody>
+      </p:sp>
+      <p:sp>
+        <p:nvSpPr>
+          <p:cNvPr id="21" name="ZoneTexte 20"/>
+          <p:cNvSpPr txBox="1"/>
+          <p:nvPr userDrawn="1"/>
+        </p:nvSpPr>
+        <p:spPr>
+          <a:xfrm>
+            <a:off x="235793" y="32008"/>
+            <a:ext cx="2608015" cy="461665"/>
+          </a:xfrm>
+          <a:prstGeom prst="rect">
+            <a:avLst/>
+          </a:prstGeom>
+          <a:noFill/>
+        </p:spPr>
+        <p:txBody>
+          <a:bodyPr wrap="square" rtlCol="0">
+            <a:spAutoFit/>
+          </a:bodyPr>
+          <a:lstStyle/>
+          <a:p>
+            <a:r>
+              <a:rPr lang="fr-FR" sz="2400" b="1" dirty="0" smtClean="0">
+                <a:solidFill>
+                  <a:schemeClr val="accent4">
+                    <a:lumMod val="50000"/>
+                  </a:schemeClr>
+                </a:solidFill>
+                <a:latin typeface="Calibri" panose="020F0502020204030204" pitchFamily="34" charset="0"/>
+              </a:rPr>
+              <a:t>Quick </a:t>
+            </a:r>
+            <a:r>
+              <a:rPr lang="fr-FR" sz="2400" b="1" dirty="0" err="1" smtClean="0">
+                <a:solidFill>
+                  <a:schemeClr val="accent4">
+                    <a:lumMod val="50000"/>
+                  </a:schemeClr>
+                </a:solidFill>
+                <a:latin typeface="Calibri" panose="020F0502020204030204" pitchFamily="34" charset="0"/>
+              </a:rPr>
+              <a:t>Overview</a:t>
+            </a:r>
+            <a:endParaRPr lang="fr-FR" sz="2400" b="1" dirty="0">
+              <a:solidFill>
+                <a:schemeClr val="accent4">
+                  <a:lumMod val="50000"/>
+                </a:schemeClr>
+              </a:solidFill>
+              <a:latin typeface="Calibri" panose="020F0502020204030204" pitchFamily="34" charset="0"/>
+            </a:endParaRPr>
+          </a:p>
+        </p:txBody>
+      </p:sp>
+      <p:sp>
+        <p:nvSpPr>
+          <p:cNvPr id="23" name="ZoneTexte 22"/>
+          <p:cNvSpPr txBox="1"/>
+          <p:nvPr userDrawn="1"/>
+        </p:nvSpPr>
+        <p:spPr>
+          <a:xfrm>
+            <a:off x="3275856" y="62568"/>
+            <a:ext cx="3542316" cy="461665"/>
+          </a:xfrm>
+          <a:prstGeom prst="rect">
+            <a:avLst/>
+          </a:prstGeom>
+          <a:noFill/>
+        </p:spPr>
+        <p:txBody>
+          <a:bodyPr wrap="none" rtlCol="0">
+            <a:spAutoFit/>
+          </a:bodyPr>
+          <a:lstStyle/>
+          <a:p>
+            <a:r>
+              <a:rPr lang="fr-FR" sz="2400" b="1" dirty="0" smtClean="0">
+                <a:solidFill>
+                  <a:schemeClr val="accent4">
+                    <a:lumMod val="50000"/>
+                  </a:schemeClr>
+                </a:solidFill>
+                <a:latin typeface="Calibri" panose="020F0502020204030204" pitchFamily="34" charset="0"/>
+              </a:rPr>
+              <a:t>Security </a:t>
+            </a:r>
+            <a:r>
+              <a:rPr lang="fr-FR" sz="2400" b="1" dirty="0" err="1" smtClean="0">
+                <a:solidFill>
+                  <a:schemeClr val="accent4">
+                    <a:lumMod val="50000"/>
+                  </a:schemeClr>
+                </a:solidFill>
+                <a:latin typeface="Calibri" panose="020F0502020204030204" pitchFamily="34" charset="0"/>
+              </a:rPr>
+              <a:t>Process</a:t>
+            </a:r>
+            <a:r>
+              <a:rPr lang="fr-FR" sz="2400" b="1" dirty="0" smtClean="0">
+                <a:solidFill>
+                  <a:schemeClr val="accent4">
+                    <a:lumMod val="50000"/>
+                  </a:schemeClr>
+                </a:solidFill>
+                <a:latin typeface="Calibri" panose="020F0502020204030204" pitchFamily="34" charset="0"/>
+              </a:rPr>
+              <a:t> </a:t>
+            </a:r>
+            <a:r>
+              <a:rPr lang="fr-FR" sz="2400" b="1" dirty="0" err="1" smtClean="0">
+                <a:solidFill>
+                  <a:schemeClr val="accent4">
+                    <a:lumMod val="50000"/>
+                  </a:schemeClr>
+                </a:solidFill>
+                <a:latin typeface="Calibri" panose="020F0502020204030204" pitchFamily="34" charset="0"/>
+              </a:rPr>
+              <a:t>Overview</a:t>
+            </a:r>
+            <a:endParaRPr lang="fr-FR" sz="2400" b="1" dirty="0">
+              <a:solidFill>
+                <a:schemeClr val="accent4">
+                  <a:lumMod val="50000"/>
+                </a:schemeClr>
+              </a:solidFill>
+              <a:latin typeface="Calibri" panose="020F0502020204030204" pitchFamily="34" charset="0"/>
+            </a:endParaRPr>
+          </a:p>
+        </p:txBody>
+      </p:sp>
+      <p:sp>
+        <p:nvSpPr>
+          <p:cNvPr id="24" name="ZoneTexte 23"/>
+          <p:cNvSpPr txBox="1"/>
+          <p:nvPr userDrawn="1"/>
+        </p:nvSpPr>
+        <p:spPr>
+          <a:xfrm>
+            <a:off x="4139952" y="3825914"/>
+            <a:ext cx="3240361" cy="323165"/>
+          </a:xfrm>
+          <a:prstGeom prst="rect">
+            <a:avLst/>
+          </a:prstGeom>
+          <a:noFill/>
+        </p:spPr>
+        <p:txBody>
+          <a:bodyPr wrap="square" rtlCol="0">
+            <a:spAutoFit/>
+          </a:bodyPr>
+          <a:lstStyle/>
+          <a:p>
+            <a:r>
+              <a:rPr lang="fr-FR" sz="1500" b="1" dirty="0" smtClean="0">
+                <a:solidFill>
+                  <a:schemeClr val="accent4">
+                    <a:lumMod val="50000"/>
+                  </a:schemeClr>
+                </a:solidFill>
+                <a:latin typeface="Calibri" panose="020F0502020204030204" pitchFamily="34" charset="0"/>
+              </a:rPr>
+              <a:t>Top 5 </a:t>
+            </a:r>
+            <a:r>
+              <a:rPr lang="fr-FR" sz="1500" b="1" dirty="0" err="1" smtClean="0">
+                <a:solidFill>
+                  <a:schemeClr val="accent4">
+                    <a:lumMod val="50000"/>
+                  </a:schemeClr>
+                </a:solidFill>
+                <a:latin typeface="Calibri" panose="020F0502020204030204" pitchFamily="34" charset="0"/>
+              </a:rPr>
+              <a:t>most</a:t>
+            </a:r>
+            <a:r>
+              <a:rPr lang="fr-FR" sz="1500" b="1" dirty="0" smtClean="0">
+                <a:solidFill>
+                  <a:schemeClr val="accent4">
+                    <a:lumMod val="50000"/>
+                  </a:schemeClr>
+                </a:solidFill>
+                <a:latin typeface="Calibri" panose="020F0502020204030204" pitchFamily="34" charset="0"/>
+              </a:rPr>
+              <a:t> </a:t>
+            </a:r>
+            <a:r>
+              <a:rPr lang="fr-FR" sz="1500" b="1" dirty="0" err="1" smtClean="0">
+                <a:solidFill>
+                  <a:schemeClr val="accent4">
+                    <a:lumMod val="50000"/>
+                  </a:schemeClr>
+                </a:solidFill>
+                <a:latin typeface="Calibri" panose="020F0502020204030204" pitchFamily="34" charset="0"/>
+              </a:rPr>
+              <a:t>vulnerable</a:t>
+            </a:r>
+            <a:r>
+              <a:rPr lang="fr-FR" sz="1500" b="1" dirty="0" smtClean="0">
+                <a:solidFill>
+                  <a:schemeClr val="accent4">
+                    <a:lumMod val="50000"/>
+                  </a:schemeClr>
+                </a:solidFill>
+                <a:latin typeface="Calibri" panose="020F0502020204030204" pitchFamily="34" charset="0"/>
+              </a:rPr>
+              <a:t> </a:t>
+            </a:r>
+            <a:r>
+              <a:rPr lang="fr-FR" sz="1500" b="1" dirty="0" err="1" smtClean="0">
+                <a:solidFill>
+                  <a:schemeClr val="accent4">
+                    <a:lumMod val="50000"/>
+                  </a:schemeClr>
+                </a:solidFill>
+                <a:latin typeface="Calibri" panose="020F0502020204030204" pitchFamily="34" charset="0"/>
+              </a:rPr>
+              <a:t>Devices</a:t>
+            </a:r>
+            <a:endParaRPr lang="fr-FR" sz="1500" b="1" dirty="0">
+              <a:solidFill>
+                <a:schemeClr val="accent4">
+                  <a:lumMod val="50000"/>
+                </a:schemeClr>
+              </a:solidFill>
+              <a:latin typeface="Calibri" panose="020F0502020204030204" pitchFamily="34" charset="0"/>
+            </a:endParaRPr>
+          </a:p>
+        </p:txBody>
+      </p:sp>
+      <p:sp>
+        <p:nvSpPr>
+          <p:cNvPr id="25" name="ZoneTexte 24"/>
+          <p:cNvSpPr txBox="1"/>
+          <p:nvPr userDrawn="1"/>
+        </p:nvSpPr>
+        <p:spPr>
+          <a:xfrm>
+            <a:off x="3635895" y="657412"/>
+            <a:ext cx="2828367" cy="323165"/>
+          </a:xfrm>
+          <a:prstGeom prst="rect">
+            <a:avLst/>
+          </a:prstGeom>
+          <a:noFill/>
+        </p:spPr>
+        <p:txBody>
+          <a:bodyPr wrap="square" rtlCol="0">
+            <a:spAutoFit/>
+          </a:bodyPr>
+          <a:lstStyle/>
+          <a:p>
+            <a:r>
+              <a:rPr lang="fr-FR" sz="1500" b="1" dirty="0" smtClean="0">
+                <a:solidFill>
+                  <a:schemeClr val="accent4">
+                    <a:lumMod val="50000"/>
+                  </a:schemeClr>
+                </a:solidFill>
+                <a:latin typeface="Calibri" panose="020F0502020204030204" pitchFamily="34" charset="0"/>
+              </a:rPr>
+              <a:t>Security Phase </a:t>
+            </a:r>
+            <a:r>
+              <a:rPr lang="fr-FR" sz="1500" b="1" dirty="0" err="1" smtClean="0">
+                <a:solidFill>
+                  <a:schemeClr val="accent4">
+                    <a:lumMod val="50000"/>
+                  </a:schemeClr>
+                </a:solidFill>
+                <a:latin typeface="Calibri" panose="020F0502020204030204" pitchFamily="34" charset="0"/>
+              </a:rPr>
+              <a:t>Overview</a:t>
+            </a:r>
+            <a:endParaRPr lang="fr-FR" sz="1500" b="1" dirty="0">
+              <a:solidFill>
+                <a:schemeClr val="accent4">
+                  <a:lumMod val="50000"/>
+                </a:schemeClr>
+              </a:solidFill>
+              <a:latin typeface="Calibri" panose="020F0502020204030204" pitchFamily="34" charset="0"/>
+            </a:endParaRPr>
+          </a:p>
+        </p:txBody>
+      </p:sp>
+      <p:sp>
+        <p:nvSpPr>
+          <p:cNvPr id="26" name="Rectangle 25"/>
+          <p:cNvSpPr/>
+          <p:nvPr userDrawn="1"/>
+        </p:nvSpPr>
+        <p:spPr>
+          <a:xfrm>
+            <a:off x="260630" y="2000304"/>
+            <a:ext cx="1299600" cy="1080000"/>
+          </a:xfrm>
+          <a:prstGeom prst="rect">
+            <a:avLst/>
+          </a:prstGeom>
+          <a:solidFill>
+            <a:srgbClr val="0070C0"/>
+          </a:solidFill>
+          <a:ln>
+            <a:solidFill>
+              <a:srgbClr val="00B0F0"/>
+            </a:solidFill>
+          </a:ln>
+        </p:spPr>
+        <p:style>
+          <a:lnRef idx="2">
+            <a:schemeClr val="accent1">
+              <a:shade val="50000"/>
+            </a:schemeClr>
+          </a:lnRef>
+          <a:fillRef idx="1">
+            <a:schemeClr val="accent1"/>
+          </a:fillRef>
+          <a:effectRef idx="0">
+            <a:schemeClr val="accent1"/>
+          </a:effectRef>
+          <a:fontRef idx="minor">
+            <a:schemeClr val="lt1"/>
+          </a:fontRef>
+        </p:style>
+        <p:txBody>
+          <a:bodyPr rtlCol="0" anchor="ctr"/>
+          <a:lstStyle/>
+          <a:p>
+            <a:pPr algn="ctr"/>
+            <a:endParaRPr lang="fr-FR"/>
+          </a:p>
+        </p:txBody>
+      </p:sp>
+      <p:sp>
+        <p:nvSpPr>
+          <p:cNvPr id="27" name="Rectangle 26"/>
+          <p:cNvSpPr/>
+          <p:nvPr userDrawn="1"/>
+        </p:nvSpPr>
+        <p:spPr>
+          <a:xfrm>
+            <a:off x="1766218" y="2000304"/>
+            <a:ext cx="1080000" cy="1080000"/>
+          </a:xfrm>
+          <a:prstGeom prst="rect">
+            <a:avLst/>
+          </a:prstGeom>
+          <a:solidFill>
+            <a:srgbClr val="0070C0"/>
+          </a:solidFill>
+          <a:ln>
+            <a:solidFill>
+              <a:srgbClr val="00B0F0"/>
+            </a:solidFill>
+          </a:ln>
+        </p:spPr>
+        <p:style>
+          <a:lnRef idx="2">
+            <a:schemeClr val="accent1">
+              <a:shade val="50000"/>
+            </a:schemeClr>
+          </a:lnRef>
+          <a:fillRef idx="1">
+            <a:schemeClr val="accent1"/>
+          </a:fillRef>
+          <a:effectRef idx="0">
+            <a:schemeClr val="accent1"/>
+          </a:effectRef>
+          <a:fontRef idx="minor">
+            <a:schemeClr val="lt1"/>
+          </a:fontRef>
+        </p:style>
+        <p:txBody>
+          <a:bodyPr rtlCol="0" anchor="ctr"/>
+          <a:lstStyle/>
+          <a:p>
+            <a:pPr algn="ctr"/>
+            <a:endParaRPr lang="fr-FR"/>
+          </a:p>
+        </p:txBody>
+      </p:sp>
+      <p:sp>
+        <p:nvSpPr>
+          <p:cNvPr id="28" name="ZoneTexte 27"/>
+          <p:cNvSpPr txBox="1"/>
+          <p:nvPr userDrawn="1"/>
+        </p:nvSpPr>
+        <p:spPr>
+          <a:xfrm>
+            <a:off x="235793" y="2000304"/>
+            <a:ext cx="1349274" cy="307777"/>
+          </a:xfrm>
+          <a:prstGeom prst="rect">
+            <a:avLst/>
+          </a:prstGeom>
+          <a:noFill/>
+        </p:spPr>
+        <p:txBody>
+          <a:bodyPr wrap="square" rtlCol="0">
+            <a:spAutoFit/>
+          </a:bodyPr>
+          <a:lstStyle/>
+          <a:p>
+            <a:r>
+              <a:rPr lang="fr-FR" sz="1400" b="1" dirty="0" smtClean="0">
+                <a:solidFill>
+                  <a:schemeClr val="bg1"/>
+                </a:solidFill>
+              </a:rPr>
+              <a:t>Medium</a:t>
+            </a:r>
+            <a:r>
+              <a:rPr lang="fr-FR" sz="1300" b="1" baseline="0" dirty="0" smtClean="0">
+                <a:solidFill>
+                  <a:schemeClr val="bg1"/>
+                </a:solidFill>
+              </a:rPr>
+              <a:t> </a:t>
+            </a:r>
+            <a:r>
+              <a:rPr lang="fr-FR" sz="1300" b="1" dirty="0" err="1" smtClean="0">
+                <a:solidFill>
+                  <a:schemeClr val="bg1"/>
+                </a:solidFill>
+              </a:rPr>
+              <a:t>Risks</a:t>
+            </a:r>
+            <a:endParaRPr lang="fr-FR" sz="1300" b="1" dirty="0">
+              <a:solidFill>
+                <a:schemeClr val="bg1"/>
+              </a:solidFill>
+            </a:endParaRPr>
+          </a:p>
+        </p:txBody>
+      </p:sp>
+      <p:sp>
+        <p:nvSpPr>
+          <p:cNvPr id="29" name="ZoneTexte 28"/>
+          <p:cNvSpPr txBox="1"/>
+          <p:nvPr userDrawn="1"/>
+        </p:nvSpPr>
+        <p:spPr>
+          <a:xfrm>
+            <a:off x="1816467" y="2016261"/>
+            <a:ext cx="979502" cy="261610"/>
+          </a:xfrm>
+          <a:prstGeom prst="rect">
+            <a:avLst/>
+          </a:prstGeom>
+          <a:noFill/>
+        </p:spPr>
+        <p:txBody>
+          <a:bodyPr wrap="square" rtlCol="0">
+            <a:spAutoFit/>
+          </a:bodyPr>
+          <a:lstStyle/>
+          <a:p>
+            <a:r>
+              <a:rPr lang="fr-FR" sz="1100" b="1" dirty="0" smtClean="0">
+                <a:solidFill>
+                  <a:schemeClr val="bg1"/>
+                </a:solidFill>
+              </a:rPr>
+              <a:t>Last </a:t>
+            </a:r>
+            <a:r>
+              <a:rPr lang="fr-FR" sz="1100" b="1" dirty="0" err="1" smtClean="0">
+                <a:solidFill>
+                  <a:schemeClr val="bg1"/>
+                </a:solidFill>
+              </a:rPr>
+              <a:t>month</a:t>
+            </a:r>
+            <a:endParaRPr lang="fr-FR" sz="1100" b="1" dirty="0">
+              <a:solidFill>
+                <a:schemeClr val="bg1"/>
+              </a:solidFill>
+            </a:endParaRPr>
+          </a:p>
+        </p:txBody>
+      </p:sp>
+      <p:sp>
+        <p:nvSpPr>
+          <p:cNvPr id="32" name="ZoneTexte 31"/>
+          <p:cNvSpPr txBox="1"/>
+          <p:nvPr userDrawn="1"/>
+        </p:nvSpPr>
+        <p:spPr>
+          <a:xfrm>
+            <a:off x="1816467" y="688190"/>
+            <a:ext cx="979502" cy="261610"/>
+          </a:xfrm>
+          <a:prstGeom prst="rect">
+            <a:avLst/>
+          </a:prstGeom>
+          <a:noFill/>
+        </p:spPr>
+        <p:txBody>
+          <a:bodyPr wrap="square" rtlCol="0">
+            <a:spAutoFit/>
+          </a:bodyPr>
+          <a:lstStyle/>
+          <a:p>
+            <a:r>
+              <a:rPr lang="fr-FR" sz="1100" b="1" dirty="0" smtClean="0">
+                <a:solidFill>
+                  <a:schemeClr val="bg1"/>
+                </a:solidFill>
+              </a:rPr>
+              <a:t>Last </a:t>
+            </a:r>
+            <a:r>
+              <a:rPr lang="fr-FR" sz="1100" b="1" dirty="0" err="1" smtClean="0">
+                <a:solidFill>
+                  <a:schemeClr val="bg1"/>
+                </a:solidFill>
+              </a:rPr>
+              <a:t>month</a:t>
+            </a:r>
+            <a:endParaRPr lang="fr-FR" sz="1100" b="1" dirty="0">
+              <a:solidFill>
+                <a:schemeClr val="bg1"/>
+              </a:solidFill>
+            </a:endParaRPr>
+          </a:p>
+        </p:txBody>
+      </p:sp>
+      <p:sp>
+        <p:nvSpPr>
+          <p:cNvPr id="33" name="ZoneTexte 32"/>
+          <p:cNvSpPr txBox="1"/>
+          <p:nvPr userDrawn="1"/>
+        </p:nvSpPr>
+        <p:spPr>
+          <a:xfrm>
+            <a:off x="1816467" y="3398888"/>
+            <a:ext cx="979502" cy="261610"/>
+          </a:xfrm>
+          <a:prstGeom prst="rect">
+            <a:avLst/>
+          </a:prstGeom>
+          <a:noFill/>
+        </p:spPr>
+        <p:txBody>
+          <a:bodyPr wrap="square" rtlCol="0">
+            <a:spAutoFit/>
+          </a:bodyPr>
+          <a:lstStyle/>
+          <a:p>
+            <a:r>
+              <a:rPr lang="fr-FR" sz="1100" b="1" dirty="0" smtClean="0">
+                <a:solidFill>
+                  <a:schemeClr val="bg1"/>
+                </a:solidFill>
+              </a:rPr>
+              <a:t>Last </a:t>
+            </a:r>
+            <a:r>
+              <a:rPr lang="fr-FR" sz="1100" b="1" dirty="0" err="1" smtClean="0">
+                <a:solidFill>
+                  <a:schemeClr val="bg1"/>
+                </a:solidFill>
+              </a:rPr>
+              <a:t>month</a:t>
+            </a:r>
+            <a:endParaRPr lang="fr-FR" sz="1100" b="1" dirty="0">
+              <a:solidFill>
+                <a:schemeClr val="bg1"/>
+              </a:solidFill>
+            </a:endParaRPr>
+          </a:p>
+        </p:txBody>
+      </p:sp>
+      <p:sp>
+        <p:nvSpPr>
+          <p:cNvPr id="3" name="Espace réservé du contenu 2"/>
+          <p:cNvSpPr>
+            <a:spLocks noGrp="1"/>
+          </p:cNvSpPr>
+          <p:nvPr>
+            <p:ph sz="quarter" idx="18" hasCustomPrompt="1"/>
+          </p:nvPr>
+        </p:nvSpPr>
+        <p:spPr>
+          <a:xfrm>
+            <a:off x="372236" y="2502998"/>
+            <a:ext cx="648000" cy="464400"/>
+          </a:xfrm>
+        </p:spPr>
+        <p:txBody>
+          <a:bodyPr anchor="ctr">
+            <a:noAutofit/>
+          </a:bodyPr>
+          <a:lstStyle>
+            <a:lvl1pPr marL="0" indent="0" algn="ctr">
+              <a:buNone/>
+              <a:defRPr sz="3600" b="1">
+                <a:solidFill>
+                  <a:schemeClr val="bg1"/>
+                </a:solidFill>
+              </a:defRPr>
+            </a:lvl1pPr>
+          </a:lstStyle>
+          <a:p>
+            <a:pPr lvl="0"/>
+            <a:r>
+              <a:rPr lang="fr-FR" dirty="0" smtClean="0"/>
+              <a:t>#</a:t>
+            </a:r>
+            <a:endParaRPr lang="fr-FR" dirty="0"/>
+          </a:p>
+        </p:txBody>
+      </p:sp>
+      <p:sp>
+        <p:nvSpPr>
+          <p:cNvPr id="40" name="Espace réservé du texte 5"/>
+          <p:cNvSpPr>
+            <a:spLocks noGrp="1"/>
+          </p:cNvSpPr>
+          <p:nvPr>
+            <p:ph type="body" sz="quarter" idx="19" hasCustomPrompt="1"/>
+          </p:nvPr>
+        </p:nvSpPr>
+        <p:spPr>
+          <a:xfrm>
+            <a:off x="1982368" y="2503374"/>
+            <a:ext cx="647700" cy="463648"/>
+          </a:xfrm>
+        </p:spPr>
+        <p:txBody>
+          <a:bodyPr anchor="ctr">
+            <a:normAutofit/>
+          </a:bodyPr>
+          <a:lstStyle>
+            <a:lvl1pPr marL="0" indent="0" algn="ctr">
+              <a:buNone/>
+              <a:defRPr sz="3200" b="1">
+                <a:solidFill>
+                  <a:schemeClr val="bg1"/>
+                </a:solidFill>
+              </a:defRPr>
+            </a:lvl1pPr>
+          </a:lstStyle>
+          <a:p>
+            <a:pPr lvl="0"/>
+            <a:r>
+              <a:rPr lang="fr-FR" dirty="0" smtClean="0"/>
+              <a:t>#</a:t>
+            </a:r>
+            <a:endParaRPr lang="fr-FR" dirty="0"/>
+          </a:p>
+        </p:txBody>
+      </p:sp>
+      <p:sp>
+        <p:nvSpPr>
+          <p:cNvPr id="31" name="Rectangle 30"/>
+          <p:cNvSpPr/>
+          <p:nvPr userDrawn="1"/>
+        </p:nvSpPr>
+        <p:spPr>
+          <a:xfrm>
+            <a:off x="2785414" y="5121328"/>
+            <a:ext cx="1080000" cy="1260000"/>
+          </a:xfrm>
+          <a:prstGeom prst="rect">
+            <a:avLst/>
+          </a:prstGeom>
+          <a:solidFill>
+            <a:srgbClr val="0070C0"/>
+          </a:solidFill>
+          <a:ln>
+            <a:solidFill>
+              <a:srgbClr val="00B0F0"/>
+            </a:solidFill>
+          </a:ln>
+        </p:spPr>
+        <p:style>
+          <a:lnRef idx="2">
+            <a:schemeClr val="accent1">
+              <a:shade val="50000"/>
+            </a:schemeClr>
+          </a:lnRef>
+          <a:fillRef idx="1">
+            <a:schemeClr val="accent1"/>
+          </a:fillRef>
+          <a:effectRef idx="0">
+            <a:schemeClr val="accent1"/>
+          </a:effectRef>
+          <a:fontRef idx="minor">
+            <a:schemeClr val="lt1"/>
+          </a:fontRef>
+        </p:style>
+        <p:txBody>
+          <a:bodyPr rtlCol="0" anchor="ctr"/>
+          <a:lstStyle/>
+          <a:p>
+            <a:pPr algn="ctr"/>
+            <a:endParaRPr lang="fr-FR"/>
+          </a:p>
+        </p:txBody>
+      </p:sp>
+      <p:sp>
+        <p:nvSpPr>
+          <p:cNvPr id="42" name="ZoneTexte 41"/>
+          <p:cNvSpPr txBox="1"/>
+          <p:nvPr userDrawn="1"/>
+        </p:nvSpPr>
+        <p:spPr>
+          <a:xfrm>
+            <a:off x="2799763" y="5222257"/>
+            <a:ext cx="1051303" cy="369332"/>
+          </a:xfrm>
+          <a:prstGeom prst="rect">
+            <a:avLst/>
+          </a:prstGeom>
+          <a:noFill/>
+        </p:spPr>
+        <p:txBody>
+          <a:bodyPr wrap="square" rtlCol="0">
+            <a:spAutoFit/>
+          </a:bodyPr>
+          <a:lstStyle/>
+          <a:p>
+            <a:pPr algn="ctr"/>
+            <a:r>
+              <a:rPr lang="fr-FR" b="1" dirty="0" err="1" smtClean="0">
+                <a:solidFill>
+                  <a:schemeClr val="bg1"/>
+                </a:solidFill>
+              </a:rPr>
+              <a:t>Others</a:t>
+            </a:r>
+            <a:endParaRPr lang="fr-FR" b="1" dirty="0">
+              <a:solidFill>
+                <a:schemeClr val="bg1"/>
+              </a:solidFill>
+            </a:endParaRPr>
+          </a:p>
+        </p:txBody>
+      </p:sp>
+      <p:sp>
+        <p:nvSpPr>
+          <p:cNvPr id="2" name="ZoneTexte 1"/>
+          <p:cNvSpPr txBox="1"/>
+          <p:nvPr userDrawn="1"/>
+        </p:nvSpPr>
+        <p:spPr>
+          <a:xfrm>
+            <a:off x="107504" y="6505599"/>
+            <a:ext cx="2755947" cy="307777"/>
+          </a:xfrm>
+          <a:prstGeom prst="rect">
+            <a:avLst/>
+          </a:prstGeom>
+          <a:noFill/>
+        </p:spPr>
+        <p:txBody>
+          <a:bodyPr wrap="none" rtlCol="0">
+            <a:spAutoFit/>
+          </a:bodyPr>
+          <a:lstStyle/>
+          <a:p>
+            <a:r>
+              <a:rPr lang="fr-FR" sz="1400" i="1" dirty="0" smtClean="0">
+                <a:solidFill>
+                  <a:schemeClr val="tx1">
+                    <a:lumMod val="85000"/>
+                    <a:lumOff val="15000"/>
+                  </a:schemeClr>
+                </a:solidFill>
+                <a:latin typeface="Calibri" panose="020F0502020204030204" pitchFamily="34" charset="0"/>
+              </a:rPr>
+              <a:t>Rémi Lavedrine – Security Manager</a:t>
+            </a:r>
+            <a:endParaRPr lang="fr-FR" sz="1400" i="1" dirty="0">
+              <a:solidFill>
+                <a:schemeClr val="tx1">
+                  <a:lumMod val="85000"/>
+                  <a:lumOff val="15000"/>
+                </a:schemeClr>
+              </a:solidFill>
+              <a:latin typeface="Calibri" panose="020F0502020204030204" pitchFamily="34" charset="0"/>
+            </a:endParaRPr>
+          </a:p>
+        </p:txBody>
+      </p:sp>
+      <p:sp>
+        <p:nvSpPr>
+          <p:cNvPr id="5" name="Espace réservé du texte 4"/>
+          <p:cNvSpPr>
+            <a:spLocks noGrp="1"/>
+          </p:cNvSpPr>
+          <p:nvPr>
+            <p:ph type="body" sz="quarter" idx="20" hasCustomPrompt="1"/>
+          </p:nvPr>
+        </p:nvSpPr>
+        <p:spPr>
+          <a:xfrm>
+            <a:off x="3001304" y="5711166"/>
+            <a:ext cx="648220" cy="504000"/>
+          </a:xfrm>
+        </p:spPr>
+        <p:txBody>
+          <a:bodyPr>
+            <a:noAutofit/>
+          </a:bodyPr>
+          <a:lstStyle>
+            <a:lvl1pPr marL="0" indent="0" algn="ctr">
+              <a:buNone/>
+              <a:defRPr sz="3200" b="1">
+                <a:solidFill>
+                  <a:schemeClr val="bg1"/>
+                </a:solidFill>
+              </a:defRPr>
+            </a:lvl1pPr>
+          </a:lstStyle>
+          <a:p>
+            <a:pPr lvl="0"/>
+            <a:r>
+              <a:rPr lang="fr-FR" sz="3200" dirty="0" smtClean="0"/>
+              <a:t>#</a:t>
+            </a:r>
+            <a:endParaRPr lang="fr-FR" dirty="0"/>
+          </a:p>
+        </p:txBody>
+      </p:sp>
+    </p:spTree>
+    <p:extLst/>
+  </p:cSld>
+  <p:clrMapOvr>
+    <a:masterClrMapping/>
+  </p:clrMapOvr>
+  <p:timing>
+    <p:tnLst>
+      <p:par>
+        <p:cTn id="1" dur="indefinite" restart="never" nodeType="tmRoot"/>
+      </p:par>
+    </p:tnLst>
+  </p:timing>
+</p:sldLayout>
+</file>
+
+<file path=ppt/slideLayouts/slideLayout20.xml><?xml version="1.0" encoding="utf-8"?>
 <p:sldLayout xmlns:a="http://schemas.openxmlformats.org/drawingml/2006/main" xmlns:r="http://schemas.openxmlformats.org/officeDocument/2006/relationships" xmlns:p="http://schemas.openxmlformats.org/presentationml/2006/main" preserve="1" userDrawn="1">
   <p:cSld name="transition fond noir">
     <p:bg>
@@ -5907,1447 +7530,7 @@
 </p:sldLayout>
 </file>
 
-<file path=ppt/slideLayouts/slideLayout2.xml><?xml version="1.0" encoding="utf-8"?>
-<p:sldLayout xmlns:a="http://schemas.openxmlformats.org/drawingml/2006/main" xmlns:r="http://schemas.openxmlformats.org/officeDocument/2006/relationships" xmlns:p="http://schemas.openxmlformats.org/presentationml/2006/main" preserve="1" userDrawn="1">
-  <p:cSld name="3_Disposition personnalisée">
-    <p:spTree>
-      <p:nvGrpSpPr>
-        <p:cNvPr id="1" name=""/>
-        <p:cNvGrpSpPr/>
-        <p:nvPr/>
-      </p:nvGrpSpPr>
-      <p:grpSpPr>
-        <a:xfrm>
-          <a:off x="0" y="0"/>
-          <a:ext cx="0" cy="0"/>
-          <a:chOff x="0" y="0"/>
-          <a:chExt cx="0" cy="0"/>
-        </a:xfrm>
-      </p:grpSpPr>
-      <p:sp>
-        <p:nvSpPr>
-          <p:cNvPr id="35" name="Rectangle 34"/>
-          <p:cNvSpPr/>
-          <p:nvPr userDrawn="1"/>
-        </p:nvSpPr>
-        <p:spPr>
-          <a:xfrm>
-            <a:off x="249238" y="3348896"/>
-            <a:ext cx="1296000" cy="1080000"/>
-          </a:xfrm>
-          <a:prstGeom prst="rect">
-            <a:avLst/>
-          </a:prstGeom>
-          <a:solidFill>
-            <a:srgbClr val="0070C0"/>
-          </a:solidFill>
-          <a:ln>
-            <a:solidFill>
-              <a:srgbClr val="00B0F0"/>
-            </a:solidFill>
-          </a:ln>
-        </p:spPr>
-        <p:style>
-          <a:lnRef idx="2">
-            <a:schemeClr val="accent1">
-              <a:shade val="50000"/>
-            </a:schemeClr>
-          </a:lnRef>
-          <a:fillRef idx="1">
-            <a:schemeClr val="accent1"/>
-          </a:fillRef>
-          <a:effectRef idx="0">
-            <a:schemeClr val="accent1"/>
-          </a:effectRef>
-          <a:fontRef idx="minor">
-            <a:schemeClr val="lt1"/>
-          </a:fontRef>
-        </p:style>
-        <p:txBody>
-          <a:bodyPr rtlCol="0" anchor="ctr"/>
-          <a:lstStyle/>
-          <a:p>
-            <a:pPr algn="ctr"/>
-            <a:endParaRPr lang="fr-FR"/>
-          </a:p>
-        </p:txBody>
-      </p:sp>
-      <p:sp>
-        <p:nvSpPr>
-          <p:cNvPr id="36" name="Rectangle 35"/>
-          <p:cNvSpPr/>
-          <p:nvPr userDrawn="1"/>
-        </p:nvSpPr>
-        <p:spPr>
-          <a:xfrm>
-            <a:off x="262683" y="5121328"/>
-            <a:ext cx="1080000" cy="1260000"/>
-          </a:xfrm>
-          <a:prstGeom prst="rect">
-            <a:avLst/>
-          </a:prstGeom>
-          <a:solidFill>
-            <a:srgbClr val="0070C0"/>
-          </a:solidFill>
-          <a:ln>
-            <a:solidFill>
-              <a:srgbClr val="00B0F0"/>
-            </a:solidFill>
-          </a:ln>
-        </p:spPr>
-        <p:style>
-          <a:lnRef idx="2">
-            <a:schemeClr val="accent1">
-              <a:shade val="50000"/>
-            </a:schemeClr>
-          </a:lnRef>
-          <a:fillRef idx="1">
-            <a:schemeClr val="accent1"/>
-          </a:fillRef>
-          <a:effectRef idx="0">
-            <a:schemeClr val="accent1"/>
-          </a:effectRef>
-          <a:fontRef idx="minor">
-            <a:schemeClr val="lt1"/>
-          </a:fontRef>
-        </p:style>
-        <p:txBody>
-          <a:bodyPr rtlCol="0" anchor="ctr"/>
-          <a:lstStyle/>
-          <a:p>
-            <a:pPr algn="ctr"/>
-            <a:endParaRPr lang="fr-FR"/>
-          </a:p>
-        </p:txBody>
-      </p:sp>
-      <p:sp>
-        <p:nvSpPr>
-          <p:cNvPr id="37" name="Rectangle 36"/>
-          <p:cNvSpPr/>
-          <p:nvPr userDrawn="1"/>
-        </p:nvSpPr>
-        <p:spPr>
-          <a:xfrm>
-            <a:off x="1763808" y="653602"/>
-            <a:ext cx="1080000" cy="1080000"/>
-          </a:xfrm>
-          <a:prstGeom prst="rect">
-            <a:avLst/>
-          </a:prstGeom>
-          <a:solidFill>
-            <a:srgbClr val="0070C0"/>
-          </a:solidFill>
-          <a:ln>
-            <a:solidFill>
-              <a:srgbClr val="00B0F0"/>
-            </a:solidFill>
-          </a:ln>
-        </p:spPr>
-        <p:style>
-          <a:lnRef idx="2">
-            <a:schemeClr val="accent1">
-              <a:shade val="50000"/>
-            </a:schemeClr>
-          </a:lnRef>
-          <a:fillRef idx="1">
-            <a:schemeClr val="accent1"/>
-          </a:fillRef>
-          <a:effectRef idx="0">
-            <a:schemeClr val="accent1"/>
-          </a:effectRef>
-          <a:fontRef idx="minor">
-            <a:schemeClr val="lt1"/>
-          </a:fontRef>
-        </p:style>
-        <p:txBody>
-          <a:bodyPr rtlCol="0" anchor="ctr"/>
-          <a:lstStyle/>
-          <a:p>
-            <a:pPr algn="ctr"/>
-            <a:endParaRPr lang="fr-FR"/>
-          </a:p>
-        </p:txBody>
-      </p:sp>
-      <p:sp>
-        <p:nvSpPr>
-          <p:cNvPr id="38" name="Rectangle 37"/>
-          <p:cNvSpPr/>
-          <p:nvPr userDrawn="1"/>
-        </p:nvSpPr>
-        <p:spPr>
-          <a:xfrm>
-            <a:off x="1763808" y="3348896"/>
-            <a:ext cx="1080000" cy="1080000"/>
-          </a:xfrm>
-          <a:prstGeom prst="rect">
-            <a:avLst/>
-          </a:prstGeom>
-          <a:solidFill>
-            <a:srgbClr val="0070C0"/>
-          </a:solidFill>
-          <a:ln>
-            <a:solidFill>
-              <a:srgbClr val="00B0F0"/>
-            </a:solidFill>
-          </a:ln>
-        </p:spPr>
-        <p:style>
-          <a:lnRef idx="2">
-            <a:schemeClr val="accent1">
-              <a:shade val="50000"/>
-            </a:schemeClr>
-          </a:lnRef>
-          <a:fillRef idx="1">
-            <a:schemeClr val="accent1"/>
-          </a:fillRef>
-          <a:effectRef idx="0">
-            <a:schemeClr val="accent1"/>
-          </a:effectRef>
-          <a:fontRef idx="minor">
-            <a:schemeClr val="lt1"/>
-          </a:fontRef>
-        </p:style>
-        <p:txBody>
-          <a:bodyPr rtlCol="0" anchor="ctr"/>
-          <a:lstStyle/>
-          <a:p>
-            <a:pPr algn="ctr"/>
-            <a:endParaRPr lang="fr-FR"/>
-          </a:p>
-        </p:txBody>
-      </p:sp>
-      <p:sp>
-        <p:nvSpPr>
-          <p:cNvPr id="39" name="Rectangle 38"/>
-          <p:cNvSpPr/>
-          <p:nvPr userDrawn="1"/>
-        </p:nvSpPr>
-        <p:spPr>
-          <a:xfrm>
-            <a:off x="1567874" y="5121327"/>
-            <a:ext cx="1080000" cy="1260000"/>
-          </a:xfrm>
-          <a:prstGeom prst="rect">
-            <a:avLst/>
-          </a:prstGeom>
-          <a:solidFill>
-            <a:srgbClr val="0070C0"/>
-          </a:solidFill>
-          <a:ln>
-            <a:solidFill>
-              <a:srgbClr val="00B0F0"/>
-            </a:solidFill>
-          </a:ln>
-        </p:spPr>
-        <p:style>
-          <a:lnRef idx="2">
-            <a:schemeClr val="accent1">
-              <a:shade val="50000"/>
-            </a:schemeClr>
-          </a:lnRef>
-          <a:fillRef idx="1">
-            <a:schemeClr val="accent1"/>
-          </a:fillRef>
-          <a:effectRef idx="0">
-            <a:schemeClr val="accent1"/>
-          </a:effectRef>
-          <a:fontRef idx="minor">
-            <a:schemeClr val="lt1"/>
-          </a:fontRef>
-        </p:style>
-        <p:txBody>
-          <a:bodyPr rtlCol="0" anchor="ctr"/>
-          <a:lstStyle/>
-          <a:p>
-            <a:pPr algn="ctr"/>
-            <a:endParaRPr lang="fr-FR"/>
-          </a:p>
-        </p:txBody>
-      </p:sp>
-      <p:sp>
-        <p:nvSpPr>
-          <p:cNvPr id="34" name="Rectangle 33"/>
-          <p:cNvSpPr/>
-          <p:nvPr userDrawn="1"/>
-        </p:nvSpPr>
-        <p:spPr>
-          <a:xfrm>
-            <a:off x="262683" y="653602"/>
-            <a:ext cx="1296000" cy="1080000"/>
-          </a:xfrm>
-          <a:prstGeom prst="rect">
-            <a:avLst/>
-          </a:prstGeom>
-          <a:solidFill>
-            <a:srgbClr val="0070C0"/>
-          </a:solidFill>
-          <a:ln>
-            <a:solidFill>
-              <a:srgbClr val="00B0F0"/>
-            </a:solidFill>
-          </a:ln>
-        </p:spPr>
-        <p:style>
-          <a:lnRef idx="2">
-            <a:schemeClr val="accent1">
-              <a:shade val="50000"/>
-            </a:schemeClr>
-          </a:lnRef>
-          <a:fillRef idx="1">
-            <a:schemeClr val="accent1"/>
-          </a:fillRef>
-          <a:effectRef idx="0">
-            <a:schemeClr val="accent1"/>
-          </a:effectRef>
-          <a:fontRef idx="minor">
-            <a:schemeClr val="lt1"/>
-          </a:fontRef>
-        </p:style>
-        <p:txBody>
-          <a:bodyPr rtlCol="0" anchor="ctr"/>
-          <a:lstStyle/>
-          <a:p>
-            <a:pPr algn="ctr"/>
-            <a:endParaRPr lang="fr-FR"/>
-          </a:p>
-        </p:txBody>
-      </p:sp>
-      <p:sp>
-        <p:nvSpPr>
-          <p:cNvPr id="6" name="Espace réservé du texte 5"/>
-          <p:cNvSpPr>
-            <a:spLocks noGrp="1"/>
-          </p:cNvSpPr>
-          <p:nvPr>
-            <p:ph type="body" sz="quarter" idx="10" hasCustomPrompt="1"/>
-          </p:nvPr>
-        </p:nvSpPr>
-        <p:spPr>
-          <a:xfrm>
-            <a:off x="395969" y="1168692"/>
-            <a:ext cx="647700" cy="463648"/>
-          </a:xfrm>
-        </p:spPr>
-        <p:txBody>
-          <a:bodyPr anchor="ctr">
-            <a:noAutofit/>
-          </a:bodyPr>
-          <a:lstStyle>
-            <a:lvl1pPr marL="0" indent="0" algn="ctr">
-              <a:buNone/>
-              <a:defRPr sz="3600" b="1">
-                <a:solidFill>
-                  <a:schemeClr val="bg1"/>
-                </a:solidFill>
-              </a:defRPr>
-            </a:lvl1pPr>
-          </a:lstStyle>
-          <a:p>
-            <a:pPr lvl="0"/>
-            <a:r>
-              <a:rPr lang="fr-FR" dirty="0" smtClean="0"/>
-              <a:t>#</a:t>
-            </a:r>
-            <a:endParaRPr lang="fr-FR" dirty="0"/>
-          </a:p>
-        </p:txBody>
-      </p:sp>
-      <p:sp>
-        <p:nvSpPr>
-          <p:cNvPr id="8" name="ZoneTexte 7"/>
-          <p:cNvSpPr txBox="1"/>
-          <p:nvPr userDrawn="1"/>
-        </p:nvSpPr>
-        <p:spPr>
-          <a:xfrm>
-            <a:off x="249238" y="688190"/>
-            <a:ext cx="1296000" cy="307777"/>
-          </a:xfrm>
-          <a:prstGeom prst="rect">
-            <a:avLst/>
-          </a:prstGeom>
-          <a:noFill/>
-        </p:spPr>
-        <p:txBody>
-          <a:bodyPr wrap="square" rtlCol="0">
-            <a:spAutoFit/>
-          </a:bodyPr>
-          <a:lstStyle/>
-          <a:p>
-            <a:r>
-              <a:rPr lang="fr-FR" sz="1400" b="1" dirty="0" smtClean="0">
-                <a:solidFill>
-                  <a:schemeClr val="bg1"/>
-                </a:solidFill>
-              </a:rPr>
-              <a:t>High </a:t>
-            </a:r>
-            <a:r>
-              <a:rPr lang="fr-FR" sz="1300" b="1" dirty="0" err="1" smtClean="0">
-                <a:solidFill>
-                  <a:schemeClr val="bg1"/>
-                </a:solidFill>
-              </a:rPr>
-              <a:t>Risks</a:t>
-            </a:r>
-            <a:endParaRPr lang="fr-FR" sz="1300" b="1" dirty="0">
-              <a:solidFill>
-                <a:schemeClr val="bg1"/>
-              </a:solidFill>
-            </a:endParaRPr>
-          </a:p>
-        </p:txBody>
-      </p:sp>
-      <p:sp>
-        <p:nvSpPr>
-          <p:cNvPr id="10" name="Espace réservé du texte 5"/>
-          <p:cNvSpPr>
-            <a:spLocks noGrp="1"/>
-          </p:cNvSpPr>
-          <p:nvPr>
-            <p:ph type="body" sz="quarter" idx="11" hasCustomPrompt="1"/>
-          </p:nvPr>
-        </p:nvSpPr>
-        <p:spPr>
-          <a:xfrm>
-            <a:off x="1980084" y="1165152"/>
-            <a:ext cx="647700" cy="463648"/>
-          </a:xfrm>
-        </p:spPr>
-        <p:txBody>
-          <a:bodyPr anchor="ctr">
-            <a:normAutofit/>
-          </a:bodyPr>
-          <a:lstStyle>
-            <a:lvl1pPr marL="0" indent="0" algn="ctr">
-              <a:buNone/>
-              <a:defRPr sz="3200" b="1">
-                <a:solidFill>
-                  <a:schemeClr val="bg1"/>
-                </a:solidFill>
-              </a:defRPr>
-            </a:lvl1pPr>
-          </a:lstStyle>
-          <a:p>
-            <a:pPr lvl="0"/>
-            <a:r>
-              <a:rPr lang="fr-FR" dirty="0" smtClean="0"/>
-              <a:t>#</a:t>
-            </a:r>
-            <a:endParaRPr lang="fr-FR" dirty="0"/>
-          </a:p>
-        </p:txBody>
-      </p:sp>
-      <p:sp>
-        <p:nvSpPr>
-          <p:cNvPr id="11" name="ZoneTexte 10"/>
-          <p:cNvSpPr txBox="1"/>
-          <p:nvPr userDrawn="1"/>
-        </p:nvSpPr>
-        <p:spPr>
-          <a:xfrm>
-            <a:off x="262683" y="3384058"/>
-            <a:ext cx="1282555" cy="307777"/>
-          </a:xfrm>
-          <a:prstGeom prst="rect">
-            <a:avLst/>
-          </a:prstGeom>
-          <a:noFill/>
-        </p:spPr>
-        <p:txBody>
-          <a:bodyPr wrap="square" rtlCol="0">
-            <a:spAutoFit/>
-          </a:bodyPr>
-          <a:lstStyle/>
-          <a:p>
-            <a:r>
-              <a:rPr lang="fr-FR" sz="1400" b="1" dirty="0" smtClean="0">
-                <a:solidFill>
-                  <a:schemeClr val="bg1"/>
-                </a:solidFill>
-              </a:rPr>
-              <a:t>Light</a:t>
-            </a:r>
-            <a:r>
-              <a:rPr lang="fr-FR" sz="1300" b="1" dirty="0" smtClean="0">
-                <a:solidFill>
-                  <a:schemeClr val="bg1"/>
-                </a:solidFill>
-              </a:rPr>
-              <a:t> </a:t>
-            </a:r>
-            <a:r>
-              <a:rPr lang="fr-FR" sz="1300" b="1" dirty="0" err="1" smtClean="0">
-                <a:solidFill>
-                  <a:schemeClr val="bg1"/>
-                </a:solidFill>
-              </a:rPr>
-              <a:t>Risks</a:t>
-            </a:r>
-            <a:endParaRPr lang="fr-FR" sz="1300" b="1" dirty="0">
-              <a:solidFill>
-                <a:schemeClr val="bg1"/>
-              </a:solidFill>
-            </a:endParaRPr>
-          </a:p>
-        </p:txBody>
-      </p:sp>
-      <p:sp>
-        <p:nvSpPr>
-          <p:cNvPr id="13" name="Espace réservé du texte 5"/>
-          <p:cNvSpPr>
-            <a:spLocks noGrp="1"/>
-          </p:cNvSpPr>
-          <p:nvPr>
-            <p:ph type="body" sz="quarter" idx="12" hasCustomPrompt="1"/>
-          </p:nvPr>
-        </p:nvSpPr>
-        <p:spPr>
-          <a:xfrm>
-            <a:off x="409414" y="3832203"/>
-            <a:ext cx="647700" cy="455430"/>
-          </a:xfrm>
-        </p:spPr>
-        <p:txBody>
-          <a:bodyPr anchor="ctr">
-            <a:noAutofit/>
-          </a:bodyPr>
-          <a:lstStyle>
-            <a:lvl1pPr marL="0" indent="0" algn="ctr">
-              <a:buNone/>
-              <a:defRPr sz="3600" b="1">
-                <a:solidFill>
-                  <a:schemeClr val="bg1"/>
-                </a:solidFill>
-              </a:defRPr>
-            </a:lvl1pPr>
-          </a:lstStyle>
-          <a:p>
-            <a:pPr lvl="0"/>
-            <a:r>
-              <a:rPr lang="fr-FR" dirty="0" smtClean="0"/>
-              <a:t>#</a:t>
-            </a:r>
-            <a:endParaRPr lang="fr-FR" dirty="0"/>
-          </a:p>
-        </p:txBody>
-      </p:sp>
-      <p:sp>
-        <p:nvSpPr>
-          <p:cNvPr id="14" name="Espace réservé du texte 5"/>
-          <p:cNvSpPr>
-            <a:spLocks noGrp="1"/>
-          </p:cNvSpPr>
-          <p:nvPr>
-            <p:ph type="body" sz="quarter" idx="13" hasCustomPrompt="1"/>
-          </p:nvPr>
-        </p:nvSpPr>
-        <p:spPr>
-          <a:xfrm>
-            <a:off x="2065825" y="3846709"/>
-            <a:ext cx="647700" cy="455430"/>
-          </a:xfrm>
-        </p:spPr>
-        <p:txBody>
-          <a:bodyPr anchor="ctr">
-            <a:normAutofit/>
-          </a:bodyPr>
-          <a:lstStyle>
-            <a:lvl1pPr marL="0" indent="0" algn="ctr">
-              <a:buNone/>
-              <a:defRPr sz="3200" b="1">
-                <a:solidFill>
-                  <a:schemeClr val="bg1"/>
-                </a:solidFill>
-              </a:defRPr>
-            </a:lvl1pPr>
-          </a:lstStyle>
-          <a:p>
-            <a:pPr lvl="0"/>
-            <a:r>
-              <a:rPr lang="fr-FR" dirty="0" smtClean="0"/>
-              <a:t>#</a:t>
-            </a:r>
-            <a:endParaRPr lang="fr-FR" dirty="0"/>
-          </a:p>
-        </p:txBody>
-      </p:sp>
-      <p:sp>
-        <p:nvSpPr>
-          <p:cNvPr id="15" name="ZoneTexte 14"/>
-          <p:cNvSpPr txBox="1"/>
-          <p:nvPr userDrawn="1"/>
-        </p:nvSpPr>
-        <p:spPr>
-          <a:xfrm>
-            <a:off x="262683" y="4690011"/>
-            <a:ext cx="2385191" cy="323165"/>
-          </a:xfrm>
-          <a:prstGeom prst="rect">
-            <a:avLst/>
-          </a:prstGeom>
-          <a:noFill/>
-        </p:spPr>
-        <p:txBody>
-          <a:bodyPr wrap="square" rtlCol="0">
-            <a:spAutoFit/>
-          </a:bodyPr>
-          <a:lstStyle/>
-          <a:p>
-            <a:r>
-              <a:rPr lang="fr-FR" sz="1500" b="1" dirty="0" smtClean="0">
-                <a:solidFill>
-                  <a:schemeClr val="accent4">
-                    <a:lumMod val="50000"/>
-                  </a:schemeClr>
-                </a:solidFill>
-              </a:rPr>
-              <a:t>Total </a:t>
-            </a:r>
-            <a:r>
-              <a:rPr lang="fr-FR" sz="1500" b="1" dirty="0" err="1" smtClean="0">
-                <a:solidFill>
-                  <a:schemeClr val="accent4">
-                    <a:lumMod val="50000"/>
-                  </a:schemeClr>
-                </a:solidFill>
-              </a:rPr>
-              <a:t>Number</a:t>
-            </a:r>
-            <a:r>
-              <a:rPr lang="fr-FR" sz="1500" b="1" dirty="0" smtClean="0">
-                <a:solidFill>
-                  <a:schemeClr val="accent4">
-                    <a:lumMod val="50000"/>
-                  </a:schemeClr>
-                </a:solidFill>
-              </a:rPr>
-              <a:t> of </a:t>
-            </a:r>
-            <a:r>
-              <a:rPr lang="fr-FR" sz="1500" b="1" dirty="0" err="1" smtClean="0">
-                <a:solidFill>
-                  <a:schemeClr val="accent4">
-                    <a:lumMod val="50000"/>
-                  </a:schemeClr>
-                </a:solidFill>
-              </a:rPr>
-              <a:t>Objects</a:t>
-            </a:r>
-            <a:endParaRPr lang="fr-FR" sz="1500" b="1" dirty="0">
-              <a:solidFill>
-                <a:schemeClr val="accent4">
-                  <a:lumMod val="50000"/>
-                </a:schemeClr>
-              </a:solidFill>
-            </a:endParaRPr>
-          </a:p>
-        </p:txBody>
-      </p:sp>
-      <p:sp>
-        <p:nvSpPr>
-          <p:cNvPr id="17" name="Espace réservé du texte 5"/>
-          <p:cNvSpPr>
-            <a:spLocks noGrp="1"/>
-          </p:cNvSpPr>
-          <p:nvPr>
-            <p:ph type="body" sz="quarter" idx="14" hasCustomPrompt="1"/>
-          </p:nvPr>
-        </p:nvSpPr>
-        <p:spPr>
-          <a:xfrm>
-            <a:off x="472542" y="5691323"/>
-            <a:ext cx="647700" cy="503238"/>
-          </a:xfrm>
-        </p:spPr>
-        <p:txBody>
-          <a:bodyPr anchor="ctr">
-            <a:noAutofit/>
-          </a:bodyPr>
-          <a:lstStyle>
-            <a:lvl1pPr marL="0" indent="0" algn="ctr">
-              <a:buNone/>
-              <a:defRPr sz="3600" b="1">
-                <a:solidFill>
-                  <a:schemeClr val="bg1"/>
-                </a:solidFill>
-              </a:defRPr>
-            </a:lvl1pPr>
-          </a:lstStyle>
-          <a:p>
-            <a:pPr lvl="0"/>
-            <a:r>
-              <a:rPr lang="fr-FR" dirty="0" smtClean="0"/>
-              <a:t>#</a:t>
-            </a:r>
-            <a:endParaRPr lang="fr-FR" dirty="0"/>
-          </a:p>
-        </p:txBody>
-      </p:sp>
-      <p:sp>
-        <p:nvSpPr>
-          <p:cNvPr id="18" name="ZoneTexte 17"/>
-          <p:cNvSpPr txBox="1"/>
-          <p:nvPr userDrawn="1"/>
-        </p:nvSpPr>
-        <p:spPr>
-          <a:xfrm>
-            <a:off x="233986" y="5222257"/>
-            <a:ext cx="1080000" cy="369332"/>
-          </a:xfrm>
-          <a:prstGeom prst="rect">
-            <a:avLst/>
-          </a:prstGeom>
-          <a:noFill/>
-        </p:spPr>
-        <p:txBody>
-          <a:bodyPr wrap="square" rtlCol="0">
-            <a:spAutoFit/>
-          </a:bodyPr>
-          <a:lstStyle/>
-          <a:p>
-            <a:pPr algn="ctr"/>
-            <a:r>
-              <a:rPr lang="fr-FR" b="1" dirty="0" err="1" smtClean="0">
-                <a:solidFill>
-                  <a:schemeClr val="bg1"/>
-                </a:solidFill>
-              </a:rPr>
-              <a:t>eIoT</a:t>
-            </a:r>
-            <a:endParaRPr lang="fr-FR" b="1" dirty="0">
-              <a:solidFill>
-                <a:schemeClr val="bg1"/>
-              </a:solidFill>
-            </a:endParaRPr>
-          </a:p>
-        </p:txBody>
-      </p:sp>
-      <p:sp>
-        <p:nvSpPr>
-          <p:cNvPr id="19" name="ZoneTexte 18"/>
-          <p:cNvSpPr txBox="1"/>
-          <p:nvPr userDrawn="1"/>
-        </p:nvSpPr>
-        <p:spPr>
-          <a:xfrm>
-            <a:off x="1567873" y="5219955"/>
-            <a:ext cx="1051303" cy="369332"/>
-          </a:xfrm>
-          <a:prstGeom prst="rect">
-            <a:avLst/>
-          </a:prstGeom>
-          <a:noFill/>
-        </p:spPr>
-        <p:txBody>
-          <a:bodyPr wrap="square" rtlCol="0">
-            <a:spAutoFit/>
-          </a:bodyPr>
-          <a:lstStyle/>
-          <a:p>
-            <a:pPr algn="ctr"/>
-            <a:r>
-              <a:rPr lang="fr-FR" b="1" dirty="0" smtClean="0">
-                <a:solidFill>
-                  <a:schemeClr val="bg1"/>
-                </a:solidFill>
-              </a:rPr>
-              <a:t>B2C</a:t>
-            </a:r>
-            <a:endParaRPr lang="fr-FR" b="1" dirty="0">
-              <a:solidFill>
-                <a:schemeClr val="bg1"/>
-              </a:solidFill>
-            </a:endParaRPr>
-          </a:p>
-        </p:txBody>
-      </p:sp>
-      <p:sp>
-        <p:nvSpPr>
-          <p:cNvPr id="20" name="Espace réservé du texte 5"/>
-          <p:cNvSpPr>
-            <a:spLocks noGrp="1"/>
-          </p:cNvSpPr>
-          <p:nvPr>
-            <p:ph type="body" sz="quarter" idx="15" hasCustomPrompt="1"/>
-          </p:nvPr>
-        </p:nvSpPr>
-        <p:spPr>
-          <a:xfrm>
-            <a:off x="1805912" y="5689021"/>
-            <a:ext cx="647700" cy="503238"/>
-          </a:xfrm>
-        </p:spPr>
-        <p:txBody>
-          <a:bodyPr anchor="ctr">
-            <a:normAutofit/>
-          </a:bodyPr>
-          <a:lstStyle>
-            <a:lvl1pPr marL="0" indent="0" algn="ctr">
-              <a:buNone/>
-              <a:defRPr sz="3200" b="1">
-                <a:solidFill>
-                  <a:schemeClr val="bg1"/>
-                </a:solidFill>
-              </a:defRPr>
-            </a:lvl1pPr>
-          </a:lstStyle>
-          <a:p>
-            <a:pPr lvl="0"/>
-            <a:r>
-              <a:rPr lang="fr-FR" dirty="0" smtClean="0"/>
-              <a:t>#</a:t>
-            </a:r>
-            <a:endParaRPr lang="fr-FR" dirty="0"/>
-          </a:p>
-        </p:txBody>
-      </p:sp>
-      <p:sp>
-        <p:nvSpPr>
-          <p:cNvPr id="21" name="ZoneTexte 20"/>
-          <p:cNvSpPr txBox="1"/>
-          <p:nvPr userDrawn="1"/>
-        </p:nvSpPr>
-        <p:spPr>
-          <a:xfrm>
-            <a:off x="492516" y="32008"/>
-            <a:ext cx="1915909" cy="369332"/>
-          </a:xfrm>
-          <a:prstGeom prst="rect">
-            <a:avLst/>
-          </a:prstGeom>
-          <a:noFill/>
-        </p:spPr>
-        <p:txBody>
-          <a:bodyPr wrap="none" rtlCol="0">
-            <a:spAutoFit/>
-          </a:bodyPr>
-          <a:lstStyle/>
-          <a:p>
-            <a:r>
-              <a:rPr lang="fr-FR" b="1" dirty="0" smtClean="0">
-                <a:solidFill>
-                  <a:schemeClr val="accent4">
-                    <a:lumMod val="50000"/>
-                  </a:schemeClr>
-                </a:solidFill>
-              </a:rPr>
-              <a:t>Quick </a:t>
-            </a:r>
-            <a:r>
-              <a:rPr lang="fr-FR" b="1" dirty="0" err="1" smtClean="0">
-                <a:solidFill>
-                  <a:schemeClr val="accent4">
-                    <a:lumMod val="50000"/>
-                  </a:schemeClr>
-                </a:solidFill>
-              </a:rPr>
-              <a:t>Overview</a:t>
-            </a:r>
-            <a:endParaRPr lang="fr-FR" b="1" dirty="0">
-              <a:solidFill>
-                <a:schemeClr val="accent4">
-                  <a:lumMod val="50000"/>
-                </a:schemeClr>
-              </a:solidFill>
-            </a:endParaRPr>
-          </a:p>
-        </p:txBody>
-      </p:sp>
-      <p:sp>
-        <p:nvSpPr>
-          <p:cNvPr id="23" name="ZoneTexte 22"/>
-          <p:cNvSpPr txBox="1"/>
-          <p:nvPr userDrawn="1"/>
-        </p:nvSpPr>
-        <p:spPr>
-          <a:xfrm>
-            <a:off x="3275856" y="62568"/>
-            <a:ext cx="3147015" cy="369332"/>
-          </a:xfrm>
-          <a:prstGeom prst="rect">
-            <a:avLst/>
-          </a:prstGeom>
-          <a:noFill/>
-        </p:spPr>
-        <p:txBody>
-          <a:bodyPr wrap="none" rtlCol="0">
-            <a:spAutoFit/>
-          </a:bodyPr>
-          <a:lstStyle/>
-          <a:p>
-            <a:r>
-              <a:rPr lang="fr-FR" b="1" dirty="0" smtClean="0">
-                <a:solidFill>
-                  <a:schemeClr val="accent4">
-                    <a:lumMod val="50000"/>
-                  </a:schemeClr>
-                </a:solidFill>
-              </a:rPr>
-              <a:t>Security </a:t>
-            </a:r>
-            <a:r>
-              <a:rPr lang="fr-FR" b="1" dirty="0" err="1" smtClean="0">
-                <a:solidFill>
-                  <a:schemeClr val="accent4">
-                    <a:lumMod val="50000"/>
-                  </a:schemeClr>
-                </a:solidFill>
-              </a:rPr>
-              <a:t>Process</a:t>
-            </a:r>
-            <a:r>
-              <a:rPr lang="fr-FR" b="1" dirty="0" smtClean="0">
-                <a:solidFill>
-                  <a:schemeClr val="accent4">
-                    <a:lumMod val="50000"/>
-                  </a:schemeClr>
-                </a:solidFill>
-              </a:rPr>
-              <a:t> </a:t>
-            </a:r>
-            <a:r>
-              <a:rPr lang="fr-FR" b="1" dirty="0" err="1" smtClean="0">
-                <a:solidFill>
-                  <a:schemeClr val="accent4">
-                    <a:lumMod val="50000"/>
-                  </a:schemeClr>
-                </a:solidFill>
-              </a:rPr>
-              <a:t>Overview</a:t>
-            </a:r>
-            <a:endParaRPr lang="fr-FR" b="1" dirty="0">
-              <a:solidFill>
-                <a:schemeClr val="accent4">
-                  <a:lumMod val="50000"/>
-                </a:schemeClr>
-              </a:solidFill>
-            </a:endParaRPr>
-          </a:p>
-        </p:txBody>
-      </p:sp>
-      <p:sp>
-        <p:nvSpPr>
-          <p:cNvPr id="24" name="ZoneTexte 23"/>
-          <p:cNvSpPr txBox="1"/>
-          <p:nvPr userDrawn="1"/>
-        </p:nvSpPr>
-        <p:spPr>
-          <a:xfrm>
-            <a:off x="3635895" y="3825915"/>
-            <a:ext cx="3240361" cy="323165"/>
-          </a:xfrm>
-          <a:prstGeom prst="rect">
-            <a:avLst/>
-          </a:prstGeom>
-          <a:noFill/>
-        </p:spPr>
-        <p:txBody>
-          <a:bodyPr wrap="square" rtlCol="0">
-            <a:spAutoFit/>
-          </a:bodyPr>
-          <a:lstStyle/>
-          <a:p>
-            <a:r>
-              <a:rPr lang="fr-FR" sz="1500" b="1" dirty="0" smtClean="0">
-                <a:solidFill>
-                  <a:schemeClr val="accent4">
-                    <a:lumMod val="50000"/>
-                  </a:schemeClr>
-                </a:solidFill>
-              </a:rPr>
-              <a:t>Top 5 </a:t>
-            </a:r>
-            <a:r>
-              <a:rPr lang="fr-FR" sz="1500" b="1" dirty="0" err="1" smtClean="0">
-                <a:solidFill>
-                  <a:schemeClr val="accent4">
-                    <a:lumMod val="50000"/>
-                  </a:schemeClr>
-                </a:solidFill>
-              </a:rPr>
-              <a:t>most</a:t>
-            </a:r>
-            <a:r>
-              <a:rPr lang="fr-FR" sz="1500" b="1" dirty="0" smtClean="0">
-                <a:solidFill>
-                  <a:schemeClr val="accent4">
-                    <a:lumMod val="50000"/>
-                  </a:schemeClr>
-                </a:solidFill>
-              </a:rPr>
-              <a:t> </a:t>
-            </a:r>
-            <a:r>
-              <a:rPr lang="fr-FR" sz="1500" b="1" dirty="0" err="1" smtClean="0">
-                <a:solidFill>
-                  <a:schemeClr val="accent4">
-                    <a:lumMod val="50000"/>
-                  </a:schemeClr>
-                </a:solidFill>
-              </a:rPr>
-              <a:t>vulnerable</a:t>
-            </a:r>
-            <a:r>
-              <a:rPr lang="fr-FR" sz="1500" b="1" dirty="0" smtClean="0">
-                <a:solidFill>
-                  <a:schemeClr val="accent4">
-                    <a:lumMod val="50000"/>
-                  </a:schemeClr>
-                </a:solidFill>
-              </a:rPr>
-              <a:t> </a:t>
-            </a:r>
-            <a:r>
-              <a:rPr lang="fr-FR" sz="1500" b="1" dirty="0" err="1" smtClean="0">
-                <a:solidFill>
-                  <a:schemeClr val="accent4">
-                    <a:lumMod val="50000"/>
-                  </a:schemeClr>
-                </a:solidFill>
-              </a:rPr>
-              <a:t>Devices</a:t>
-            </a:r>
-            <a:endParaRPr lang="fr-FR" sz="1500" b="1" dirty="0">
-              <a:solidFill>
-                <a:schemeClr val="accent4">
-                  <a:lumMod val="50000"/>
-                </a:schemeClr>
-              </a:solidFill>
-            </a:endParaRPr>
-          </a:p>
-        </p:txBody>
-      </p:sp>
-      <p:sp>
-        <p:nvSpPr>
-          <p:cNvPr id="25" name="ZoneTexte 24"/>
-          <p:cNvSpPr txBox="1"/>
-          <p:nvPr userDrawn="1"/>
-        </p:nvSpPr>
-        <p:spPr>
-          <a:xfrm>
-            <a:off x="3635895" y="657412"/>
-            <a:ext cx="2828367" cy="323165"/>
-          </a:xfrm>
-          <a:prstGeom prst="rect">
-            <a:avLst/>
-          </a:prstGeom>
-          <a:noFill/>
-        </p:spPr>
-        <p:txBody>
-          <a:bodyPr wrap="square" rtlCol="0">
-            <a:spAutoFit/>
-          </a:bodyPr>
-          <a:lstStyle/>
-          <a:p>
-            <a:r>
-              <a:rPr lang="fr-FR" sz="1500" b="1" dirty="0" smtClean="0">
-                <a:solidFill>
-                  <a:schemeClr val="accent4">
-                    <a:lumMod val="50000"/>
-                  </a:schemeClr>
-                </a:solidFill>
-              </a:rPr>
-              <a:t>Security Phase </a:t>
-            </a:r>
-            <a:r>
-              <a:rPr lang="fr-FR" sz="1500" b="1" dirty="0" err="1" smtClean="0">
-                <a:solidFill>
-                  <a:schemeClr val="accent4">
-                    <a:lumMod val="50000"/>
-                  </a:schemeClr>
-                </a:solidFill>
-              </a:rPr>
-              <a:t>Overview</a:t>
-            </a:r>
-            <a:endParaRPr lang="fr-FR" sz="1500" b="1" dirty="0">
-              <a:solidFill>
-                <a:schemeClr val="accent4">
-                  <a:lumMod val="50000"/>
-                </a:schemeClr>
-              </a:solidFill>
-            </a:endParaRPr>
-          </a:p>
-        </p:txBody>
-      </p:sp>
-      <p:sp>
-        <p:nvSpPr>
-          <p:cNvPr id="26" name="Rectangle 25"/>
-          <p:cNvSpPr/>
-          <p:nvPr userDrawn="1"/>
-        </p:nvSpPr>
-        <p:spPr>
-          <a:xfrm>
-            <a:off x="249238" y="2000304"/>
-            <a:ext cx="1299600" cy="1080000"/>
-          </a:xfrm>
-          <a:prstGeom prst="rect">
-            <a:avLst/>
-          </a:prstGeom>
-          <a:solidFill>
-            <a:srgbClr val="0070C0"/>
-          </a:solidFill>
-          <a:ln>
-            <a:solidFill>
-              <a:srgbClr val="00B0F0"/>
-            </a:solidFill>
-          </a:ln>
-        </p:spPr>
-        <p:style>
-          <a:lnRef idx="2">
-            <a:schemeClr val="accent1">
-              <a:shade val="50000"/>
-            </a:schemeClr>
-          </a:lnRef>
-          <a:fillRef idx="1">
-            <a:schemeClr val="accent1"/>
-          </a:fillRef>
-          <a:effectRef idx="0">
-            <a:schemeClr val="accent1"/>
-          </a:effectRef>
-          <a:fontRef idx="minor">
-            <a:schemeClr val="lt1"/>
-          </a:fontRef>
-        </p:style>
-        <p:txBody>
-          <a:bodyPr rtlCol="0" anchor="ctr"/>
-          <a:lstStyle/>
-          <a:p>
-            <a:pPr algn="ctr"/>
-            <a:endParaRPr lang="fr-FR"/>
-          </a:p>
-        </p:txBody>
-      </p:sp>
-      <p:sp>
-        <p:nvSpPr>
-          <p:cNvPr id="27" name="Rectangle 26"/>
-          <p:cNvSpPr/>
-          <p:nvPr userDrawn="1"/>
-        </p:nvSpPr>
-        <p:spPr>
-          <a:xfrm>
-            <a:off x="1768629" y="2000304"/>
-            <a:ext cx="1080000" cy="1080000"/>
-          </a:xfrm>
-          <a:prstGeom prst="rect">
-            <a:avLst/>
-          </a:prstGeom>
-          <a:solidFill>
-            <a:srgbClr val="0070C0"/>
-          </a:solidFill>
-          <a:ln>
-            <a:solidFill>
-              <a:srgbClr val="00B0F0"/>
-            </a:solidFill>
-          </a:ln>
-        </p:spPr>
-        <p:style>
-          <a:lnRef idx="2">
-            <a:schemeClr val="accent1">
-              <a:shade val="50000"/>
-            </a:schemeClr>
-          </a:lnRef>
-          <a:fillRef idx="1">
-            <a:schemeClr val="accent1"/>
-          </a:fillRef>
-          <a:effectRef idx="0">
-            <a:schemeClr val="accent1"/>
-          </a:effectRef>
-          <a:fontRef idx="minor">
-            <a:schemeClr val="lt1"/>
-          </a:fontRef>
-        </p:style>
-        <p:txBody>
-          <a:bodyPr rtlCol="0" anchor="ctr"/>
-          <a:lstStyle/>
-          <a:p>
-            <a:pPr algn="ctr"/>
-            <a:endParaRPr lang="fr-FR"/>
-          </a:p>
-        </p:txBody>
-      </p:sp>
-      <p:sp>
-        <p:nvSpPr>
-          <p:cNvPr id="28" name="ZoneTexte 27"/>
-          <p:cNvSpPr txBox="1"/>
-          <p:nvPr userDrawn="1"/>
-        </p:nvSpPr>
-        <p:spPr>
-          <a:xfrm>
-            <a:off x="235793" y="2000304"/>
-            <a:ext cx="1349274" cy="307777"/>
-          </a:xfrm>
-          <a:prstGeom prst="rect">
-            <a:avLst/>
-          </a:prstGeom>
-          <a:noFill/>
-        </p:spPr>
-        <p:txBody>
-          <a:bodyPr wrap="square" rtlCol="0">
-            <a:spAutoFit/>
-          </a:bodyPr>
-          <a:lstStyle/>
-          <a:p>
-            <a:r>
-              <a:rPr lang="fr-FR" sz="1400" b="1" dirty="0" smtClean="0">
-                <a:solidFill>
-                  <a:schemeClr val="bg1"/>
-                </a:solidFill>
-              </a:rPr>
-              <a:t>Medium</a:t>
-            </a:r>
-            <a:r>
-              <a:rPr lang="fr-FR" sz="1300" b="1" baseline="0" dirty="0" smtClean="0">
-                <a:solidFill>
-                  <a:schemeClr val="bg1"/>
-                </a:solidFill>
-              </a:rPr>
-              <a:t> </a:t>
-            </a:r>
-            <a:r>
-              <a:rPr lang="fr-FR" sz="1300" b="1" dirty="0" err="1" smtClean="0">
-                <a:solidFill>
-                  <a:schemeClr val="bg1"/>
-                </a:solidFill>
-              </a:rPr>
-              <a:t>Risks</a:t>
-            </a:r>
-            <a:endParaRPr lang="fr-FR" sz="1300" b="1" dirty="0">
-              <a:solidFill>
-                <a:schemeClr val="bg1"/>
-              </a:solidFill>
-            </a:endParaRPr>
-          </a:p>
-        </p:txBody>
-      </p:sp>
-      <p:sp>
-        <p:nvSpPr>
-          <p:cNvPr id="29" name="ZoneTexte 28"/>
-          <p:cNvSpPr txBox="1"/>
-          <p:nvPr userDrawn="1"/>
-        </p:nvSpPr>
-        <p:spPr>
-          <a:xfrm>
-            <a:off x="1805912" y="2016261"/>
-            <a:ext cx="979502" cy="261610"/>
-          </a:xfrm>
-          <a:prstGeom prst="rect">
-            <a:avLst/>
-          </a:prstGeom>
-          <a:noFill/>
-        </p:spPr>
-        <p:txBody>
-          <a:bodyPr wrap="square" rtlCol="0">
-            <a:spAutoFit/>
-          </a:bodyPr>
-          <a:lstStyle/>
-          <a:p>
-            <a:r>
-              <a:rPr lang="fr-FR" sz="1100" b="1" dirty="0" smtClean="0">
-                <a:solidFill>
-                  <a:schemeClr val="bg1"/>
-                </a:solidFill>
-              </a:rPr>
-              <a:t>Last </a:t>
-            </a:r>
-            <a:r>
-              <a:rPr lang="fr-FR" sz="1100" b="1" dirty="0" err="1" smtClean="0">
-                <a:solidFill>
-                  <a:schemeClr val="bg1"/>
-                </a:solidFill>
-              </a:rPr>
-              <a:t>month</a:t>
-            </a:r>
-            <a:endParaRPr lang="fr-FR" sz="1100" b="1" dirty="0">
-              <a:solidFill>
-                <a:schemeClr val="bg1"/>
-              </a:solidFill>
-            </a:endParaRPr>
-          </a:p>
-        </p:txBody>
-      </p:sp>
-      <p:sp>
-        <p:nvSpPr>
-          <p:cNvPr id="32" name="ZoneTexte 31"/>
-          <p:cNvSpPr txBox="1"/>
-          <p:nvPr userDrawn="1"/>
-        </p:nvSpPr>
-        <p:spPr>
-          <a:xfrm>
-            <a:off x="1805912" y="688190"/>
-            <a:ext cx="979502" cy="261610"/>
-          </a:xfrm>
-          <a:prstGeom prst="rect">
-            <a:avLst/>
-          </a:prstGeom>
-          <a:noFill/>
-        </p:spPr>
-        <p:txBody>
-          <a:bodyPr wrap="square" rtlCol="0">
-            <a:spAutoFit/>
-          </a:bodyPr>
-          <a:lstStyle/>
-          <a:p>
-            <a:r>
-              <a:rPr lang="fr-FR" sz="1100" b="1" dirty="0" smtClean="0">
-                <a:solidFill>
-                  <a:schemeClr val="bg1"/>
-                </a:solidFill>
-              </a:rPr>
-              <a:t>Last </a:t>
-            </a:r>
-            <a:r>
-              <a:rPr lang="fr-FR" sz="1100" b="1" dirty="0" err="1" smtClean="0">
-                <a:solidFill>
-                  <a:schemeClr val="bg1"/>
-                </a:solidFill>
-              </a:rPr>
-              <a:t>month</a:t>
-            </a:r>
-            <a:endParaRPr lang="fr-FR" sz="1100" b="1" dirty="0">
-              <a:solidFill>
-                <a:schemeClr val="bg1"/>
-              </a:solidFill>
-            </a:endParaRPr>
-          </a:p>
-        </p:txBody>
-      </p:sp>
-      <p:sp>
-        <p:nvSpPr>
-          <p:cNvPr id="33" name="ZoneTexte 32"/>
-          <p:cNvSpPr txBox="1"/>
-          <p:nvPr userDrawn="1"/>
-        </p:nvSpPr>
-        <p:spPr>
-          <a:xfrm>
-            <a:off x="1805912" y="3398888"/>
-            <a:ext cx="979502" cy="261610"/>
-          </a:xfrm>
-          <a:prstGeom prst="rect">
-            <a:avLst/>
-          </a:prstGeom>
-          <a:noFill/>
-        </p:spPr>
-        <p:txBody>
-          <a:bodyPr wrap="square" rtlCol="0">
-            <a:spAutoFit/>
-          </a:bodyPr>
-          <a:lstStyle/>
-          <a:p>
-            <a:r>
-              <a:rPr lang="fr-FR" sz="1100" b="1" dirty="0" smtClean="0">
-                <a:solidFill>
-                  <a:schemeClr val="bg1"/>
-                </a:solidFill>
-              </a:rPr>
-              <a:t>Last </a:t>
-            </a:r>
-            <a:r>
-              <a:rPr lang="fr-FR" sz="1100" b="1" dirty="0" err="1" smtClean="0">
-                <a:solidFill>
-                  <a:schemeClr val="bg1"/>
-                </a:solidFill>
-              </a:rPr>
-              <a:t>month</a:t>
-            </a:r>
-            <a:endParaRPr lang="fr-FR" sz="1100" b="1" dirty="0">
-              <a:solidFill>
-                <a:schemeClr val="bg1"/>
-              </a:solidFill>
-            </a:endParaRPr>
-          </a:p>
-        </p:txBody>
-      </p:sp>
-      <p:sp>
-        <p:nvSpPr>
-          <p:cNvPr id="3" name="Espace réservé du contenu 2"/>
-          <p:cNvSpPr>
-            <a:spLocks noGrp="1"/>
-          </p:cNvSpPr>
-          <p:nvPr>
-            <p:ph sz="quarter" idx="18" hasCustomPrompt="1"/>
-          </p:nvPr>
-        </p:nvSpPr>
-        <p:spPr>
-          <a:xfrm>
-            <a:off x="395969" y="2477088"/>
-            <a:ext cx="648000" cy="464400"/>
-          </a:xfrm>
-        </p:spPr>
-        <p:txBody>
-          <a:bodyPr anchor="ctr">
-            <a:noAutofit/>
-          </a:bodyPr>
-          <a:lstStyle>
-            <a:lvl1pPr marL="0" indent="0" algn="ctr">
-              <a:buNone/>
-              <a:defRPr sz="3600" b="1">
-                <a:solidFill>
-                  <a:schemeClr val="bg1"/>
-                </a:solidFill>
-              </a:defRPr>
-            </a:lvl1pPr>
-          </a:lstStyle>
-          <a:p>
-            <a:pPr lvl="0"/>
-            <a:r>
-              <a:rPr lang="fr-FR" dirty="0" smtClean="0"/>
-              <a:t>#</a:t>
-            </a:r>
-            <a:endParaRPr lang="fr-FR" dirty="0"/>
-          </a:p>
-        </p:txBody>
-      </p:sp>
-      <p:sp>
-        <p:nvSpPr>
-          <p:cNvPr id="40" name="Espace réservé du texte 5"/>
-          <p:cNvSpPr>
-            <a:spLocks noGrp="1"/>
-          </p:cNvSpPr>
-          <p:nvPr>
-            <p:ph type="body" sz="quarter" idx="19" hasCustomPrompt="1"/>
-          </p:nvPr>
-        </p:nvSpPr>
-        <p:spPr>
-          <a:xfrm>
-            <a:off x="1980084" y="2491299"/>
-            <a:ext cx="647700" cy="463648"/>
-          </a:xfrm>
-        </p:spPr>
-        <p:txBody>
-          <a:bodyPr anchor="ctr">
-            <a:normAutofit/>
-          </a:bodyPr>
-          <a:lstStyle>
-            <a:lvl1pPr marL="0" indent="0" algn="ctr">
-              <a:buNone/>
-              <a:defRPr sz="3200" b="1">
-                <a:solidFill>
-                  <a:schemeClr val="bg1"/>
-                </a:solidFill>
-              </a:defRPr>
-            </a:lvl1pPr>
-          </a:lstStyle>
-          <a:p>
-            <a:pPr lvl="0"/>
-            <a:r>
-              <a:rPr lang="fr-FR" dirty="0" smtClean="0"/>
-              <a:t>#</a:t>
-            </a:r>
-            <a:endParaRPr lang="fr-FR" dirty="0"/>
-          </a:p>
-        </p:txBody>
-      </p:sp>
-    </p:spTree>
-    <p:extLst/>
-  </p:cSld>
-  <p:clrMapOvr>
-    <a:masterClrMapping/>
-  </p:clrMapOvr>
-</p:sldLayout>
-</file>
-
-<file path=ppt/slideLayouts/slideLayout20.xml><?xml version="1.0" encoding="utf-8"?>
+<file path=ppt/slideLayouts/slideLayout21.xml><?xml version="1.0" encoding="utf-8"?>
 <p:sldLayout xmlns:a="http://schemas.openxmlformats.org/drawingml/2006/main" xmlns:r="http://schemas.openxmlformats.org/officeDocument/2006/relationships" xmlns:p="http://schemas.openxmlformats.org/presentationml/2006/main" preserve="1" userDrawn="1">
   <p:cSld name="image pleine page">
     <p:spTree>
@@ -7487,7 +7670,7 @@
 </p:sldLayout>
 </file>
 
-<file path=ppt/slideLayouts/slideLayout21.xml><?xml version="1.0" encoding="utf-8"?>
+<file path=ppt/slideLayouts/slideLayout22.xml><?xml version="1.0" encoding="utf-8"?>
 <p:sldLayout xmlns:a="http://schemas.openxmlformats.org/drawingml/2006/main" xmlns:r="http://schemas.openxmlformats.org/officeDocument/2006/relationships" xmlns:p="http://schemas.openxmlformats.org/presentationml/2006/main" preserve="1" userDrawn="1">
   <p:cSld name="diagramme">
     <p:spTree>
@@ -7640,7 +7823,7 @@
 </p:sldLayout>
 </file>
 
-<file path=ppt/slideLayouts/slideLayout22.xml><?xml version="1.0" encoding="utf-8"?>
+<file path=ppt/slideLayouts/slideLayout23.xml><?xml version="1.0" encoding="utf-8"?>
 <p:sldLayout xmlns:a="http://schemas.openxmlformats.org/drawingml/2006/main" xmlns:r="http://schemas.openxmlformats.org/officeDocument/2006/relationships" xmlns:p="http://schemas.openxmlformats.org/presentationml/2006/main" preserve="1" userDrawn="1">
   <p:cSld name="résumé">
     <p:spTree>
@@ -7761,7 +7944,7 @@
 </p:sldLayout>
 </file>
 
-<file path=ppt/slideLayouts/slideLayout23.xml><?xml version="1.0" encoding="utf-8"?>
+<file path=ppt/slideLayouts/slideLayout24.xml><?xml version="1.0" encoding="utf-8"?>
 <p:sldLayout xmlns:a="http://schemas.openxmlformats.org/drawingml/2006/main" xmlns:r="http://schemas.openxmlformats.org/officeDocument/2006/relationships" xmlns:p="http://schemas.openxmlformats.org/presentationml/2006/main" preserve="1" userDrawn="1">
   <p:cSld name="merci">
     <p:spTree>
@@ -7874,7 +8057,132 @@
 </file>
 
 <file path=ppt/slideLayouts/slideLayout3.xml><?xml version="1.0" encoding="utf-8"?>
-<p:sldLayout xmlns:a="http://schemas.openxmlformats.org/drawingml/2006/main" xmlns:r="http://schemas.openxmlformats.org/officeDocument/2006/relationships" xmlns:p="http://schemas.openxmlformats.org/presentationml/2006/main" preserve="1" userDrawn="1">
+<p:sldLayout xmlns:a="http://schemas.openxmlformats.org/drawingml/2006/main" xmlns:r="http://schemas.openxmlformats.org/officeDocument/2006/relationships" xmlns:p="http://schemas.openxmlformats.org/presentationml/2006/main" showMasterSp="0" preserve="1" userDrawn="1">
+  <p:cSld name="4_Disposition personnalisée">
+    <p:spTree>
+      <p:nvGrpSpPr>
+        <p:cNvPr id="1" name=""/>
+        <p:cNvGrpSpPr/>
+        <p:nvPr/>
+      </p:nvGrpSpPr>
+      <p:grpSpPr>
+        <a:xfrm>
+          <a:off x="0" y="0"/>
+          <a:ext cx="0" cy="0"/>
+          <a:chOff x="0" y="0"/>
+          <a:chExt cx="0" cy="0"/>
+        </a:xfrm>
+      </p:grpSpPr>
+      <p:sp>
+        <p:nvSpPr>
+          <p:cNvPr id="3" name="ZoneTexte 2"/>
+          <p:cNvSpPr txBox="1"/>
+          <p:nvPr userDrawn="1"/>
+        </p:nvSpPr>
+        <p:spPr>
+          <a:xfrm>
+            <a:off x="235793" y="32008"/>
+            <a:ext cx="2608015" cy="369332"/>
+          </a:xfrm>
+          <a:prstGeom prst="rect">
+            <a:avLst/>
+          </a:prstGeom>
+          <a:noFill/>
+        </p:spPr>
+        <p:txBody>
+          <a:bodyPr wrap="square" rtlCol="0">
+            <a:spAutoFit/>
+          </a:bodyPr>
+          <a:lstStyle/>
+          <a:p>
+            <a:r>
+              <a:rPr lang="fr-FR" b="1" dirty="0" err="1" smtClean="0">
+                <a:solidFill>
+                  <a:schemeClr val="accent4">
+                    <a:lumMod val="50000"/>
+                  </a:schemeClr>
+                </a:solidFill>
+              </a:rPr>
+              <a:t>Efficiency</a:t>
+            </a:r>
+            <a:endParaRPr lang="fr-FR" b="1" dirty="0">
+              <a:solidFill>
+                <a:schemeClr val="accent4">
+                  <a:lumMod val="50000"/>
+                </a:schemeClr>
+              </a:solidFill>
+            </a:endParaRPr>
+          </a:p>
+        </p:txBody>
+      </p:sp>
+      <p:sp>
+        <p:nvSpPr>
+          <p:cNvPr id="4" name="ZoneTexte 3"/>
+          <p:cNvSpPr txBox="1"/>
+          <p:nvPr userDrawn="1"/>
+        </p:nvSpPr>
+        <p:spPr>
+          <a:xfrm>
+            <a:off x="107504" y="6505599"/>
+            <a:ext cx="2755947" cy="307777"/>
+          </a:xfrm>
+          <a:prstGeom prst="rect">
+            <a:avLst/>
+          </a:prstGeom>
+          <a:noFill/>
+        </p:spPr>
+        <p:txBody>
+          <a:bodyPr wrap="none" rtlCol="0">
+            <a:spAutoFit/>
+          </a:bodyPr>
+          <a:lstStyle/>
+          <a:p>
+            <a:r>
+              <a:rPr lang="fr-FR" sz="1400" i="1" dirty="0" smtClean="0">
+                <a:solidFill>
+                  <a:schemeClr val="tx1">
+                    <a:lumMod val="85000"/>
+                    <a:lumOff val="15000"/>
+                  </a:schemeClr>
+                </a:solidFill>
+                <a:latin typeface="Calibri" panose="020F0502020204030204" pitchFamily="34" charset="0"/>
+              </a:rPr>
+              <a:t>Rémi Lavedrine – Security Manager</a:t>
+            </a:r>
+            <a:endParaRPr lang="fr-FR" sz="1400" i="1" dirty="0">
+              <a:solidFill>
+                <a:schemeClr val="tx1">
+                  <a:lumMod val="85000"/>
+                  <a:lumOff val="15000"/>
+                </a:schemeClr>
+              </a:solidFill>
+              <a:latin typeface="Calibri" panose="020F0502020204030204" pitchFamily="34" charset="0"/>
+            </a:endParaRPr>
+          </a:p>
+        </p:txBody>
+      </p:sp>
+    </p:spTree>
+    <p:extLst>
+      <p:ext uri="{BB962C8B-B14F-4D97-AF65-F5344CB8AC3E}">
+        <p14:creationId xmlns:p14="http://schemas.microsoft.com/office/powerpoint/2010/main" val="1877164906"/>
+      </p:ext>
+    </p:extLst>
+  </p:cSld>
+  <p:clrMapOvr>
+    <a:masterClrMapping/>
+  </p:clrMapOvr>
+  <p:timing>
+    <p:tnLst>
+      <p:par>
+        <p:cTn id="1" dur="indefinite" restart="never" nodeType="tmRoot"/>
+      </p:par>
+    </p:tnLst>
+  </p:timing>
+</p:sldLayout>
+</file>
+
+<file path=ppt/slideLayouts/slideLayout4.xml><?xml version="1.0" encoding="utf-8"?>
+<p:sldLayout xmlns:a="http://schemas.openxmlformats.org/drawingml/2006/main" xmlns:r="http://schemas.openxmlformats.org/officeDocument/2006/relationships" xmlns:p="http://schemas.openxmlformats.org/presentationml/2006/main" showMasterSp="0" preserve="1" userDrawn="1">
   <p:cSld name="2_Disposition personnalisée">
     <p:spTree>
       <p:nvGrpSpPr>
@@ -7980,7 +8288,7 @@
             <a:pPr lvl="0"/>
             <a:r>
               <a:rPr lang="fr-FR" smtClean="0"/>
-              <a:t>Cliquez pour modifier les styles du texte du masque</a:t>
+              <a:t>Modifiez les styles du texte du masque</a:t>
             </a:r>
           </a:p>
         </p:txBody>
@@ -8013,7 +8321,7 @@
             <a:pPr lvl="0"/>
             <a:r>
               <a:rPr lang="fr-FR" smtClean="0"/>
-              <a:t>Cliquez pour modifier les styles du texte du masque</a:t>
+              <a:t>Modifiez les styles du texte du masque</a:t>
             </a:r>
           </a:p>
         </p:txBody>
@@ -8090,7 +8398,7 @@
             <a:pPr lvl="0"/>
             <a:r>
               <a:rPr lang="fr-FR" smtClean="0"/>
-              <a:t>Cliquez pour modifier les styles du texte du masque</a:t>
+              <a:t>Modifiez les styles du texte du masque</a:t>
             </a:r>
           </a:p>
         </p:txBody>
@@ -8183,6 +8491,52 @@
                   <a:lumMod val="50000"/>
                 </a:schemeClr>
               </a:solidFill>
+            </a:endParaRPr>
+          </a:p>
+        </p:txBody>
+      </p:sp>
+      <p:sp>
+        <p:nvSpPr>
+          <p:cNvPr id="11" name="ZoneTexte 10"/>
+          <p:cNvSpPr txBox="1"/>
+          <p:nvPr userDrawn="1"/>
+        </p:nvSpPr>
+        <p:spPr>
+          <a:xfrm>
+            <a:off x="107504" y="6505599"/>
+            <a:ext cx="2755947" cy="307777"/>
+          </a:xfrm>
+          <a:prstGeom prst="rect">
+            <a:avLst/>
+          </a:prstGeom>
+          <a:noFill/>
+        </p:spPr>
+        <p:txBody>
+          <a:bodyPr wrap="none" rtlCol="0">
+            <a:spAutoFit/>
+          </a:bodyPr>
+          <a:lstStyle/>
+          <a:p>
+            <a:r>
+              <a:rPr lang="fr-FR" sz="1400" i="1" dirty="0" smtClean="0">
+                <a:solidFill>
+                  <a:schemeClr val="tx1">
+                    <a:lumMod val="85000"/>
+                    <a:lumOff val="15000"/>
+                  </a:schemeClr>
+                </a:solidFill>
+                <a:latin typeface="Calibri" panose="020F0502020204030204" pitchFamily="34" charset="0"/>
+              </a:rPr>
+              <a:t>Rémi Lavedrine – Security Manager</a:t>
+            </a:r>
+            <a:endParaRPr lang="fr-FR" sz="1400" i="1" dirty="0">
+              <a:solidFill>
+                <a:schemeClr val="tx1">
+                  <a:lumMod val="85000"/>
+                  <a:lumOff val="15000"/>
+                </a:schemeClr>
+              </a:solidFill>
+              <a:latin typeface="Calibri" panose="020F0502020204030204" pitchFamily="34" charset="0"/>
             </a:endParaRPr>
           </a:p>
         </p:txBody>
@@ -8197,10 +8551,17 @@
   <p:clrMapOvr>
     <a:masterClrMapping/>
   </p:clrMapOvr>
+  <p:timing>
+    <p:tnLst>
+      <p:par>
+        <p:cTn id="1" dur="indefinite" restart="never" nodeType="tmRoot"/>
+      </p:par>
+    </p:tnLst>
+  </p:timing>
 </p:sldLayout>
 </file>
 
-<file path=ppt/slideLayouts/slideLayout4.xml><?xml version="1.0" encoding="utf-8"?>
+<file path=ppt/slideLayouts/slideLayout5.xml><?xml version="1.0" encoding="utf-8"?>
 <p:sldLayout xmlns:a="http://schemas.openxmlformats.org/drawingml/2006/main" xmlns:r="http://schemas.openxmlformats.org/officeDocument/2006/relationships" xmlns:p="http://schemas.openxmlformats.org/presentationml/2006/main" preserve="1" userDrawn="1">
   <p:cSld name="titre de la présentation">
     <p:spTree>
@@ -8477,7 +8838,7 @@
 </p:sldLayout>
 </file>
 
-<file path=ppt/slideLayouts/slideLayout5.xml><?xml version="1.0" encoding="utf-8"?>
+<file path=ppt/slideLayouts/slideLayout6.xml><?xml version="1.0" encoding="utf-8"?>
 <p:sldLayout xmlns:a="http://schemas.openxmlformats.org/drawingml/2006/main" xmlns:r="http://schemas.openxmlformats.org/officeDocument/2006/relationships" xmlns:p="http://schemas.openxmlformats.org/presentationml/2006/main" preserve="1" userDrawn="1">
   <p:cSld name="sommaire">
     <p:spTree>
@@ -9416,7 +9777,7 @@
 </p:sldLayout>
 </file>
 
-<file path=ppt/slideLayouts/slideLayout6.xml><?xml version="1.0" encoding="utf-8"?>
+<file path=ppt/slideLayouts/slideLayout7.xml><?xml version="1.0" encoding="utf-8"?>
 <p:sldLayout xmlns:a="http://schemas.openxmlformats.org/drawingml/2006/main" xmlns:r="http://schemas.openxmlformats.org/officeDocument/2006/relationships" xmlns:p="http://schemas.openxmlformats.org/presentationml/2006/main" preserve="1" userDrawn="1">
   <p:cSld name="puces simples">
     <p:spTree>
@@ -9543,7 +9904,7 @@
 </p:sldLayout>
 </file>
 
-<file path=ppt/slideLayouts/slideLayout7.xml><?xml version="1.0" encoding="utf-8"?>
+<file path=ppt/slideLayouts/slideLayout8.xml><?xml version="1.0" encoding="utf-8"?>
 <p:sldLayout xmlns:a="http://schemas.openxmlformats.org/drawingml/2006/main" xmlns:r="http://schemas.openxmlformats.org/officeDocument/2006/relationships" xmlns:p="http://schemas.openxmlformats.org/presentationml/2006/main" preserve="1" userDrawn="1">
   <p:cSld name="plusieurs niveaux hiérarchiques">
     <p:spTree>
@@ -9703,7 +10064,7 @@
 </p:sldLayout>
 </file>
 
-<file path=ppt/slideLayouts/slideLayout8.xml><?xml version="1.0" encoding="utf-8"?>
+<file path=ppt/slideLayouts/slideLayout9.xml><?xml version="1.0" encoding="utf-8"?>
 <p:sldLayout xmlns:a="http://schemas.openxmlformats.org/drawingml/2006/main" xmlns:r="http://schemas.openxmlformats.org/officeDocument/2006/relationships" xmlns:p="http://schemas.openxmlformats.org/presentationml/2006/main" preserve="1" userDrawn="1">
   <p:cSld name="paragraphes">
     <p:spTree>
@@ -9822,75 +10183,6 @@
     <p:extLst>
       <p:ext uri="{BB962C8B-B14F-4D97-AF65-F5344CB8AC3E}">
         <p14:creationId xmlns:p14="http://schemas.microsoft.com/office/powerpoint/2010/main" val="3466785450"/>
-      </p:ext>
-    </p:extLst>
-  </p:cSld>
-  <p:clrMapOvr>
-    <a:masterClrMapping/>
-  </p:clrMapOvr>
-  <p:timing>
-    <p:tnLst>
-      <p:par>
-        <p:cTn id="1" dur="indefinite" restart="never" nodeType="tmRoot"/>
-      </p:par>
-    </p:tnLst>
-  </p:timing>
-</p:sldLayout>
-</file>
-
-<file path=ppt/slideLayouts/slideLayout9.xml><?xml version="1.0" encoding="utf-8"?>
-<p:sldLayout xmlns:a="http://schemas.openxmlformats.org/drawingml/2006/main" xmlns:r="http://schemas.openxmlformats.org/officeDocument/2006/relationships" xmlns:p="http://schemas.openxmlformats.org/presentationml/2006/main" preserve="1" userDrawn="1">
-  <p:cSld name="titre seul">
-    <p:spTree>
-      <p:nvGrpSpPr>
-        <p:cNvPr id="1" name=""/>
-        <p:cNvGrpSpPr/>
-        <p:nvPr/>
-      </p:nvGrpSpPr>
-      <p:grpSpPr>
-        <a:xfrm>
-          <a:off x="0" y="0"/>
-          <a:ext cx="0" cy="0"/>
-          <a:chOff x="0" y="0"/>
-          <a:chExt cx="0" cy="0"/>
-        </a:xfrm>
-      </p:grpSpPr>
-      <p:sp>
-        <p:nvSpPr>
-          <p:cNvPr id="2" name="Titre 1"/>
-          <p:cNvSpPr>
-            <a:spLocks noGrp="1"/>
-          </p:cNvSpPr>
-          <p:nvPr>
-            <p:ph type="title" hasCustomPrompt="1"/>
-          </p:nvPr>
-        </p:nvSpPr>
-        <p:spPr>
-          <a:xfrm>
-            <a:off x="1015200" y="404664"/>
-            <a:ext cx="7057405" cy="982800"/>
-          </a:xfrm>
-        </p:spPr>
-        <p:txBody>
-          <a:bodyPr/>
-          <a:lstStyle>
-            <a:lvl1pPr algn="l">
-              <a:defRPr/>
-            </a:lvl1pPr>
-          </a:lstStyle>
-          <a:p>
-            <a:r>
-              <a:rPr lang="fr-FR" dirty="0" smtClean="0"/>
-              <a:t>titre seul</a:t>
-            </a:r>
-            <a:endParaRPr lang="fr-FR" dirty="0"/>
-          </a:p>
-        </p:txBody>
-      </p:sp>
-    </p:spTree>
-    <p:extLst>
-      <p:ext uri="{BB962C8B-B14F-4D97-AF65-F5344CB8AC3E}">
-        <p14:creationId xmlns:p14="http://schemas.microsoft.com/office/powerpoint/2010/main" val="3082467275"/>
       </p:ext>
     </p:extLst>
   </p:cSld>
@@ -10234,27 +10526,28 @@
   <p:sldLayoutIdLst>
     <p:sldLayoutId id="2147483679" r:id="rId1"/>
     <p:sldLayoutId id="2147483681" r:id="rId2"/>
-    <p:sldLayoutId id="2147483680" r:id="rId3"/>
-    <p:sldLayoutId id="2147483649" r:id="rId4"/>
-    <p:sldLayoutId id="2147483660" r:id="rId5"/>
-    <p:sldLayoutId id="2147483661" r:id="rId6"/>
-    <p:sldLayoutId id="2147483662" r:id="rId7"/>
-    <p:sldLayoutId id="2147483663" r:id="rId8"/>
-    <p:sldLayoutId id="2147483664" r:id="rId9"/>
-    <p:sldLayoutId id="2147483665" r:id="rId10"/>
-    <p:sldLayoutId id="2147483666" r:id="rId11"/>
-    <p:sldLayoutId id="2147483667" r:id="rId12"/>
-    <p:sldLayoutId id="2147483668" r:id="rId13"/>
-    <p:sldLayoutId id="2147483669" r:id="rId14"/>
-    <p:sldLayoutId id="2147483671" r:id="rId15"/>
-    <p:sldLayoutId id="2147483672" r:id="rId16"/>
-    <p:sldLayoutId id="2147483670" r:id="rId17"/>
-    <p:sldLayoutId id="2147483673" r:id="rId18"/>
-    <p:sldLayoutId id="2147483675" r:id="rId19"/>
-    <p:sldLayoutId id="2147483674" r:id="rId20"/>
-    <p:sldLayoutId id="2147483676" r:id="rId21"/>
-    <p:sldLayoutId id="2147483677" r:id="rId22"/>
-    <p:sldLayoutId id="2147483678" r:id="rId23"/>
+    <p:sldLayoutId id="2147483682" r:id="rId3"/>
+    <p:sldLayoutId id="2147483680" r:id="rId4"/>
+    <p:sldLayoutId id="2147483649" r:id="rId5"/>
+    <p:sldLayoutId id="2147483660" r:id="rId6"/>
+    <p:sldLayoutId id="2147483661" r:id="rId7"/>
+    <p:sldLayoutId id="2147483662" r:id="rId8"/>
+    <p:sldLayoutId id="2147483663" r:id="rId9"/>
+    <p:sldLayoutId id="2147483664" r:id="rId10"/>
+    <p:sldLayoutId id="2147483665" r:id="rId11"/>
+    <p:sldLayoutId id="2147483666" r:id="rId12"/>
+    <p:sldLayoutId id="2147483667" r:id="rId13"/>
+    <p:sldLayoutId id="2147483668" r:id="rId14"/>
+    <p:sldLayoutId id="2147483669" r:id="rId15"/>
+    <p:sldLayoutId id="2147483671" r:id="rId16"/>
+    <p:sldLayoutId id="2147483672" r:id="rId17"/>
+    <p:sldLayoutId id="2147483670" r:id="rId18"/>
+    <p:sldLayoutId id="2147483673" r:id="rId19"/>
+    <p:sldLayoutId id="2147483675" r:id="rId20"/>
+    <p:sldLayoutId id="2147483674" r:id="rId21"/>
+    <p:sldLayoutId id="2147483676" r:id="rId22"/>
+    <p:sldLayoutId id="2147483677" r:id="rId23"/>
+    <p:sldLayoutId id="2147483678" r:id="rId24"/>
   </p:sldLayoutIdLst>
   <p:timing>
     <p:tnLst>
@@ -10549,12 +10842,7 @@
             <p:ph type="body" sz="quarter" idx="10"/>
           </p:nvPr>
         </p:nvSpPr>
-        <p:spPr>
-          <a:xfrm>
-            <a:off x="395968" y="1168692"/>
-            <a:ext cx="1007679" cy="463648"/>
-          </a:xfrm>
-        </p:spPr>
+        <p:spPr/>
         <p:txBody>
           <a:bodyPr/>
           <a:lstStyle/>
@@ -10573,12 +10861,7 @@
             <p:ph type="body" sz="quarter" idx="11"/>
           </p:nvPr>
         </p:nvSpPr>
-        <p:spPr>
-          <a:xfrm>
-            <a:off x="1907704" y="1165152"/>
-            <a:ext cx="720080" cy="463648"/>
-          </a:xfrm>
-        </p:spPr>
+        <p:spPr/>
         <p:txBody>
           <a:bodyPr>
             <a:normAutofit lnSpcReduction="10000"/>
@@ -10599,12 +10882,7 @@
             <p:ph type="body" sz="quarter" idx="12"/>
           </p:nvPr>
         </p:nvSpPr>
-        <p:spPr>
-          <a:xfrm>
-            <a:off x="409413" y="3832203"/>
-            <a:ext cx="994233" cy="455430"/>
-          </a:xfrm>
-        </p:spPr>
+        <p:spPr/>
         <p:txBody>
           <a:bodyPr/>
           <a:lstStyle/>
@@ -10623,12 +10901,7 @@
             <p:ph type="body" sz="quarter" idx="13"/>
           </p:nvPr>
         </p:nvSpPr>
-        <p:spPr>
-          <a:xfrm>
-            <a:off x="1907704" y="3846709"/>
-            <a:ext cx="805821" cy="455430"/>
-          </a:xfrm>
-        </p:spPr>
+        <p:spPr/>
         <p:txBody>
           <a:bodyPr>
             <a:normAutofit lnSpcReduction="10000"/>
@@ -10649,12 +10922,7 @@
             <p:ph type="body" sz="quarter" idx="14"/>
           </p:nvPr>
         </p:nvSpPr>
-        <p:spPr>
-          <a:xfrm>
-            <a:off x="409413" y="5691323"/>
-            <a:ext cx="778211" cy="503238"/>
-          </a:xfrm>
-        </p:spPr>
+        <p:spPr/>
         <p:txBody>
           <a:bodyPr/>
           <a:lstStyle/>
@@ -10673,12 +10941,7 @@
             <p:ph type="body" sz="quarter" idx="15"/>
           </p:nvPr>
         </p:nvSpPr>
-        <p:spPr>
-          <a:xfrm>
-            <a:off x="1691680" y="5689021"/>
-            <a:ext cx="792088" cy="503238"/>
-          </a:xfrm>
-        </p:spPr>
+        <p:spPr/>
         <p:txBody>
           <a:bodyPr/>
           <a:lstStyle/>
@@ -10697,12 +10960,7 @@
             <p:ph sz="quarter" idx="18"/>
           </p:nvPr>
         </p:nvSpPr>
-        <p:spPr>
-          <a:xfrm>
-            <a:off x="395969" y="2477088"/>
-            <a:ext cx="1007678" cy="464400"/>
-          </a:xfrm>
-        </p:spPr>
+        <p:spPr/>
         <p:txBody>
           <a:bodyPr/>
           <a:lstStyle/>
@@ -10721,12 +10979,7 @@
             <p:ph type="body" sz="quarter" idx="19"/>
           </p:nvPr>
         </p:nvSpPr>
-        <p:spPr>
-          <a:xfrm>
-            <a:off x="1907704" y="2491299"/>
-            <a:ext cx="720080" cy="463648"/>
-          </a:xfrm>
-        </p:spPr>
+        <p:spPr/>
         <p:txBody>
           <a:bodyPr>
             <a:normAutofit lnSpcReduction="10000"/>
@@ -10737,10 +10990,29 @@
           </a:p>
         </p:txBody>
       </p:sp>
+      <p:sp>
+        <p:nvSpPr>
+          <p:cNvPr id="10" name="Espace réservé du texte 9"/>
+          <p:cNvSpPr>
+            <a:spLocks noGrp="1"/>
+          </p:cNvSpPr>
+          <p:nvPr>
+            <p:ph type="body" sz="quarter" idx="20"/>
+          </p:nvPr>
+        </p:nvSpPr>
+        <p:spPr/>
+        <p:txBody>
+          <a:bodyPr/>
+          <a:lstStyle/>
+          <a:p>
+            <a:endParaRPr lang="fr-FR"/>
+          </a:p>
+        </p:txBody>
+      </p:sp>
     </p:spTree>
     <p:extLst>
       <p:ext uri="{BB962C8B-B14F-4D97-AF65-F5344CB8AC3E}">
-        <p14:creationId xmlns:p14="http://schemas.microsoft.com/office/powerpoint/2010/main" val="1116577025"/>
+        <p14:creationId xmlns:p14="http://schemas.microsoft.com/office/powerpoint/2010/main" val="1757503060"/>
       </p:ext>
     </p:extLst>
   </p:cSld>
@@ -10834,11 +11106,18 @@
   <p:clrMapOvr>
     <a:masterClrMapping/>
   </p:clrMapOvr>
+  <p:timing>
+    <p:tnLst>
+      <p:par>
+        <p:cTn id="1" dur="indefinite" restart="never" nodeType="tmRoot"/>
+      </p:par>
+    </p:tnLst>
+  </p:timing>
 </p:sld>
 </file>
 
 <file path=ppt/theme/theme1.xml><?xml version="1.0" encoding="utf-8"?>
-<a:theme xmlns:a="http://schemas.openxmlformats.org/drawingml/2006/main" name="blank">
+<a:theme xmlns:a="http://schemas.openxmlformats.org/drawingml/2006/main" name="SecurityReport">
   <a:themeElements>
     <a:clrScheme name="Orange 00">
       <a:dk1>
@@ -11061,7 +11340,7 @@
   <a:extraClrSchemeLst/>
   <a:extLst>
     <a:ext uri="{05A4C25C-085E-4340-85A3-A5531E510DB2}">
-      <thm15:themeFamily xmlns:thm15="http://schemas.microsoft.com/office/thememl/2012/main" name="Présentation4" id="{777F971E-405A-2D4B-B522-4D1E6BDAB4B6}" vid="{A469C8F1-1DA4-974E-9396-4B8754DC5AF5}"/>
+      <thm15:themeFamily xmlns="" xmlns:thm15="http://schemas.microsoft.com/office/thememl/2012/main" name="Présentation4" id="{777F971E-405A-2D4B-B522-4D1E6BDAB4B6}" vid="{A469C8F1-1DA4-974E-9396-4B8754DC5AF5}"/>
     </a:ext>
   </a:extLst>
 </a:theme>
@@ -11322,7 +11601,7 @@
   <a:extraClrSchemeLst/>
   <a:extLst>
     <a:ext uri="{05A4C25C-085E-4340-85A3-A5531E510DB2}">
-      <thm15:themeFamily xmlns:thm15="http://schemas.microsoft.com/office/thememl/2012/main" name="Office Theme" id="{62F939B6-93AF-4DB8-9C6B-D6C7DFDC589F}" vid="{4A3C46E8-61CC-4603-A589-7422A47A8E4A}"/>
+      <thm15:themeFamily xmlns="" xmlns:thm15="http://schemas.microsoft.com/office/thememl/2012/main" name="Office Theme" id="{62F939B6-93AF-4DB8-9C6B-D6C7DFDC589F}" vid="{4A3C46E8-61CC-4603-A589-7422A47A8E4A}"/>
     </a:ext>
   </a:extLst>
 </a:theme>

</xml_diff>